<commit_message>
work on presentation, add new base model with only llq env link
</commit_message>
<xml_diff>
--- a/2023/presentation/goa_pcod_sept23.pptx
+++ b/2023/presentation/goa_pcod_sept23.pptx
@@ -11,9 +11,11 @@
     <p:sldId id="263" r:id="rId5"/>
     <p:sldId id="259" r:id="rId6"/>
     <p:sldId id="260" r:id="rId7"/>
-    <p:sldId id="261" r:id="rId8"/>
-    <p:sldId id="262" r:id="rId9"/>
-    <p:sldId id="264" r:id="rId10"/>
+    <p:sldId id="266" r:id="rId8"/>
+    <p:sldId id="265" r:id="rId9"/>
+    <p:sldId id="261" r:id="rId10"/>
+    <p:sldId id="262" r:id="rId11"/>
+    <p:sldId id="264" r:id="rId12"/>
   </p:sldIdLst>
   <p:sldSz cx="12192000" cy="6858000"/>
   <p:notesSz cx="6858000" cy="9144000"/>
@@ -112,6 +114,11 @@
       </a:defRPr>
     </a:lvl9pPr>
   </p:defaultTextStyle>
+  <p:extLst>
+    <p:ext uri="{EFAFB233-063F-42B5-8137-9DF3F51BA10A}">
+      <p15:sldGuideLst xmlns:p15="http://schemas.microsoft.com/office/powerpoint/2012/main"/>
+    </p:ext>
+  </p:extLst>
 </p:presentation>
 </file>
 
@@ -246,7 +253,7 @@
           <a:p>
             <a:fld id="{A36D2051-A124-4F95-BC42-35393635D3A2}" type="datetimeFigureOut">
               <a:rPr lang="en-US" smtClean="0"/>
-              <a:t>9/7/2023</a:t>
+              <a:t>9/8/2023</a:t>
             </a:fld>
             <a:endParaRPr lang="en-US"/>
           </a:p>
@@ -416,7 +423,7 @@
           <a:p>
             <a:fld id="{A36D2051-A124-4F95-BC42-35393635D3A2}" type="datetimeFigureOut">
               <a:rPr lang="en-US" smtClean="0"/>
-              <a:t>9/7/2023</a:t>
+              <a:t>9/8/2023</a:t>
             </a:fld>
             <a:endParaRPr lang="en-US"/>
           </a:p>
@@ -596,7 +603,7 @@
           <a:p>
             <a:fld id="{A36D2051-A124-4F95-BC42-35393635D3A2}" type="datetimeFigureOut">
               <a:rPr lang="en-US" smtClean="0"/>
-              <a:t>9/7/2023</a:t>
+              <a:t>9/8/2023</a:t>
             </a:fld>
             <a:endParaRPr lang="en-US"/>
           </a:p>
@@ -766,7 +773,7 @@
           <a:p>
             <a:fld id="{A36D2051-A124-4F95-BC42-35393635D3A2}" type="datetimeFigureOut">
               <a:rPr lang="en-US" smtClean="0"/>
-              <a:t>9/7/2023</a:t>
+              <a:t>9/8/2023</a:t>
             </a:fld>
             <a:endParaRPr lang="en-US"/>
           </a:p>
@@ -1012,7 +1019,7 @@
           <a:p>
             <a:fld id="{A36D2051-A124-4F95-BC42-35393635D3A2}" type="datetimeFigureOut">
               <a:rPr lang="en-US" smtClean="0"/>
-              <a:t>9/7/2023</a:t>
+              <a:t>9/8/2023</a:t>
             </a:fld>
             <a:endParaRPr lang="en-US"/>
           </a:p>
@@ -1244,7 +1251,7 @@
           <a:p>
             <a:fld id="{A36D2051-A124-4F95-BC42-35393635D3A2}" type="datetimeFigureOut">
               <a:rPr lang="en-US" smtClean="0"/>
-              <a:t>9/7/2023</a:t>
+              <a:t>9/8/2023</a:t>
             </a:fld>
             <a:endParaRPr lang="en-US"/>
           </a:p>
@@ -1611,7 +1618,7 @@
           <a:p>
             <a:fld id="{A36D2051-A124-4F95-BC42-35393635D3A2}" type="datetimeFigureOut">
               <a:rPr lang="en-US" smtClean="0"/>
-              <a:t>9/7/2023</a:t>
+              <a:t>9/8/2023</a:t>
             </a:fld>
             <a:endParaRPr lang="en-US"/>
           </a:p>
@@ -1729,7 +1736,7 @@
           <a:p>
             <a:fld id="{A36D2051-A124-4F95-BC42-35393635D3A2}" type="datetimeFigureOut">
               <a:rPr lang="en-US" smtClean="0"/>
-              <a:t>9/7/2023</a:t>
+              <a:t>9/8/2023</a:t>
             </a:fld>
             <a:endParaRPr lang="en-US"/>
           </a:p>
@@ -1824,7 +1831,7 @@
           <a:p>
             <a:fld id="{A36D2051-A124-4F95-BC42-35393635D3A2}" type="datetimeFigureOut">
               <a:rPr lang="en-US" smtClean="0"/>
-              <a:t>9/7/2023</a:t>
+              <a:t>9/8/2023</a:t>
             </a:fld>
             <a:endParaRPr lang="en-US"/>
           </a:p>
@@ -2101,7 +2108,7 @@
           <a:p>
             <a:fld id="{A36D2051-A124-4F95-BC42-35393635D3A2}" type="datetimeFigureOut">
               <a:rPr lang="en-US" smtClean="0"/>
-              <a:t>9/7/2023</a:t>
+              <a:t>9/8/2023</a:t>
             </a:fld>
             <a:endParaRPr lang="en-US"/>
           </a:p>
@@ -2354,7 +2361,7 @@
           <a:p>
             <a:fld id="{A36D2051-A124-4F95-BC42-35393635D3A2}" type="datetimeFigureOut">
               <a:rPr lang="en-US" smtClean="0"/>
-              <a:t>9/7/2023</a:t>
+              <a:t>9/8/2023</a:t>
             </a:fld>
             <a:endParaRPr lang="en-US"/>
           </a:p>
@@ -2567,7 +2574,7 @@
           <a:p>
             <a:fld id="{A36D2051-A124-4F95-BC42-35393635D3A2}" type="datetimeFigureOut">
               <a:rPr lang="en-US" smtClean="0"/>
-              <a:t>9/7/2023</a:t>
+              <a:t>9/8/2023</a:t>
             </a:fld>
             <a:endParaRPr lang="en-US"/>
           </a:p>
@@ -2992,12 +2999,20 @@
               <a:t>2023 </a:t>
             </a:r>
             <a:r>
+              <a:rPr lang="en-US" dirty="0" smtClean="0"/>
+              <a:t>GOA </a:t>
+            </a:r>
+            <a:r>
               <a:rPr lang="en-US" dirty="0" err="1" smtClean="0"/>
               <a:t>Pcod</a:t>
             </a:r>
             <a:r>
               <a:rPr lang="en-US" dirty="0" smtClean="0"/>
-              <a:t> assessment</a:t>
+              <a:t> </a:t>
+            </a:r>
+            <a:r>
+              <a:rPr lang="en-US" dirty="0" smtClean="0"/>
+              <a:t>assessment</a:t>
             </a:r>
             <a:endParaRPr lang="en-US" dirty="0"/>
           </a:p>
@@ -3039,1146 +3054,7 @@
 </p:sld>
 </file>
 
-<file path=ppt/slides/slide2.xml><?xml version="1.0" encoding="utf-8"?>
-<p:sld xmlns:a="http://schemas.openxmlformats.org/drawingml/2006/main" xmlns:r="http://schemas.openxmlformats.org/officeDocument/2006/relationships" xmlns:p="http://schemas.openxmlformats.org/presentationml/2006/main">
-  <p:cSld>
-    <p:spTree>
-      <p:nvGrpSpPr>
-        <p:cNvPr id="1" name=""/>
-        <p:cNvGrpSpPr/>
-        <p:nvPr/>
-      </p:nvGrpSpPr>
-      <p:grpSpPr>
-        <a:xfrm>
-          <a:off x="0" y="0"/>
-          <a:ext cx="0" cy="0"/>
-          <a:chOff x="0" y="0"/>
-          <a:chExt cx="0" cy="0"/>
-        </a:xfrm>
-      </p:grpSpPr>
-      <p:sp>
-        <p:nvSpPr>
-          <p:cNvPr id="2" name="Title 1"/>
-          <p:cNvSpPr>
-            <a:spLocks noGrp="1"/>
-          </p:cNvSpPr>
-          <p:nvPr>
-            <p:ph type="title"/>
-          </p:nvPr>
-        </p:nvSpPr>
-        <p:spPr/>
-        <p:txBody>
-          <a:bodyPr/>
-          <a:lstStyle/>
-          <a:p>
-            <a:r>
-              <a:rPr lang="en-US" dirty="0" smtClean="0"/>
-              <a:t>Overview</a:t>
-            </a:r>
-            <a:endParaRPr lang="en-US" dirty="0"/>
-          </a:p>
-        </p:txBody>
-      </p:sp>
-      <p:sp>
-        <p:nvSpPr>
-          <p:cNvPr id="3" name="Content Placeholder 2"/>
-          <p:cNvSpPr>
-            <a:spLocks noGrp="1"/>
-          </p:cNvSpPr>
-          <p:nvPr>
-            <p:ph idx="1"/>
-          </p:nvPr>
-        </p:nvSpPr>
-        <p:spPr/>
-        <p:txBody>
-          <a:bodyPr>
-            <a:normAutofit lnSpcReduction="10000"/>
-          </a:bodyPr>
-          <a:lstStyle/>
-          <a:p>
-            <a:r>
-              <a:rPr lang="en-US" dirty="0" smtClean="0"/>
-              <a:t>Housecleaning (</a:t>
-            </a:r>
-            <a:r>
-              <a:rPr lang="en-US" dirty="0" err="1" smtClean="0"/>
-              <a:t>minsamplesize</a:t>
-            </a:r>
-            <a:r>
-              <a:rPr lang="en-US" dirty="0" smtClean="0"/>
-              <a:t>)</a:t>
-            </a:r>
-          </a:p>
-          <a:p>
-            <a:r>
-              <a:rPr lang="en-US" dirty="0" smtClean="0"/>
-              <a:t>Environmental link</a:t>
-            </a:r>
-          </a:p>
-          <a:p>
-            <a:pPr lvl="1"/>
-            <a:r>
-              <a:rPr lang="en-US" dirty="0" smtClean="0"/>
-              <a:t>Description of environmental index</a:t>
-            </a:r>
-          </a:p>
-          <a:p>
-            <a:r>
-              <a:rPr lang="en-US" dirty="0" smtClean="0"/>
-              <a:t>Link for growth</a:t>
-            </a:r>
-          </a:p>
-          <a:p>
-            <a:pPr lvl="1"/>
-            <a:r>
-              <a:rPr lang="en-US" dirty="0" smtClean="0"/>
-              <a:t>Individual parameters: determining index</a:t>
-            </a:r>
-          </a:p>
-          <a:p>
-            <a:pPr lvl="1"/>
-            <a:r>
-              <a:rPr lang="en-US" dirty="0" smtClean="0"/>
-              <a:t>Combined preferred model</a:t>
-            </a:r>
-          </a:p>
-          <a:p>
-            <a:pPr lvl="1"/>
-            <a:r>
-              <a:rPr lang="en-US" dirty="0" smtClean="0"/>
-              <a:t>Comparisons with base model</a:t>
-            </a:r>
-          </a:p>
-          <a:p>
-            <a:r>
-              <a:rPr lang="en-US" dirty="0" smtClean="0"/>
-              <a:t>Link for LL survey q</a:t>
-            </a:r>
-          </a:p>
-          <a:p>
-            <a:pPr lvl="1"/>
-            <a:r>
-              <a:rPr lang="en-US" dirty="0" smtClean="0"/>
-              <a:t>Retrospective comparison w/ and w/o link</a:t>
-            </a:r>
-          </a:p>
-          <a:p>
-            <a:pPr lvl="1"/>
-            <a:r>
-              <a:rPr lang="en-US" dirty="0" smtClean="0"/>
-              <a:t>Evaluation of new index</a:t>
-            </a:r>
-          </a:p>
-        </p:txBody>
-      </p:sp>
-    </p:spTree>
-    <p:extLst>
-      <p:ext uri="{BB962C8B-B14F-4D97-AF65-F5344CB8AC3E}">
-        <p14:creationId xmlns:p14="http://schemas.microsoft.com/office/powerpoint/2010/main" val="1519735260"/>
-      </p:ext>
-    </p:extLst>
-  </p:cSld>
-  <p:clrMapOvr>
-    <a:masterClrMapping/>
-  </p:clrMapOvr>
-</p:sld>
-</file>
-
-<file path=ppt/slides/slide3.xml><?xml version="1.0" encoding="utf-8"?>
-<p:sld xmlns:a="http://schemas.openxmlformats.org/drawingml/2006/main" xmlns:r="http://schemas.openxmlformats.org/officeDocument/2006/relationships" xmlns:p="http://schemas.openxmlformats.org/presentationml/2006/main">
-  <p:cSld>
-    <p:spTree>
-      <p:nvGrpSpPr>
-        <p:cNvPr id="1" name=""/>
-        <p:cNvGrpSpPr/>
-        <p:nvPr/>
-      </p:nvGrpSpPr>
-      <p:grpSpPr>
-        <a:xfrm>
-          <a:off x="0" y="0"/>
-          <a:ext cx="0" cy="0"/>
-          <a:chOff x="0" y="0"/>
-          <a:chExt cx="0" cy="0"/>
-        </a:xfrm>
-      </p:grpSpPr>
-      <p:sp>
-        <p:nvSpPr>
-          <p:cNvPr id="2" name="Title 1"/>
-          <p:cNvSpPr>
-            <a:spLocks noGrp="1"/>
-          </p:cNvSpPr>
-          <p:nvPr>
-            <p:ph type="title"/>
-          </p:nvPr>
-        </p:nvSpPr>
-        <p:spPr/>
-        <p:txBody>
-          <a:bodyPr/>
-          <a:lstStyle/>
-          <a:p>
-            <a:r>
-              <a:rPr lang="en-US" dirty="0" smtClean="0"/>
-              <a:t>Housecleaning:</a:t>
-            </a:r>
-            <a:endParaRPr lang="en-US" dirty="0"/>
-          </a:p>
-        </p:txBody>
-      </p:sp>
-      <p:sp>
-        <p:nvSpPr>
-          <p:cNvPr id="3" name="Content Placeholder 2"/>
-          <p:cNvSpPr>
-            <a:spLocks noGrp="1"/>
-          </p:cNvSpPr>
-          <p:nvPr>
-            <p:ph idx="1"/>
-          </p:nvPr>
-        </p:nvSpPr>
-        <p:spPr/>
-        <p:txBody>
-          <a:bodyPr/>
-          <a:lstStyle/>
-          <a:p>
-            <a:r>
-              <a:rPr lang="en-US" dirty="0" err="1" smtClean="0"/>
-              <a:t>Minsample</a:t>
-            </a:r>
-            <a:r>
-              <a:rPr lang="en-US" dirty="0" smtClean="0"/>
-              <a:t> size issue</a:t>
-            </a:r>
-          </a:p>
-          <a:p>
-            <a:r>
-              <a:rPr lang="en-US" dirty="0" smtClean="0"/>
-              <a:t>Likelihoods</a:t>
-            </a:r>
-          </a:p>
-        </p:txBody>
-      </p:sp>
-      <p:pic>
-        <p:nvPicPr>
-          <p:cNvPr id="7" name="Picture 6"/>
-          <p:cNvPicPr>
-            <a:picLocks noChangeAspect="1"/>
-          </p:cNvPicPr>
-          <p:nvPr/>
-        </p:nvPicPr>
-        <p:blipFill>
-          <a:blip r:embed="rId2"/>
-          <a:stretch>
-            <a:fillRect/>
-          </a:stretch>
-        </p:blipFill>
-        <p:spPr>
-          <a:xfrm>
-            <a:off x="1306842" y="3018682"/>
-            <a:ext cx="2619375" cy="2305050"/>
-          </a:xfrm>
-          <a:prstGeom prst="rect">
-            <a:avLst/>
-          </a:prstGeom>
-        </p:spPr>
-      </p:pic>
-      <p:pic>
-        <p:nvPicPr>
-          <p:cNvPr id="8" name="Picture 7"/>
-          <p:cNvPicPr>
-            <a:picLocks noChangeAspect="1"/>
-          </p:cNvPicPr>
-          <p:nvPr/>
-        </p:nvPicPr>
-        <p:blipFill>
-          <a:blip r:embed="rId3"/>
-          <a:stretch>
-            <a:fillRect/>
-          </a:stretch>
-        </p:blipFill>
-        <p:spPr>
-          <a:xfrm>
-            <a:off x="4163475" y="3009157"/>
-            <a:ext cx="2143125" cy="1162050"/>
-          </a:xfrm>
-          <a:prstGeom prst="rect">
-            <a:avLst/>
-          </a:prstGeom>
-        </p:spPr>
-      </p:pic>
-      <p:pic>
-        <p:nvPicPr>
-          <p:cNvPr id="9" name="Picture 8"/>
-          <p:cNvPicPr>
-            <a:picLocks noChangeAspect="1"/>
-          </p:cNvPicPr>
-          <p:nvPr/>
-        </p:nvPicPr>
-        <p:blipFill>
-          <a:blip r:embed="rId4" cstate="print">
-            <a:extLst>
-              <a:ext uri="{28A0092B-C50C-407E-A947-70E740481C1C}">
-                <a14:useLocalDpi xmlns:a14="http://schemas.microsoft.com/office/drawing/2010/main" val="0"/>
-              </a:ext>
-            </a:extLst>
-          </a:blip>
-          <a:stretch>
-            <a:fillRect/>
-          </a:stretch>
-        </p:blipFill>
-        <p:spPr>
-          <a:xfrm>
-            <a:off x="7322118" y="231569"/>
-            <a:ext cx="2309757" cy="2309757"/>
-          </a:xfrm>
-          <a:prstGeom prst="rect">
-            <a:avLst/>
-          </a:prstGeom>
-        </p:spPr>
-      </p:pic>
-      <p:pic>
-        <p:nvPicPr>
-          <p:cNvPr id="10" name="Picture 9"/>
-          <p:cNvPicPr>
-            <a:picLocks noChangeAspect="1"/>
-          </p:cNvPicPr>
-          <p:nvPr/>
-        </p:nvPicPr>
-        <p:blipFill>
-          <a:blip r:embed="rId5" cstate="print">
-            <a:extLst>
-              <a:ext uri="{28A0092B-C50C-407E-A947-70E740481C1C}">
-                <a14:useLocalDpi xmlns:a14="http://schemas.microsoft.com/office/drawing/2010/main" val="0"/>
-              </a:ext>
-            </a:extLst>
-          </a:blip>
-          <a:stretch>
-            <a:fillRect/>
-          </a:stretch>
-        </p:blipFill>
-        <p:spPr>
-          <a:xfrm>
-            <a:off x="7322118" y="2351316"/>
-            <a:ext cx="2315886" cy="2315886"/>
-          </a:xfrm>
-          <a:prstGeom prst="rect">
-            <a:avLst/>
-          </a:prstGeom>
-        </p:spPr>
-      </p:pic>
-      <p:pic>
-        <p:nvPicPr>
-          <p:cNvPr id="11" name="Picture 10"/>
-          <p:cNvPicPr>
-            <a:picLocks noChangeAspect="1"/>
-          </p:cNvPicPr>
-          <p:nvPr/>
-        </p:nvPicPr>
-        <p:blipFill>
-          <a:blip r:embed="rId6" cstate="print">
-            <a:extLst>
-              <a:ext uri="{28A0092B-C50C-407E-A947-70E740481C1C}">
-                <a14:useLocalDpi xmlns:a14="http://schemas.microsoft.com/office/drawing/2010/main" val="0"/>
-              </a:ext>
-            </a:extLst>
-          </a:blip>
-          <a:stretch>
-            <a:fillRect/>
-          </a:stretch>
-        </p:blipFill>
-        <p:spPr>
-          <a:xfrm>
-            <a:off x="7322118" y="4476006"/>
-            <a:ext cx="2309757" cy="2309757"/>
-          </a:xfrm>
-          <a:prstGeom prst="rect">
-            <a:avLst/>
-          </a:prstGeom>
-        </p:spPr>
-      </p:pic>
-      <p:pic>
-        <p:nvPicPr>
-          <p:cNvPr id="12" name="Picture 11"/>
-          <p:cNvPicPr>
-            <a:picLocks noChangeAspect="1"/>
-          </p:cNvPicPr>
-          <p:nvPr/>
-        </p:nvPicPr>
-        <p:blipFill>
-          <a:blip r:embed="rId7" cstate="print">
-            <a:extLst>
-              <a:ext uri="{28A0092B-C50C-407E-A947-70E740481C1C}">
-                <a14:useLocalDpi xmlns:a14="http://schemas.microsoft.com/office/drawing/2010/main" val="0"/>
-              </a:ext>
-            </a:extLst>
-          </a:blip>
-          <a:stretch>
-            <a:fillRect/>
-          </a:stretch>
-        </p:blipFill>
-        <p:spPr>
-          <a:xfrm>
-            <a:off x="9679371" y="231569"/>
-            <a:ext cx="2309757" cy="2309757"/>
-          </a:xfrm>
-          <a:prstGeom prst="rect">
-            <a:avLst/>
-          </a:prstGeom>
-        </p:spPr>
-      </p:pic>
-      <p:pic>
-        <p:nvPicPr>
-          <p:cNvPr id="13" name="Picture 12"/>
-          <p:cNvPicPr>
-            <a:picLocks noChangeAspect="1"/>
-          </p:cNvPicPr>
-          <p:nvPr/>
-        </p:nvPicPr>
-        <p:blipFill>
-          <a:blip r:embed="rId8" cstate="print">
-            <a:extLst>
-              <a:ext uri="{28A0092B-C50C-407E-A947-70E740481C1C}">
-                <a14:useLocalDpi xmlns:a14="http://schemas.microsoft.com/office/drawing/2010/main" val="0"/>
-              </a:ext>
-            </a:extLst>
-          </a:blip>
-          <a:stretch>
-            <a:fillRect/>
-          </a:stretch>
-        </p:blipFill>
-        <p:spPr>
-          <a:xfrm>
-            <a:off x="9677795" y="2351316"/>
-            <a:ext cx="2315886" cy="2315886"/>
-          </a:xfrm>
-          <a:prstGeom prst="rect">
-            <a:avLst/>
-          </a:prstGeom>
-        </p:spPr>
-      </p:pic>
-      <p:pic>
-        <p:nvPicPr>
-          <p:cNvPr id="14" name="Picture 13"/>
-          <p:cNvPicPr>
-            <a:picLocks noChangeAspect="1"/>
-          </p:cNvPicPr>
-          <p:nvPr/>
-        </p:nvPicPr>
-        <p:blipFill>
-          <a:blip r:embed="rId9" cstate="print">
-            <a:extLst>
-              <a:ext uri="{28A0092B-C50C-407E-A947-70E740481C1C}">
-                <a14:useLocalDpi xmlns:a14="http://schemas.microsoft.com/office/drawing/2010/main" val="0"/>
-              </a:ext>
-            </a:extLst>
-          </a:blip>
-          <a:stretch>
-            <a:fillRect/>
-          </a:stretch>
-        </p:blipFill>
-        <p:spPr>
-          <a:xfrm>
-            <a:off x="9705606" y="4476006"/>
-            <a:ext cx="2283522" cy="2283522"/>
-          </a:xfrm>
-          <a:prstGeom prst="rect">
-            <a:avLst/>
-          </a:prstGeom>
-        </p:spPr>
-      </p:pic>
-      <p:sp>
-        <p:nvSpPr>
-          <p:cNvPr id="15" name="TextBox 14"/>
-          <p:cNvSpPr txBox="1"/>
-          <p:nvPr/>
-        </p:nvSpPr>
-        <p:spPr>
-          <a:xfrm>
-            <a:off x="8057408" y="-71675"/>
-            <a:ext cx="938077" cy="369332"/>
-          </a:xfrm>
-          <a:prstGeom prst="rect">
-            <a:avLst/>
-          </a:prstGeom>
-          <a:noFill/>
-        </p:spPr>
-        <p:txBody>
-          <a:bodyPr wrap="none" rtlCol="0">
-            <a:spAutoFit/>
-          </a:bodyPr>
-          <a:lstStyle/>
-          <a:p>
-            <a:r>
-              <a:rPr lang="en-US" dirty="0" smtClean="0"/>
-              <a:t>2019.1a</a:t>
-            </a:r>
-            <a:endParaRPr lang="en-US" dirty="0"/>
-          </a:p>
-        </p:txBody>
-      </p:sp>
-      <p:sp>
-        <p:nvSpPr>
-          <p:cNvPr id="16" name="TextBox 15"/>
-          <p:cNvSpPr txBox="1"/>
-          <p:nvPr/>
-        </p:nvSpPr>
-        <p:spPr>
-          <a:xfrm>
-            <a:off x="10415723" y="-71675"/>
-            <a:ext cx="949299" cy="369332"/>
-          </a:xfrm>
-          <a:prstGeom prst="rect">
-            <a:avLst/>
-          </a:prstGeom>
-          <a:noFill/>
-        </p:spPr>
-        <p:txBody>
-          <a:bodyPr wrap="none" rtlCol="0">
-            <a:spAutoFit/>
-          </a:bodyPr>
-          <a:lstStyle/>
-          <a:p>
-            <a:r>
-              <a:rPr lang="en-US" dirty="0" smtClean="0"/>
-              <a:t>2019.1b</a:t>
-            </a:r>
-            <a:endParaRPr lang="en-US" dirty="0"/>
-          </a:p>
-        </p:txBody>
-      </p:sp>
-    </p:spTree>
-    <p:extLst>
-      <p:ext uri="{BB962C8B-B14F-4D97-AF65-F5344CB8AC3E}">
-        <p14:creationId xmlns:p14="http://schemas.microsoft.com/office/powerpoint/2010/main" val="553458133"/>
-      </p:ext>
-    </p:extLst>
-  </p:cSld>
-  <p:clrMapOvr>
-    <a:masterClrMapping/>
-  </p:clrMapOvr>
-</p:sld>
-</file>
-
-<file path=ppt/slides/slide4.xml><?xml version="1.0" encoding="utf-8"?>
-<p:sld xmlns:a="http://schemas.openxmlformats.org/drawingml/2006/main" xmlns:r="http://schemas.openxmlformats.org/officeDocument/2006/relationships" xmlns:p="http://schemas.openxmlformats.org/presentationml/2006/main">
-  <p:cSld>
-    <p:spTree>
-      <p:nvGrpSpPr>
-        <p:cNvPr id="1" name=""/>
-        <p:cNvGrpSpPr/>
-        <p:nvPr/>
-      </p:nvGrpSpPr>
-      <p:grpSpPr>
-        <a:xfrm>
-          <a:off x="0" y="0"/>
-          <a:ext cx="0" cy="0"/>
-          <a:chOff x="0" y="0"/>
-          <a:chExt cx="0" cy="0"/>
-        </a:xfrm>
-      </p:grpSpPr>
-      <p:sp>
-        <p:nvSpPr>
-          <p:cNvPr id="2" name="Title 1"/>
-          <p:cNvSpPr>
-            <a:spLocks noGrp="1"/>
-          </p:cNvSpPr>
-          <p:nvPr>
-            <p:ph type="title"/>
-          </p:nvPr>
-        </p:nvSpPr>
-        <p:spPr/>
-        <p:txBody>
-          <a:bodyPr/>
-          <a:lstStyle/>
-          <a:p>
-            <a:r>
-              <a:rPr lang="en-US" dirty="0" smtClean="0"/>
-              <a:t>Housecleaning</a:t>
-            </a:r>
-            <a:endParaRPr lang="en-US" dirty="0"/>
-          </a:p>
-        </p:txBody>
-      </p:sp>
-      <p:sp>
-        <p:nvSpPr>
-          <p:cNvPr id="3" name="Content Placeholder 2"/>
-          <p:cNvSpPr>
-            <a:spLocks noGrp="1"/>
-          </p:cNvSpPr>
-          <p:nvPr>
-            <p:ph idx="1"/>
-          </p:nvPr>
-        </p:nvSpPr>
-        <p:spPr/>
-        <p:txBody>
-          <a:bodyPr/>
-          <a:lstStyle/>
-          <a:p>
-            <a:r>
-              <a:rPr lang="en-US" dirty="0" err="1" smtClean="0"/>
-              <a:t>Minsample</a:t>
-            </a:r>
-            <a:r>
-              <a:rPr lang="en-US" dirty="0" smtClean="0"/>
-              <a:t> size issue</a:t>
-            </a:r>
-          </a:p>
-          <a:p>
-            <a:r>
-              <a:rPr lang="en-US" dirty="0" smtClean="0"/>
-              <a:t>This is new base model from here out</a:t>
-            </a:r>
-            <a:endParaRPr lang="en-US" dirty="0"/>
-          </a:p>
-        </p:txBody>
-      </p:sp>
-      <p:pic>
-        <p:nvPicPr>
-          <p:cNvPr id="4" name="Picture 3"/>
-          <p:cNvPicPr>
-            <a:picLocks noChangeAspect="1"/>
-          </p:cNvPicPr>
-          <p:nvPr/>
-        </p:nvPicPr>
-        <p:blipFill>
-          <a:blip r:embed="rId2" cstate="print">
-            <a:extLst>
-              <a:ext uri="{28A0092B-C50C-407E-A947-70E740481C1C}">
-                <a14:useLocalDpi xmlns:a14="http://schemas.microsoft.com/office/drawing/2010/main" val="0"/>
-              </a:ext>
-            </a:extLst>
-          </a:blip>
-          <a:stretch>
-            <a:fillRect/>
-          </a:stretch>
-        </p:blipFill>
-        <p:spPr>
-          <a:xfrm>
-            <a:off x="1704108" y="3327357"/>
-            <a:ext cx="4317676" cy="3321289"/>
-          </a:xfrm>
-          <a:prstGeom prst="rect">
-            <a:avLst/>
-          </a:prstGeom>
-        </p:spPr>
-      </p:pic>
-      <p:pic>
-        <p:nvPicPr>
-          <p:cNvPr id="5" name="Picture 4"/>
-          <p:cNvPicPr>
-            <a:picLocks noChangeAspect="1"/>
-          </p:cNvPicPr>
-          <p:nvPr/>
-        </p:nvPicPr>
-        <p:blipFill>
-          <a:blip r:embed="rId3" cstate="print">
-            <a:extLst>
-              <a:ext uri="{28A0092B-C50C-407E-A947-70E740481C1C}">
-                <a14:useLocalDpi xmlns:a14="http://schemas.microsoft.com/office/drawing/2010/main" val="0"/>
-              </a:ext>
-            </a:extLst>
-          </a:blip>
-          <a:stretch>
-            <a:fillRect/>
-          </a:stretch>
-        </p:blipFill>
-        <p:spPr>
-          <a:xfrm>
-            <a:off x="7604348" y="479415"/>
-            <a:ext cx="3827632" cy="2944332"/>
-          </a:xfrm>
-          <a:prstGeom prst="rect">
-            <a:avLst/>
-          </a:prstGeom>
-        </p:spPr>
-      </p:pic>
-      <p:pic>
-        <p:nvPicPr>
-          <p:cNvPr id="6" name="Picture 5"/>
-          <p:cNvPicPr>
-            <a:picLocks noChangeAspect="1"/>
-          </p:cNvPicPr>
-          <p:nvPr/>
-        </p:nvPicPr>
-        <p:blipFill>
-          <a:blip r:embed="rId4" cstate="print">
-            <a:extLst>
-              <a:ext uri="{28A0092B-C50C-407E-A947-70E740481C1C}">
-                <a14:useLocalDpi xmlns:a14="http://schemas.microsoft.com/office/drawing/2010/main" val="0"/>
-              </a:ext>
-            </a:extLst>
-          </a:blip>
-          <a:stretch>
-            <a:fillRect/>
-          </a:stretch>
-        </p:blipFill>
-        <p:spPr>
-          <a:xfrm>
-            <a:off x="7604348" y="3423747"/>
-            <a:ext cx="3827632" cy="2944332"/>
-          </a:xfrm>
-          <a:prstGeom prst="rect">
-            <a:avLst/>
-          </a:prstGeom>
-        </p:spPr>
-      </p:pic>
-    </p:spTree>
-    <p:extLst>
-      <p:ext uri="{BB962C8B-B14F-4D97-AF65-F5344CB8AC3E}">
-        <p14:creationId xmlns:p14="http://schemas.microsoft.com/office/powerpoint/2010/main" val="1853197434"/>
-      </p:ext>
-    </p:extLst>
-  </p:cSld>
-  <p:clrMapOvr>
-    <a:masterClrMapping/>
-  </p:clrMapOvr>
-</p:sld>
-</file>
-
-<file path=ppt/slides/slide5.xml><?xml version="1.0" encoding="utf-8"?>
-<p:sld xmlns:a="http://schemas.openxmlformats.org/drawingml/2006/main" xmlns:r="http://schemas.openxmlformats.org/officeDocument/2006/relationships" xmlns:p="http://schemas.openxmlformats.org/presentationml/2006/main">
-  <p:cSld>
-    <p:spTree>
-      <p:nvGrpSpPr>
-        <p:cNvPr id="1" name=""/>
-        <p:cNvGrpSpPr/>
-        <p:nvPr/>
-      </p:nvGrpSpPr>
-      <p:grpSpPr>
-        <a:xfrm>
-          <a:off x="0" y="0"/>
-          <a:ext cx="0" cy="0"/>
-          <a:chOff x="0" y="0"/>
-          <a:chExt cx="0" cy="0"/>
-        </a:xfrm>
-      </p:grpSpPr>
-      <p:sp>
-        <p:nvSpPr>
-          <p:cNvPr id="2" name="Title 1"/>
-          <p:cNvSpPr>
-            <a:spLocks noGrp="1"/>
-          </p:cNvSpPr>
-          <p:nvPr>
-            <p:ph type="title"/>
-          </p:nvPr>
-        </p:nvSpPr>
-        <p:spPr/>
-        <p:txBody>
-          <a:bodyPr/>
-          <a:lstStyle/>
-          <a:p>
-            <a:r>
-              <a:rPr lang="en-US" dirty="0" smtClean="0"/>
-              <a:t>Environmental link</a:t>
-            </a:r>
-            <a:endParaRPr lang="en-US" dirty="0"/>
-          </a:p>
-        </p:txBody>
-      </p:sp>
-      <p:sp>
-        <p:nvSpPr>
-          <p:cNvPr id="3" name="Content Placeholder 2"/>
-          <p:cNvSpPr>
-            <a:spLocks noGrp="1"/>
-          </p:cNvSpPr>
-          <p:nvPr>
-            <p:ph idx="1"/>
-          </p:nvPr>
-        </p:nvSpPr>
-        <p:spPr/>
-        <p:txBody>
-          <a:bodyPr/>
-          <a:lstStyle/>
-          <a:p>
-            <a:r>
-              <a:rPr lang="en-US" dirty="0" smtClean="0"/>
-              <a:t>Description of </a:t>
-            </a:r>
-            <a:r>
-              <a:rPr lang="en-US" dirty="0" err="1" smtClean="0"/>
-              <a:t>cfsr</a:t>
-            </a:r>
-            <a:endParaRPr lang="en-US" dirty="0" smtClean="0"/>
-          </a:p>
-          <a:p>
-            <a:r>
-              <a:rPr lang="en-US" dirty="0" smtClean="0"/>
-              <a:t>Available by length bin and month</a:t>
-            </a:r>
-            <a:endParaRPr lang="en-US" dirty="0"/>
-          </a:p>
-        </p:txBody>
-      </p:sp>
-    </p:spTree>
-    <p:extLst>
-      <p:ext uri="{BB962C8B-B14F-4D97-AF65-F5344CB8AC3E}">
-        <p14:creationId xmlns:p14="http://schemas.microsoft.com/office/powerpoint/2010/main" val="89867169"/>
-      </p:ext>
-    </p:extLst>
-  </p:cSld>
-  <p:clrMapOvr>
-    <a:masterClrMapping/>
-  </p:clrMapOvr>
-</p:sld>
-</file>
-
-<file path=ppt/slides/slide6.xml><?xml version="1.0" encoding="utf-8"?>
-<p:sld xmlns:a="http://schemas.openxmlformats.org/drawingml/2006/main" xmlns:r="http://schemas.openxmlformats.org/officeDocument/2006/relationships" xmlns:p="http://schemas.openxmlformats.org/presentationml/2006/main">
-  <p:cSld>
-    <p:spTree>
-      <p:nvGrpSpPr>
-        <p:cNvPr id="1" name=""/>
-        <p:cNvGrpSpPr/>
-        <p:nvPr/>
-      </p:nvGrpSpPr>
-      <p:grpSpPr>
-        <a:xfrm>
-          <a:off x="0" y="0"/>
-          <a:ext cx="0" cy="0"/>
-          <a:chOff x="0" y="0"/>
-          <a:chExt cx="0" cy="0"/>
-        </a:xfrm>
-      </p:grpSpPr>
-      <p:sp>
-        <p:nvSpPr>
-          <p:cNvPr id="2" name="Title 1"/>
-          <p:cNvSpPr>
-            <a:spLocks noGrp="1"/>
-          </p:cNvSpPr>
-          <p:nvPr>
-            <p:ph type="title"/>
-          </p:nvPr>
-        </p:nvSpPr>
-        <p:spPr/>
-        <p:txBody>
-          <a:bodyPr/>
-          <a:lstStyle/>
-          <a:p>
-            <a:r>
-              <a:rPr lang="en-US" dirty="0" smtClean="0"/>
-              <a:t>Link for growth</a:t>
-            </a:r>
-            <a:endParaRPr lang="en-US" dirty="0"/>
-          </a:p>
-        </p:txBody>
-      </p:sp>
-      <p:sp>
-        <p:nvSpPr>
-          <p:cNvPr id="3" name="Content Placeholder 2"/>
-          <p:cNvSpPr>
-            <a:spLocks noGrp="1"/>
-          </p:cNvSpPr>
-          <p:nvPr>
-            <p:ph idx="1"/>
-          </p:nvPr>
-        </p:nvSpPr>
-        <p:spPr/>
-        <p:txBody>
-          <a:bodyPr/>
-          <a:lstStyle/>
-          <a:p>
-            <a:r>
-              <a:rPr lang="en-US" dirty="0" smtClean="0"/>
-              <a:t>Step 1: </a:t>
-            </a:r>
-          </a:p>
-          <a:p>
-            <a:pPr lvl="1"/>
-            <a:r>
-              <a:rPr lang="en-US" dirty="0"/>
-              <a:t>E</a:t>
-            </a:r>
-            <a:r>
-              <a:rPr lang="en-US" dirty="0" smtClean="0"/>
-              <a:t>valuated </a:t>
-            </a:r>
-            <a:r>
-              <a:rPr lang="en-US" dirty="0" err="1" smtClean="0"/>
-              <a:t>Linf</a:t>
-            </a:r>
-            <a:r>
-              <a:rPr lang="en-US" dirty="0"/>
-              <a:t> </a:t>
-            </a:r>
-            <a:r>
-              <a:rPr lang="en-US" dirty="0" smtClean="0"/>
-              <a:t>and kappa across length bin and month</a:t>
-            </a:r>
-          </a:p>
-          <a:p>
-            <a:pPr lvl="1"/>
-            <a:r>
-              <a:rPr lang="en-US" dirty="0" smtClean="0"/>
-              <a:t>Evaluated </a:t>
-            </a:r>
-            <a:r>
-              <a:rPr lang="en-US" dirty="0" err="1" smtClean="0"/>
-              <a:t>Lzero</a:t>
-            </a:r>
-            <a:r>
-              <a:rPr lang="en-US" dirty="0" smtClean="0"/>
-              <a:t> across month for 0-20 cm length bin</a:t>
-            </a:r>
-          </a:p>
-          <a:p>
-            <a:r>
-              <a:rPr lang="en-US" dirty="0" smtClean="0"/>
-              <a:t>Step 2:</a:t>
-            </a:r>
-          </a:p>
-          <a:p>
-            <a:pPr lvl="1"/>
-            <a:r>
-              <a:rPr lang="en-US" dirty="0" smtClean="0"/>
-              <a:t>Select best from Step 1, and run model with </a:t>
-            </a:r>
-            <a:r>
-              <a:rPr lang="en-US" dirty="0" err="1" smtClean="0"/>
-              <a:t>env</a:t>
-            </a:r>
-            <a:r>
-              <a:rPr lang="en-US" dirty="0" smtClean="0"/>
-              <a:t> link for all 3 growth parameters</a:t>
-            </a:r>
-          </a:p>
-          <a:p>
-            <a:r>
-              <a:rPr lang="en-US" dirty="0" smtClean="0"/>
-              <a:t>Step 3:</a:t>
-            </a:r>
-          </a:p>
-          <a:p>
-            <a:pPr lvl="1"/>
-            <a:r>
-              <a:rPr lang="en-US" dirty="0" smtClean="0"/>
-              <a:t>Compare with base model</a:t>
-            </a:r>
-          </a:p>
-          <a:p>
-            <a:pPr lvl="1"/>
-            <a:r>
-              <a:rPr lang="en-US" dirty="0" smtClean="0"/>
-              <a:t>Statistics: current year AIC and model fits, retrospective AIC and performance</a:t>
-            </a:r>
-          </a:p>
-        </p:txBody>
-      </p:sp>
-    </p:spTree>
-    <p:extLst>
-      <p:ext uri="{BB962C8B-B14F-4D97-AF65-F5344CB8AC3E}">
-        <p14:creationId xmlns:p14="http://schemas.microsoft.com/office/powerpoint/2010/main" val="1471501903"/>
-      </p:ext>
-    </p:extLst>
-  </p:cSld>
-  <p:clrMapOvr>
-    <a:masterClrMapping/>
-  </p:clrMapOvr>
-</p:sld>
-</file>
-
-<file path=ppt/slides/slide7.xml><?xml version="1.0" encoding="utf-8"?>
-<p:sld xmlns:a="http://schemas.openxmlformats.org/drawingml/2006/main" xmlns:r="http://schemas.openxmlformats.org/officeDocument/2006/relationships" xmlns:p="http://schemas.openxmlformats.org/presentationml/2006/main">
-  <p:cSld>
-    <p:spTree>
-      <p:nvGrpSpPr>
-        <p:cNvPr id="1" name=""/>
-        <p:cNvGrpSpPr/>
-        <p:nvPr/>
-      </p:nvGrpSpPr>
-      <p:grpSpPr>
-        <a:xfrm>
-          <a:off x="0" y="0"/>
-          <a:ext cx="0" cy="0"/>
-          <a:chOff x="0" y="0"/>
-          <a:chExt cx="0" cy="0"/>
-        </a:xfrm>
-      </p:grpSpPr>
-      <p:sp>
-        <p:nvSpPr>
-          <p:cNvPr id="2" name="Title 1"/>
-          <p:cNvSpPr>
-            <a:spLocks noGrp="1"/>
-          </p:cNvSpPr>
-          <p:nvPr>
-            <p:ph type="title"/>
-          </p:nvPr>
-        </p:nvSpPr>
-        <p:spPr/>
-        <p:txBody>
-          <a:bodyPr/>
-          <a:lstStyle/>
-          <a:p>
-            <a:r>
-              <a:rPr lang="en-US" dirty="0" smtClean="0"/>
-              <a:t>Link for growth</a:t>
-            </a:r>
-            <a:endParaRPr lang="en-US" dirty="0"/>
-          </a:p>
-        </p:txBody>
-      </p:sp>
-      <p:sp>
-        <p:nvSpPr>
-          <p:cNvPr id="3" name="Content Placeholder 2"/>
-          <p:cNvSpPr>
-            <a:spLocks noGrp="1"/>
-          </p:cNvSpPr>
-          <p:nvPr>
-            <p:ph idx="1"/>
-          </p:nvPr>
-        </p:nvSpPr>
-        <p:spPr/>
-        <p:txBody>
-          <a:bodyPr>
-            <a:normAutofit fontScale="92500" lnSpcReduction="10000"/>
-          </a:bodyPr>
-          <a:lstStyle/>
-          <a:p>
-            <a:r>
-              <a:rPr lang="en-US" dirty="0" smtClean="0"/>
-              <a:t>Step 1: difference in AIC with base model (</a:t>
-            </a:r>
-            <a:r>
-              <a:rPr lang="en-US" dirty="0" err="1" smtClean="0"/>
-              <a:t>EnvLnk</a:t>
-            </a:r>
-            <a:r>
-              <a:rPr lang="en-US" dirty="0" smtClean="0"/>
-              <a:t> – base, so negative number means </a:t>
-            </a:r>
-            <a:r>
-              <a:rPr lang="en-US" dirty="0" err="1" smtClean="0"/>
-              <a:t>EnvLnk</a:t>
-            </a:r>
-            <a:r>
-              <a:rPr lang="en-US" dirty="0" smtClean="0"/>
-              <a:t> model better)</a:t>
-            </a:r>
-          </a:p>
-          <a:p>
-            <a:endParaRPr lang="en-US" dirty="0"/>
-          </a:p>
-          <a:p>
-            <a:endParaRPr lang="en-US" dirty="0" smtClean="0"/>
-          </a:p>
-          <a:p>
-            <a:endParaRPr lang="en-US" dirty="0"/>
-          </a:p>
-          <a:p>
-            <a:endParaRPr lang="en-US" dirty="0" smtClean="0"/>
-          </a:p>
-          <a:p>
-            <a:endParaRPr lang="en-US" dirty="0"/>
-          </a:p>
-          <a:p>
-            <a:endParaRPr lang="en-US" dirty="0" smtClean="0"/>
-          </a:p>
-          <a:p>
-            <a:endParaRPr lang="en-US" dirty="0" smtClean="0"/>
-          </a:p>
-          <a:p>
-            <a:r>
-              <a:rPr lang="en-US" dirty="0" err="1" smtClean="0"/>
-              <a:t>Linf</a:t>
-            </a:r>
-            <a:r>
-              <a:rPr lang="en-US" dirty="0" smtClean="0"/>
-              <a:t> &gt; </a:t>
-            </a:r>
-            <a:r>
-              <a:rPr lang="en-US" dirty="0" err="1" smtClean="0"/>
-              <a:t>Lzero</a:t>
-            </a:r>
-            <a:r>
-              <a:rPr lang="en-US" dirty="0" smtClean="0"/>
-              <a:t> &gt; kappa for model improvement</a:t>
-            </a:r>
-          </a:p>
-        </p:txBody>
-      </p:sp>
-      <p:pic>
-        <p:nvPicPr>
-          <p:cNvPr id="5" name="Picture 4"/>
-          <p:cNvPicPr>
-            <a:picLocks noChangeAspect="1"/>
-          </p:cNvPicPr>
-          <p:nvPr/>
-        </p:nvPicPr>
-        <p:blipFill>
-          <a:blip r:embed="rId2"/>
-          <a:stretch>
-            <a:fillRect/>
-          </a:stretch>
-        </p:blipFill>
-        <p:spPr>
-          <a:xfrm>
-            <a:off x="962273" y="2931721"/>
-            <a:ext cx="3676650" cy="2514600"/>
-          </a:xfrm>
-          <a:prstGeom prst="rect">
-            <a:avLst/>
-          </a:prstGeom>
-        </p:spPr>
-      </p:pic>
-      <p:pic>
-        <p:nvPicPr>
-          <p:cNvPr id="6" name="Picture 5"/>
-          <p:cNvPicPr>
-            <a:picLocks noChangeAspect="1"/>
-          </p:cNvPicPr>
-          <p:nvPr/>
-        </p:nvPicPr>
-        <p:blipFill>
-          <a:blip r:embed="rId3"/>
-          <a:stretch>
-            <a:fillRect/>
-          </a:stretch>
-        </p:blipFill>
-        <p:spPr>
-          <a:xfrm>
-            <a:off x="5094268" y="2931721"/>
-            <a:ext cx="3676650" cy="2514600"/>
-          </a:xfrm>
-          <a:prstGeom prst="rect">
-            <a:avLst/>
-          </a:prstGeom>
-        </p:spPr>
-      </p:pic>
-      <p:pic>
-        <p:nvPicPr>
-          <p:cNvPr id="7" name="Picture 6"/>
-          <p:cNvPicPr>
-            <a:picLocks noChangeAspect="1"/>
-          </p:cNvPicPr>
-          <p:nvPr/>
-        </p:nvPicPr>
-        <p:blipFill>
-          <a:blip r:embed="rId4"/>
-          <a:stretch>
-            <a:fillRect/>
-          </a:stretch>
-        </p:blipFill>
-        <p:spPr>
-          <a:xfrm>
-            <a:off x="9443234" y="2931721"/>
-            <a:ext cx="1238250" cy="2514600"/>
-          </a:xfrm>
-          <a:prstGeom prst="rect">
-            <a:avLst/>
-          </a:prstGeom>
-        </p:spPr>
-      </p:pic>
-    </p:spTree>
-    <p:extLst>
-      <p:ext uri="{BB962C8B-B14F-4D97-AF65-F5344CB8AC3E}">
-        <p14:creationId xmlns:p14="http://schemas.microsoft.com/office/powerpoint/2010/main" val="3079657574"/>
-      </p:ext>
-    </p:extLst>
-  </p:cSld>
-  <p:clrMapOvr>
-    <a:masterClrMapping/>
-  </p:clrMapOvr>
-</p:sld>
-</file>
-
-<file path=ppt/slides/slide8.xml><?xml version="1.0" encoding="utf-8"?>
+<file path=ppt/slides/slide10.xml><?xml version="1.0" encoding="utf-8"?>
 <p:sld xmlns:a="http://schemas.openxmlformats.org/drawingml/2006/main" xmlns:r="http://schemas.openxmlformats.org/officeDocument/2006/relationships" xmlns:p="http://schemas.openxmlformats.org/presentationml/2006/main">
   <p:cSld>
     <p:spTree>
@@ -4351,7 +3227,7 @@
 </p:sld>
 </file>
 
-<file path=ppt/slides/slide9.xml><?xml version="1.0" encoding="utf-8"?>
+<file path=ppt/slides/slide11.xml><?xml version="1.0" encoding="utf-8"?>
 <p:sld xmlns:a="http://schemas.openxmlformats.org/drawingml/2006/main" xmlns:r="http://schemas.openxmlformats.org/officeDocument/2006/relationships" xmlns:p="http://schemas.openxmlformats.org/presentationml/2006/main">
   <p:cSld>
     <p:spTree>
@@ -4484,6 +3360,1383 @@
     <p:extLst>
       <p:ext uri="{BB962C8B-B14F-4D97-AF65-F5344CB8AC3E}">
         <p14:creationId xmlns:p14="http://schemas.microsoft.com/office/powerpoint/2010/main" val="3405314964"/>
+      </p:ext>
+    </p:extLst>
+  </p:cSld>
+  <p:clrMapOvr>
+    <a:masterClrMapping/>
+  </p:clrMapOvr>
+</p:sld>
+</file>
+
+<file path=ppt/slides/slide2.xml><?xml version="1.0" encoding="utf-8"?>
+<p:sld xmlns:a="http://schemas.openxmlformats.org/drawingml/2006/main" xmlns:r="http://schemas.openxmlformats.org/officeDocument/2006/relationships" xmlns:p="http://schemas.openxmlformats.org/presentationml/2006/main">
+  <p:cSld>
+    <p:spTree>
+      <p:nvGrpSpPr>
+        <p:cNvPr id="1" name=""/>
+        <p:cNvGrpSpPr/>
+        <p:nvPr/>
+      </p:nvGrpSpPr>
+      <p:grpSpPr>
+        <a:xfrm>
+          <a:off x="0" y="0"/>
+          <a:ext cx="0" cy="0"/>
+          <a:chOff x="0" y="0"/>
+          <a:chExt cx="0" cy="0"/>
+        </a:xfrm>
+      </p:grpSpPr>
+      <p:sp>
+        <p:nvSpPr>
+          <p:cNvPr id="2" name="Title 1"/>
+          <p:cNvSpPr>
+            <a:spLocks noGrp="1"/>
+          </p:cNvSpPr>
+          <p:nvPr>
+            <p:ph type="title"/>
+          </p:nvPr>
+        </p:nvSpPr>
+        <p:spPr/>
+        <p:txBody>
+          <a:bodyPr/>
+          <a:lstStyle/>
+          <a:p>
+            <a:r>
+              <a:rPr lang="en-US" dirty="0" smtClean="0"/>
+              <a:t>Overview</a:t>
+            </a:r>
+            <a:endParaRPr lang="en-US" dirty="0"/>
+          </a:p>
+        </p:txBody>
+      </p:sp>
+      <p:sp>
+        <p:nvSpPr>
+          <p:cNvPr id="3" name="Content Placeholder 2"/>
+          <p:cNvSpPr>
+            <a:spLocks noGrp="1"/>
+          </p:cNvSpPr>
+          <p:nvPr>
+            <p:ph idx="1"/>
+          </p:nvPr>
+        </p:nvSpPr>
+        <p:spPr/>
+        <p:txBody>
+          <a:bodyPr>
+            <a:normAutofit lnSpcReduction="10000"/>
+          </a:bodyPr>
+          <a:lstStyle/>
+          <a:p>
+            <a:r>
+              <a:rPr lang="en-US" dirty="0" smtClean="0"/>
+              <a:t>Housecleaning (</a:t>
+            </a:r>
+            <a:r>
+              <a:rPr lang="en-US" dirty="0" err="1" smtClean="0"/>
+              <a:t>minsamplesize</a:t>
+            </a:r>
+            <a:r>
+              <a:rPr lang="en-US" dirty="0" smtClean="0"/>
+              <a:t>)</a:t>
+            </a:r>
+          </a:p>
+          <a:p>
+            <a:r>
+              <a:rPr lang="en-US" dirty="0" smtClean="0"/>
+              <a:t>Environmental link</a:t>
+            </a:r>
+          </a:p>
+          <a:p>
+            <a:pPr lvl="1"/>
+            <a:r>
+              <a:rPr lang="en-US" dirty="0" smtClean="0"/>
+              <a:t>Description of environmental </a:t>
+            </a:r>
+            <a:r>
+              <a:rPr lang="en-US" dirty="0" smtClean="0"/>
+              <a:t>index</a:t>
+            </a:r>
+          </a:p>
+          <a:p>
+            <a:r>
+              <a:rPr lang="en-US" dirty="0"/>
+              <a:t>Link for LL survey q</a:t>
+            </a:r>
+          </a:p>
+          <a:p>
+            <a:pPr lvl="1"/>
+            <a:r>
+              <a:rPr lang="en-US" dirty="0"/>
+              <a:t>Retrospective comparison w/ and w/o link</a:t>
+            </a:r>
+          </a:p>
+          <a:p>
+            <a:pPr lvl="1"/>
+            <a:r>
+              <a:rPr lang="en-US" dirty="0"/>
+              <a:t>Evaluation of new </a:t>
+            </a:r>
+            <a:r>
+              <a:rPr lang="en-US" dirty="0" smtClean="0"/>
+              <a:t>index</a:t>
+            </a:r>
+            <a:endParaRPr lang="en-US" dirty="0" smtClean="0"/>
+          </a:p>
+          <a:p>
+            <a:r>
+              <a:rPr lang="en-US" dirty="0" smtClean="0"/>
+              <a:t>Link for growth</a:t>
+            </a:r>
+          </a:p>
+          <a:p>
+            <a:pPr lvl="1"/>
+            <a:r>
+              <a:rPr lang="en-US" dirty="0" smtClean="0"/>
+              <a:t>Individual parameters: determining index</a:t>
+            </a:r>
+          </a:p>
+          <a:p>
+            <a:pPr lvl="1"/>
+            <a:r>
+              <a:rPr lang="en-US" dirty="0" smtClean="0"/>
+              <a:t>Combined </a:t>
+            </a:r>
+            <a:r>
+              <a:rPr lang="en-US" dirty="0" smtClean="0"/>
+              <a:t>model &amp; </a:t>
+            </a:r>
+            <a:r>
+              <a:rPr lang="en-US" dirty="0"/>
+              <a:t>c</a:t>
+            </a:r>
+            <a:r>
+              <a:rPr lang="en-US" dirty="0" smtClean="0"/>
+              <a:t>omparisons </a:t>
+            </a:r>
+            <a:r>
+              <a:rPr lang="en-US" dirty="0" smtClean="0"/>
+              <a:t>with base </a:t>
+            </a:r>
+            <a:r>
+              <a:rPr lang="en-US" dirty="0" smtClean="0"/>
+              <a:t>model</a:t>
+            </a:r>
+          </a:p>
+          <a:p>
+            <a:pPr lvl="1"/>
+            <a:r>
+              <a:rPr lang="en-US" dirty="0" smtClean="0"/>
+              <a:t>Path forward</a:t>
+            </a:r>
+            <a:endParaRPr lang="en-US" dirty="0" smtClean="0"/>
+          </a:p>
+        </p:txBody>
+      </p:sp>
+    </p:spTree>
+    <p:extLst>
+      <p:ext uri="{BB962C8B-B14F-4D97-AF65-F5344CB8AC3E}">
+        <p14:creationId xmlns:p14="http://schemas.microsoft.com/office/powerpoint/2010/main" val="1519735260"/>
+      </p:ext>
+    </p:extLst>
+  </p:cSld>
+  <p:clrMapOvr>
+    <a:masterClrMapping/>
+  </p:clrMapOvr>
+</p:sld>
+</file>
+
+<file path=ppt/slides/slide3.xml><?xml version="1.0" encoding="utf-8"?>
+<p:sld xmlns:a="http://schemas.openxmlformats.org/drawingml/2006/main" xmlns:r="http://schemas.openxmlformats.org/officeDocument/2006/relationships" xmlns:p="http://schemas.openxmlformats.org/presentationml/2006/main">
+  <p:cSld>
+    <p:spTree>
+      <p:nvGrpSpPr>
+        <p:cNvPr id="1" name=""/>
+        <p:cNvGrpSpPr/>
+        <p:nvPr/>
+      </p:nvGrpSpPr>
+      <p:grpSpPr>
+        <a:xfrm>
+          <a:off x="0" y="0"/>
+          <a:ext cx="0" cy="0"/>
+          <a:chOff x="0" y="0"/>
+          <a:chExt cx="0" cy="0"/>
+        </a:xfrm>
+      </p:grpSpPr>
+      <p:sp>
+        <p:nvSpPr>
+          <p:cNvPr id="2" name="Title 1"/>
+          <p:cNvSpPr>
+            <a:spLocks noGrp="1"/>
+          </p:cNvSpPr>
+          <p:nvPr>
+            <p:ph type="title"/>
+          </p:nvPr>
+        </p:nvSpPr>
+        <p:spPr/>
+        <p:txBody>
+          <a:bodyPr/>
+          <a:lstStyle/>
+          <a:p>
+            <a:r>
+              <a:rPr lang="en-US" dirty="0" smtClean="0"/>
+              <a:t>Housecleaning:</a:t>
+            </a:r>
+            <a:endParaRPr lang="en-US" dirty="0"/>
+          </a:p>
+        </p:txBody>
+      </p:sp>
+      <p:sp>
+        <p:nvSpPr>
+          <p:cNvPr id="3" name="Content Placeholder 2"/>
+          <p:cNvSpPr>
+            <a:spLocks noGrp="1"/>
+          </p:cNvSpPr>
+          <p:nvPr>
+            <p:ph idx="1"/>
+          </p:nvPr>
+        </p:nvSpPr>
+        <p:spPr>
+          <a:xfrm>
+            <a:off x="838200" y="1825625"/>
+            <a:ext cx="6589816" cy="4351338"/>
+          </a:xfrm>
+        </p:spPr>
+        <p:txBody>
+          <a:bodyPr/>
+          <a:lstStyle/>
+          <a:p>
+            <a:r>
+              <a:rPr lang="en-US" dirty="0" smtClean="0"/>
+              <a:t>Minimum sample </a:t>
+            </a:r>
+            <a:r>
+              <a:rPr lang="en-US" dirty="0" smtClean="0"/>
+              <a:t>size </a:t>
+            </a:r>
+            <a:r>
+              <a:rPr lang="en-US" dirty="0" smtClean="0"/>
+              <a:t>issue</a:t>
+            </a:r>
+          </a:p>
+          <a:p>
+            <a:pPr lvl="1"/>
+            <a:r>
+              <a:rPr lang="en-US" dirty="0" smtClean="0"/>
+              <a:t>Removed CAAL data with minimum sample size less than 1 (i.e., weight)</a:t>
+            </a:r>
+          </a:p>
+          <a:p>
+            <a:pPr lvl="1"/>
+            <a:r>
+              <a:rPr lang="en-US" dirty="0" smtClean="0"/>
+              <a:t>1,812 of 2,825 CAAL rows (mostly the small/large fish)</a:t>
+            </a:r>
+            <a:endParaRPr lang="en-US" dirty="0" smtClean="0"/>
+          </a:p>
+          <a:p>
+            <a:r>
+              <a:rPr lang="en-US" dirty="0" smtClean="0"/>
+              <a:t>Likelihoods</a:t>
+            </a:r>
+          </a:p>
+        </p:txBody>
+      </p:sp>
+      <p:pic>
+        <p:nvPicPr>
+          <p:cNvPr id="7" name="Picture 6"/>
+          <p:cNvPicPr>
+            <a:picLocks noChangeAspect="1"/>
+          </p:cNvPicPr>
+          <p:nvPr/>
+        </p:nvPicPr>
+        <p:blipFill>
+          <a:blip r:embed="rId2"/>
+          <a:stretch>
+            <a:fillRect/>
+          </a:stretch>
+        </p:blipFill>
+        <p:spPr>
+          <a:xfrm>
+            <a:off x="1183634" y="4303291"/>
+            <a:ext cx="2619375" cy="2305050"/>
+          </a:xfrm>
+          <a:prstGeom prst="rect">
+            <a:avLst/>
+          </a:prstGeom>
+        </p:spPr>
+      </p:pic>
+      <p:pic>
+        <p:nvPicPr>
+          <p:cNvPr id="8" name="Picture 7"/>
+          <p:cNvPicPr>
+            <a:picLocks noChangeAspect="1"/>
+          </p:cNvPicPr>
+          <p:nvPr/>
+        </p:nvPicPr>
+        <p:blipFill>
+          <a:blip r:embed="rId3"/>
+          <a:stretch>
+            <a:fillRect/>
+          </a:stretch>
+        </p:blipFill>
+        <p:spPr>
+          <a:xfrm>
+            <a:off x="4240912" y="4303291"/>
+            <a:ext cx="2143125" cy="1162050"/>
+          </a:xfrm>
+          <a:prstGeom prst="rect">
+            <a:avLst/>
+          </a:prstGeom>
+        </p:spPr>
+      </p:pic>
+      <p:pic>
+        <p:nvPicPr>
+          <p:cNvPr id="4" name="Picture 3"/>
+          <p:cNvPicPr>
+            <a:picLocks noChangeAspect="1"/>
+          </p:cNvPicPr>
+          <p:nvPr/>
+        </p:nvPicPr>
+        <p:blipFill rotWithShape="1">
+          <a:blip r:embed="rId4" cstate="print">
+            <a:extLst>
+              <a:ext uri="{28A0092B-C50C-407E-A947-70E740481C1C}">
+                <a14:useLocalDpi xmlns:a14="http://schemas.microsoft.com/office/drawing/2010/main" val="0"/>
+              </a:ext>
+            </a:extLst>
+          </a:blip>
+          <a:srcRect t="5794" b="26273"/>
+          <a:stretch/>
+        </p:blipFill>
+        <p:spPr>
+          <a:xfrm>
+            <a:off x="7428016" y="280466"/>
+            <a:ext cx="4549139" cy="3090318"/>
+          </a:xfrm>
+          <a:prstGeom prst="rect">
+            <a:avLst/>
+          </a:prstGeom>
+        </p:spPr>
+      </p:pic>
+      <p:pic>
+        <p:nvPicPr>
+          <p:cNvPr id="5" name="Picture 4"/>
+          <p:cNvPicPr>
+            <a:picLocks noChangeAspect="1"/>
+          </p:cNvPicPr>
+          <p:nvPr/>
+        </p:nvPicPr>
+        <p:blipFill rotWithShape="1">
+          <a:blip r:embed="rId5" cstate="print">
+            <a:extLst>
+              <a:ext uri="{28A0092B-C50C-407E-A947-70E740481C1C}">
+                <a14:useLocalDpi xmlns:a14="http://schemas.microsoft.com/office/drawing/2010/main" val="0"/>
+              </a:ext>
+            </a:extLst>
+          </a:blip>
+          <a:srcRect t="5794" b="27473"/>
+          <a:stretch/>
+        </p:blipFill>
+        <p:spPr>
+          <a:xfrm>
+            <a:off x="7428016" y="3722266"/>
+            <a:ext cx="4549139" cy="3035784"/>
+          </a:xfrm>
+          <a:prstGeom prst="rect">
+            <a:avLst/>
+          </a:prstGeom>
+        </p:spPr>
+      </p:pic>
+      <p:sp>
+        <p:nvSpPr>
+          <p:cNvPr id="6" name="TextBox 5"/>
+          <p:cNvSpPr txBox="1"/>
+          <p:nvPr/>
+        </p:nvSpPr>
+        <p:spPr>
+          <a:xfrm>
+            <a:off x="9286949" y="-4207"/>
+            <a:ext cx="938077" cy="369332"/>
+          </a:xfrm>
+          <a:prstGeom prst="rect">
+            <a:avLst/>
+          </a:prstGeom>
+          <a:noFill/>
+        </p:spPr>
+        <p:txBody>
+          <a:bodyPr wrap="none" rtlCol="0">
+            <a:spAutoFit/>
+          </a:bodyPr>
+          <a:lstStyle/>
+          <a:p>
+            <a:r>
+              <a:rPr lang="en-US" dirty="0" smtClean="0"/>
+              <a:t>2019.1a</a:t>
+            </a:r>
+            <a:endParaRPr lang="en-US" dirty="0"/>
+          </a:p>
+        </p:txBody>
+      </p:sp>
+      <p:sp>
+        <p:nvSpPr>
+          <p:cNvPr id="17" name="TextBox 16"/>
+          <p:cNvSpPr txBox="1"/>
+          <p:nvPr/>
+        </p:nvSpPr>
+        <p:spPr>
+          <a:xfrm>
+            <a:off x="9286949" y="3352934"/>
+            <a:ext cx="949299" cy="369332"/>
+          </a:xfrm>
+          <a:prstGeom prst="rect">
+            <a:avLst/>
+          </a:prstGeom>
+          <a:noFill/>
+        </p:spPr>
+        <p:txBody>
+          <a:bodyPr wrap="none" rtlCol="0">
+            <a:spAutoFit/>
+          </a:bodyPr>
+          <a:lstStyle/>
+          <a:p>
+            <a:r>
+              <a:rPr lang="en-US" dirty="0" smtClean="0"/>
+              <a:t>2019.1b</a:t>
+            </a:r>
+            <a:endParaRPr lang="en-US" dirty="0"/>
+          </a:p>
+        </p:txBody>
+      </p:sp>
+    </p:spTree>
+    <p:extLst>
+      <p:ext uri="{BB962C8B-B14F-4D97-AF65-F5344CB8AC3E}">
+        <p14:creationId xmlns:p14="http://schemas.microsoft.com/office/powerpoint/2010/main" val="553458133"/>
+      </p:ext>
+    </p:extLst>
+  </p:cSld>
+  <p:clrMapOvr>
+    <a:masterClrMapping/>
+  </p:clrMapOvr>
+</p:sld>
+</file>
+
+<file path=ppt/slides/slide4.xml><?xml version="1.0" encoding="utf-8"?>
+<p:sld xmlns:a="http://schemas.openxmlformats.org/drawingml/2006/main" xmlns:r="http://schemas.openxmlformats.org/officeDocument/2006/relationships" xmlns:p="http://schemas.openxmlformats.org/presentationml/2006/main">
+  <p:cSld>
+    <p:spTree>
+      <p:nvGrpSpPr>
+        <p:cNvPr id="1" name=""/>
+        <p:cNvGrpSpPr/>
+        <p:nvPr/>
+      </p:nvGrpSpPr>
+      <p:grpSpPr>
+        <a:xfrm>
+          <a:off x="0" y="0"/>
+          <a:ext cx="0" cy="0"/>
+          <a:chOff x="0" y="0"/>
+          <a:chExt cx="0" cy="0"/>
+        </a:xfrm>
+      </p:grpSpPr>
+      <p:sp>
+        <p:nvSpPr>
+          <p:cNvPr id="2" name="Title 1"/>
+          <p:cNvSpPr>
+            <a:spLocks noGrp="1"/>
+          </p:cNvSpPr>
+          <p:nvPr>
+            <p:ph type="title"/>
+          </p:nvPr>
+        </p:nvSpPr>
+        <p:spPr/>
+        <p:txBody>
+          <a:bodyPr/>
+          <a:lstStyle/>
+          <a:p>
+            <a:r>
+              <a:rPr lang="en-US" dirty="0" smtClean="0"/>
+              <a:t>Housecleaning</a:t>
+            </a:r>
+            <a:endParaRPr lang="en-US" dirty="0"/>
+          </a:p>
+        </p:txBody>
+      </p:sp>
+      <p:sp>
+        <p:nvSpPr>
+          <p:cNvPr id="3" name="Content Placeholder 2"/>
+          <p:cNvSpPr>
+            <a:spLocks noGrp="1"/>
+          </p:cNvSpPr>
+          <p:nvPr>
+            <p:ph idx="1"/>
+          </p:nvPr>
+        </p:nvSpPr>
+        <p:spPr/>
+        <p:txBody>
+          <a:bodyPr/>
+          <a:lstStyle/>
+          <a:p>
+            <a:r>
+              <a:rPr lang="en-US" dirty="0" smtClean="0"/>
+              <a:t>This </a:t>
+            </a:r>
+            <a:r>
+              <a:rPr lang="en-US" dirty="0" smtClean="0"/>
+              <a:t>is new base model from here </a:t>
+            </a:r>
+            <a:r>
+              <a:rPr lang="en-US" dirty="0" smtClean="0"/>
+              <a:t>out (2019.1b)</a:t>
+            </a:r>
+            <a:endParaRPr lang="en-US" dirty="0"/>
+          </a:p>
+        </p:txBody>
+      </p:sp>
+      <p:pic>
+        <p:nvPicPr>
+          <p:cNvPr id="4" name="Picture 3"/>
+          <p:cNvPicPr>
+            <a:picLocks noChangeAspect="1"/>
+          </p:cNvPicPr>
+          <p:nvPr/>
+        </p:nvPicPr>
+        <p:blipFill>
+          <a:blip r:embed="rId2" cstate="print">
+            <a:extLst>
+              <a:ext uri="{28A0092B-C50C-407E-A947-70E740481C1C}">
+                <a14:useLocalDpi xmlns:a14="http://schemas.microsoft.com/office/drawing/2010/main" val="0"/>
+              </a:ext>
+            </a:extLst>
+          </a:blip>
+          <a:stretch>
+            <a:fillRect/>
+          </a:stretch>
+        </p:blipFill>
+        <p:spPr>
+          <a:xfrm>
+            <a:off x="2060172" y="2756869"/>
+            <a:ext cx="4446122" cy="3420094"/>
+          </a:xfrm>
+          <a:prstGeom prst="rect">
+            <a:avLst/>
+          </a:prstGeom>
+        </p:spPr>
+      </p:pic>
+      <p:pic>
+        <p:nvPicPr>
+          <p:cNvPr id="5" name="Picture 4"/>
+          <p:cNvPicPr>
+            <a:picLocks noChangeAspect="1"/>
+          </p:cNvPicPr>
+          <p:nvPr/>
+        </p:nvPicPr>
+        <p:blipFill>
+          <a:blip r:embed="rId3" cstate="print">
+            <a:extLst>
+              <a:ext uri="{28A0092B-C50C-407E-A947-70E740481C1C}">
+                <a14:useLocalDpi xmlns:a14="http://schemas.microsoft.com/office/drawing/2010/main" val="0"/>
+              </a:ext>
+            </a:extLst>
+          </a:blip>
+          <a:stretch>
+            <a:fillRect/>
+          </a:stretch>
+        </p:blipFill>
+        <p:spPr>
+          <a:xfrm>
+            <a:off x="8075195" y="365125"/>
+            <a:ext cx="3827632" cy="2944332"/>
+          </a:xfrm>
+          <a:prstGeom prst="rect">
+            <a:avLst/>
+          </a:prstGeom>
+        </p:spPr>
+      </p:pic>
+      <p:pic>
+        <p:nvPicPr>
+          <p:cNvPr id="6" name="Picture 5"/>
+          <p:cNvPicPr>
+            <a:picLocks noChangeAspect="1"/>
+          </p:cNvPicPr>
+          <p:nvPr/>
+        </p:nvPicPr>
+        <p:blipFill>
+          <a:blip r:embed="rId4" cstate="print">
+            <a:extLst>
+              <a:ext uri="{28A0092B-C50C-407E-A947-70E740481C1C}">
+                <a14:useLocalDpi xmlns:a14="http://schemas.microsoft.com/office/drawing/2010/main" val="0"/>
+              </a:ext>
+            </a:extLst>
+          </a:blip>
+          <a:stretch>
+            <a:fillRect/>
+          </a:stretch>
+        </p:blipFill>
+        <p:spPr>
+          <a:xfrm>
+            <a:off x="8075195" y="3497283"/>
+            <a:ext cx="3827632" cy="2944332"/>
+          </a:xfrm>
+          <a:prstGeom prst="rect">
+            <a:avLst/>
+          </a:prstGeom>
+        </p:spPr>
+      </p:pic>
+    </p:spTree>
+    <p:extLst>
+      <p:ext uri="{BB962C8B-B14F-4D97-AF65-F5344CB8AC3E}">
+        <p14:creationId xmlns:p14="http://schemas.microsoft.com/office/powerpoint/2010/main" val="1853197434"/>
+      </p:ext>
+    </p:extLst>
+  </p:cSld>
+  <p:clrMapOvr>
+    <a:masterClrMapping/>
+  </p:clrMapOvr>
+</p:sld>
+</file>
+
+<file path=ppt/slides/slide5.xml><?xml version="1.0" encoding="utf-8"?>
+<p:sld xmlns:a="http://schemas.openxmlformats.org/drawingml/2006/main" xmlns:r="http://schemas.openxmlformats.org/officeDocument/2006/relationships" xmlns:p="http://schemas.openxmlformats.org/presentationml/2006/main">
+  <p:cSld>
+    <p:spTree>
+      <p:nvGrpSpPr>
+        <p:cNvPr id="1" name=""/>
+        <p:cNvGrpSpPr/>
+        <p:nvPr/>
+      </p:nvGrpSpPr>
+      <p:grpSpPr>
+        <a:xfrm>
+          <a:off x="0" y="0"/>
+          <a:ext cx="0" cy="0"/>
+          <a:chOff x="0" y="0"/>
+          <a:chExt cx="0" cy="0"/>
+        </a:xfrm>
+      </p:grpSpPr>
+      <p:sp>
+        <p:nvSpPr>
+          <p:cNvPr id="2" name="Title 1"/>
+          <p:cNvSpPr>
+            <a:spLocks noGrp="1"/>
+          </p:cNvSpPr>
+          <p:nvPr>
+            <p:ph type="title"/>
+          </p:nvPr>
+        </p:nvSpPr>
+        <p:spPr/>
+        <p:txBody>
+          <a:bodyPr/>
+          <a:lstStyle/>
+          <a:p>
+            <a:r>
+              <a:rPr lang="en-US" dirty="0" smtClean="0"/>
+              <a:t>Environmental link</a:t>
+            </a:r>
+            <a:endParaRPr lang="en-US" dirty="0"/>
+          </a:p>
+        </p:txBody>
+      </p:sp>
+      <p:sp>
+        <p:nvSpPr>
+          <p:cNvPr id="3" name="Content Placeholder 2"/>
+          <p:cNvSpPr>
+            <a:spLocks noGrp="1"/>
+          </p:cNvSpPr>
+          <p:nvPr>
+            <p:ph idx="1"/>
+          </p:nvPr>
+        </p:nvSpPr>
+        <p:spPr/>
+        <p:txBody>
+          <a:bodyPr/>
+          <a:lstStyle/>
+          <a:p>
+            <a:r>
+              <a:rPr lang="en-US" dirty="0" smtClean="0"/>
+              <a:t>Description of </a:t>
+            </a:r>
+            <a:r>
+              <a:rPr lang="en-US" dirty="0" err="1" smtClean="0"/>
+              <a:t>cfsr</a:t>
+            </a:r>
+            <a:endParaRPr lang="en-US" dirty="0" smtClean="0"/>
+          </a:p>
+          <a:p>
+            <a:r>
+              <a:rPr lang="en-US" dirty="0" smtClean="0"/>
+              <a:t>Available by length bin and month</a:t>
+            </a:r>
+            <a:endParaRPr lang="en-US" dirty="0"/>
+          </a:p>
+        </p:txBody>
+      </p:sp>
+    </p:spTree>
+    <p:extLst>
+      <p:ext uri="{BB962C8B-B14F-4D97-AF65-F5344CB8AC3E}">
+        <p14:creationId xmlns:p14="http://schemas.microsoft.com/office/powerpoint/2010/main" val="89867169"/>
+      </p:ext>
+    </p:extLst>
+  </p:cSld>
+  <p:clrMapOvr>
+    <a:masterClrMapping/>
+  </p:clrMapOvr>
+</p:sld>
+</file>
+
+<file path=ppt/slides/slide6.xml><?xml version="1.0" encoding="utf-8"?>
+<p:sld xmlns:a="http://schemas.openxmlformats.org/drawingml/2006/main" xmlns:r="http://schemas.openxmlformats.org/officeDocument/2006/relationships" xmlns:p="http://schemas.openxmlformats.org/presentationml/2006/main">
+  <p:cSld>
+    <p:spTree>
+      <p:nvGrpSpPr>
+        <p:cNvPr id="1" name=""/>
+        <p:cNvGrpSpPr/>
+        <p:nvPr/>
+      </p:nvGrpSpPr>
+      <p:grpSpPr>
+        <a:xfrm>
+          <a:off x="0" y="0"/>
+          <a:ext cx="0" cy="0"/>
+          <a:chOff x="0" y="0"/>
+          <a:chExt cx="0" cy="0"/>
+        </a:xfrm>
+      </p:grpSpPr>
+      <p:sp>
+        <p:nvSpPr>
+          <p:cNvPr id="2" name="Title 1"/>
+          <p:cNvSpPr>
+            <a:spLocks noGrp="1"/>
+          </p:cNvSpPr>
+          <p:nvPr>
+            <p:ph type="title"/>
+          </p:nvPr>
+        </p:nvSpPr>
+        <p:spPr/>
+        <p:txBody>
+          <a:bodyPr/>
+          <a:lstStyle/>
+          <a:p>
+            <a:r>
+              <a:rPr lang="en-US" dirty="0" smtClean="0"/>
+              <a:t>Link for </a:t>
+            </a:r>
+            <a:r>
+              <a:rPr lang="en-US" dirty="0" smtClean="0"/>
+              <a:t>LL survey</a:t>
+            </a:r>
+            <a:endParaRPr lang="en-US" dirty="0"/>
+          </a:p>
+        </p:txBody>
+      </p:sp>
+      <p:sp>
+        <p:nvSpPr>
+          <p:cNvPr id="3" name="Content Placeholder 2"/>
+          <p:cNvSpPr>
+            <a:spLocks noGrp="1"/>
+          </p:cNvSpPr>
+          <p:nvPr>
+            <p:ph idx="1"/>
+          </p:nvPr>
+        </p:nvSpPr>
+        <p:spPr/>
+        <p:txBody>
+          <a:bodyPr>
+            <a:normAutofit/>
+          </a:bodyPr>
+          <a:lstStyle/>
+          <a:p>
+            <a:r>
+              <a:rPr lang="en-US" dirty="0" smtClean="0"/>
+              <a:t>SSC request to evaluate whether link still appropriate</a:t>
+            </a:r>
+          </a:p>
+          <a:p>
+            <a:r>
+              <a:rPr lang="en-US" dirty="0" smtClean="0"/>
+              <a:t>Construct model with no </a:t>
+            </a:r>
+            <a:r>
+              <a:rPr lang="en-US" dirty="0" err="1" smtClean="0"/>
+              <a:t>env</a:t>
+            </a:r>
+            <a:r>
+              <a:rPr lang="en-US" dirty="0" smtClean="0"/>
+              <a:t> link to LL survey q (2019.1c)</a:t>
+            </a:r>
+          </a:p>
+          <a:p>
+            <a:r>
+              <a:rPr lang="en-US" dirty="0" smtClean="0"/>
+              <a:t>Added... re-evaluate </a:t>
+            </a:r>
+            <a:r>
+              <a:rPr lang="en-US" dirty="0" err="1" smtClean="0"/>
+              <a:t>cfsr</a:t>
+            </a:r>
+            <a:r>
+              <a:rPr lang="en-US" dirty="0" smtClean="0"/>
+              <a:t> index used</a:t>
+            </a:r>
+            <a:endParaRPr lang="en-US" dirty="0"/>
+          </a:p>
+          <a:p>
+            <a:pPr lvl="1"/>
+            <a:r>
+              <a:rPr lang="en-US" dirty="0" smtClean="0"/>
+              <a:t>Step </a:t>
+            </a:r>
+            <a:r>
+              <a:rPr lang="en-US" dirty="0" smtClean="0"/>
+              <a:t>1: </a:t>
+            </a:r>
+            <a:r>
+              <a:rPr lang="en-US" dirty="0" smtClean="0"/>
+              <a:t>Evaluated q across </a:t>
+            </a:r>
+            <a:r>
+              <a:rPr lang="en-US" dirty="0" smtClean="0"/>
+              <a:t>length bin and </a:t>
+            </a:r>
+            <a:r>
+              <a:rPr lang="en-US" dirty="0" smtClean="0"/>
+              <a:t>month</a:t>
+            </a:r>
+          </a:p>
+          <a:p>
+            <a:pPr lvl="1"/>
+            <a:r>
+              <a:rPr lang="en-US" dirty="0" smtClean="0"/>
+              <a:t>Step 2: best </a:t>
+            </a:r>
+            <a:r>
+              <a:rPr lang="en-US" dirty="0" smtClean="0"/>
+              <a:t>from Step </a:t>
+            </a:r>
+            <a:r>
+              <a:rPr lang="en-US" dirty="0" smtClean="0"/>
+              <a:t>1 as new </a:t>
+            </a:r>
+            <a:r>
+              <a:rPr lang="en-US" dirty="0" err="1" smtClean="0"/>
+              <a:t>env</a:t>
+            </a:r>
+            <a:r>
+              <a:rPr lang="en-US" dirty="0" smtClean="0"/>
+              <a:t> link model (2019.1d), </a:t>
+            </a:r>
+            <a:r>
+              <a:rPr lang="en-US" dirty="0" smtClean="0"/>
+              <a:t>and run model with </a:t>
+            </a:r>
+            <a:r>
+              <a:rPr lang="en-US" dirty="0" err="1" smtClean="0"/>
+              <a:t>env</a:t>
+            </a:r>
+            <a:r>
+              <a:rPr lang="en-US" dirty="0" smtClean="0"/>
+              <a:t> link for all 3 growth parameters</a:t>
+            </a:r>
+          </a:p>
+          <a:p>
+            <a:r>
+              <a:rPr lang="en-US" dirty="0" smtClean="0"/>
+              <a:t>Statistics</a:t>
+            </a:r>
+            <a:r>
+              <a:rPr lang="en-US" dirty="0" smtClean="0"/>
+              <a:t>: current year AIC and model fits, retrospective AIC and performance</a:t>
+            </a:r>
+          </a:p>
+        </p:txBody>
+      </p:sp>
+    </p:spTree>
+    <p:extLst>
+      <p:ext uri="{BB962C8B-B14F-4D97-AF65-F5344CB8AC3E}">
+        <p14:creationId xmlns:p14="http://schemas.microsoft.com/office/powerpoint/2010/main" val="1471501903"/>
+      </p:ext>
+    </p:extLst>
+  </p:cSld>
+  <p:clrMapOvr>
+    <a:masterClrMapping/>
+  </p:clrMapOvr>
+</p:sld>
+</file>
+
+<file path=ppt/slides/slide7.xml><?xml version="1.0" encoding="utf-8"?>
+<p:sld xmlns:a="http://schemas.openxmlformats.org/drawingml/2006/main" xmlns:r="http://schemas.openxmlformats.org/officeDocument/2006/relationships" xmlns:p="http://schemas.openxmlformats.org/presentationml/2006/main">
+  <p:cSld>
+    <p:spTree>
+      <p:nvGrpSpPr>
+        <p:cNvPr id="1" name=""/>
+        <p:cNvGrpSpPr/>
+        <p:nvPr/>
+      </p:nvGrpSpPr>
+      <p:grpSpPr>
+        <a:xfrm>
+          <a:off x="0" y="0"/>
+          <a:ext cx="0" cy="0"/>
+          <a:chOff x="0" y="0"/>
+          <a:chExt cx="0" cy="0"/>
+        </a:xfrm>
+      </p:grpSpPr>
+      <p:sp>
+        <p:nvSpPr>
+          <p:cNvPr id="2" name="Title 1"/>
+          <p:cNvSpPr>
+            <a:spLocks noGrp="1"/>
+          </p:cNvSpPr>
+          <p:nvPr>
+            <p:ph type="title"/>
+          </p:nvPr>
+        </p:nvSpPr>
+        <p:spPr/>
+        <p:txBody>
+          <a:bodyPr/>
+          <a:lstStyle/>
+          <a:p>
+            <a:r>
+              <a:rPr lang="en-US" dirty="0" smtClean="0"/>
+              <a:t>Link for </a:t>
+            </a:r>
+            <a:r>
+              <a:rPr lang="en-US" dirty="0" smtClean="0"/>
+              <a:t>LL survey, re-evaluation</a:t>
+            </a:r>
+            <a:endParaRPr lang="en-US" dirty="0"/>
+          </a:p>
+        </p:txBody>
+      </p:sp>
+      <p:sp>
+        <p:nvSpPr>
+          <p:cNvPr id="3" name="Content Placeholder 2"/>
+          <p:cNvSpPr>
+            <a:spLocks noGrp="1"/>
+          </p:cNvSpPr>
+          <p:nvPr>
+            <p:ph idx="1"/>
+          </p:nvPr>
+        </p:nvSpPr>
+        <p:spPr/>
+        <p:txBody>
+          <a:bodyPr/>
+          <a:lstStyle/>
+          <a:p>
+            <a:r>
+              <a:rPr lang="en-US" dirty="0" smtClean="0"/>
+              <a:t>Step 1</a:t>
+            </a:r>
+            <a:r>
+              <a:rPr lang="en-US" dirty="0" smtClean="0"/>
+              <a:t>: AIC base model (2019.1b) – new </a:t>
+            </a:r>
+            <a:r>
+              <a:rPr lang="en-US" dirty="0" err="1" smtClean="0"/>
+              <a:t>env</a:t>
+            </a:r>
+            <a:r>
+              <a:rPr lang="en-US" dirty="0" smtClean="0"/>
+              <a:t> link model (2019.1d)</a:t>
+            </a:r>
+          </a:p>
+          <a:p>
+            <a:endParaRPr lang="en-US" dirty="0"/>
+          </a:p>
+          <a:p>
+            <a:endParaRPr lang="en-US" dirty="0" smtClean="0"/>
+          </a:p>
+          <a:p>
+            <a:endParaRPr lang="en-US" dirty="0"/>
+          </a:p>
+          <a:p>
+            <a:endParaRPr lang="en-US" dirty="0" smtClean="0"/>
+          </a:p>
+          <a:p>
+            <a:endParaRPr lang="en-US" dirty="0"/>
+          </a:p>
+        </p:txBody>
+      </p:sp>
+      <p:pic>
+        <p:nvPicPr>
+          <p:cNvPr id="4" name="Picture 3"/>
+          <p:cNvPicPr>
+            <a:picLocks noChangeAspect="1"/>
+          </p:cNvPicPr>
+          <p:nvPr/>
+        </p:nvPicPr>
+        <p:blipFill>
+          <a:blip r:embed="rId2"/>
+          <a:stretch>
+            <a:fillRect/>
+          </a:stretch>
+        </p:blipFill>
+        <p:spPr>
+          <a:xfrm>
+            <a:off x="3491717" y="2373580"/>
+            <a:ext cx="3676650" cy="2514600"/>
+          </a:xfrm>
+          <a:prstGeom prst="rect">
+            <a:avLst/>
+          </a:prstGeom>
+        </p:spPr>
+      </p:pic>
+    </p:spTree>
+    <p:extLst>
+      <p:ext uri="{BB962C8B-B14F-4D97-AF65-F5344CB8AC3E}">
+        <p14:creationId xmlns:p14="http://schemas.microsoft.com/office/powerpoint/2010/main" val="2878271501"/>
+      </p:ext>
+    </p:extLst>
+  </p:cSld>
+  <p:clrMapOvr>
+    <a:masterClrMapping/>
+  </p:clrMapOvr>
+</p:sld>
+</file>
+
+<file path=ppt/slides/slide8.xml><?xml version="1.0" encoding="utf-8"?>
+<p:sld xmlns:a="http://schemas.openxmlformats.org/drawingml/2006/main" xmlns:r="http://schemas.openxmlformats.org/officeDocument/2006/relationships" xmlns:p="http://schemas.openxmlformats.org/presentationml/2006/main">
+  <p:cSld>
+    <p:spTree>
+      <p:nvGrpSpPr>
+        <p:cNvPr id="1" name=""/>
+        <p:cNvGrpSpPr/>
+        <p:nvPr/>
+      </p:nvGrpSpPr>
+      <p:grpSpPr>
+        <a:xfrm>
+          <a:off x="0" y="0"/>
+          <a:ext cx="0" cy="0"/>
+          <a:chOff x="0" y="0"/>
+          <a:chExt cx="0" cy="0"/>
+        </a:xfrm>
+      </p:grpSpPr>
+      <p:sp>
+        <p:nvSpPr>
+          <p:cNvPr id="2" name="Title 1"/>
+          <p:cNvSpPr>
+            <a:spLocks noGrp="1"/>
+          </p:cNvSpPr>
+          <p:nvPr>
+            <p:ph type="title"/>
+          </p:nvPr>
+        </p:nvSpPr>
+        <p:spPr/>
+        <p:txBody>
+          <a:bodyPr/>
+          <a:lstStyle/>
+          <a:p>
+            <a:r>
+              <a:rPr lang="en-US" dirty="0" smtClean="0"/>
+              <a:t>Link for growth</a:t>
+            </a:r>
+            <a:endParaRPr lang="en-US" dirty="0"/>
+          </a:p>
+        </p:txBody>
+      </p:sp>
+      <p:sp>
+        <p:nvSpPr>
+          <p:cNvPr id="3" name="Content Placeholder 2"/>
+          <p:cNvSpPr>
+            <a:spLocks noGrp="1"/>
+          </p:cNvSpPr>
+          <p:nvPr>
+            <p:ph idx="1"/>
+          </p:nvPr>
+        </p:nvSpPr>
+        <p:spPr/>
+        <p:txBody>
+          <a:bodyPr/>
+          <a:lstStyle/>
+          <a:p>
+            <a:r>
+              <a:rPr lang="en-US" dirty="0" smtClean="0"/>
+              <a:t>Step 1: </a:t>
+            </a:r>
+          </a:p>
+          <a:p>
+            <a:pPr lvl="1"/>
+            <a:r>
+              <a:rPr lang="en-US" dirty="0"/>
+              <a:t>E</a:t>
+            </a:r>
+            <a:r>
+              <a:rPr lang="en-US" dirty="0" smtClean="0"/>
+              <a:t>valuated </a:t>
+            </a:r>
+            <a:r>
+              <a:rPr lang="en-US" dirty="0" err="1" smtClean="0"/>
+              <a:t>Linf</a:t>
+            </a:r>
+            <a:r>
+              <a:rPr lang="en-US" dirty="0"/>
+              <a:t> </a:t>
+            </a:r>
+            <a:r>
+              <a:rPr lang="en-US" dirty="0" smtClean="0"/>
+              <a:t>and kappa across length bin and month</a:t>
+            </a:r>
+          </a:p>
+          <a:p>
+            <a:pPr lvl="1"/>
+            <a:r>
+              <a:rPr lang="en-US" dirty="0" smtClean="0"/>
+              <a:t>Evaluated </a:t>
+            </a:r>
+            <a:r>
+              <a:rPr lang="en-US" dirty="0" err="1" smtClean="0"/>
+              <a:t>Lzero</a:t>
+            </a:r>
+            <a:r>
+              <a:rPr lang="en-US" dirty="0" smtClean="0"/>
+              <a:t> across month for 0-20 cm length bin</a:t>
+            </a:r>
+          </a:p>
+          <a:p>
+            <a:r>
+              <a:rPr lang="en-US" dirty="0" smtClean="0"/>
+              <a:t>Step 2:</a:t>
+            </a:r>
+          </a:p>
+          <a:p>
+            <a:pPr lvl="1"/>
+            <a:r>
+              <a:rPr lang="en-US" dirty="0" smtClean="0"/>
+              <a:t>Select best from Step 1, and run model with </a:t>
+            </a:r>
+            <a:r>
+              <a:rPr lang="en-US" dirty="0" err="1" smtClean="0"/>
+              <a:t>env</a:t>
+            </a:r>
+            <a:r>
+              <a:rPr lang="en-US" dirty="0" smtClean="0"/>
+              <a:t> link for all 3 growth parameters</a:t>
+            </a:r>
+          </a:p>
+          <a:p>
+            <a:r>
+              <a:rPr lang="en-US" dirty="0" smtClean="0"/>
+              <a:t>Step 3:</a:t>
+            </a:r>
+          </a:p>
+          <a:p>
+            <a:pPr lvl="1"/>
+            <a:r>
+              <a:rPr lang="en-US" dirty="0" smtClean="0"/>
+              <a:t>Compare with base model</a:t>
+            </a:r>
+          </a:p>
+          <a:p>
+            <a:pPr lvl="1"/>
+            <a:r>
+              <a:rPr lang="en-US" dirty="0" smtClean="0"/>
+              <a:t>Statistics: current year AIC and model fits, retrospective AIC and performance</a:t>
+            </a:r>
+          </a:p>
+        </p:txBody>
+      </p:sp>
+    </p:spTree>
+    <p:extLst>
+      <p:ext uri="{BB962C8B-B14F-4D97-AF65-F5344CB8AC3E}">
+        <p14:creationId xmlns:p14="http://schemas.microsoft.com/office/powerpoint/2010/main" val="916100377"/>
+      </p:ext>
+    </p:extLst>
+  </p:cSld>
+  <p:clrMapOvr>
+    <a:masterClrMapping/>
+  </p:clrMapOvr>
+</p:sld>
+</file>
+
+<file path=ppt/slides/slide9.xml><?xml version="1.0" encoding="utf-8"?>
+<p:sld xmlns:a="http://schemas.openxmlformats.org/drawingml/2006/main" xmlns:r="http://schemas.openxmlformats.org/officeDocument/2006/relationships" xmlns:p="http://schemas.openxmlformats.org/presentationml/2006/main">
+  <p:cSld>
+    <p:spTree>
+      <p:nvGrpSpPr>
+        <p:cNvPr id="1" name=""/>
+        <p:cNvGrpSpPr/>
+        <p:nvPr/>
+      </p:nvGrpSpPr>
+      <p:grpSpPr>
+        <a:xfrm>
+          <a:off x="0" y="0"/>
+          <a:ext cx="0" cy="0"/>
+          <a:chOff x="0" y="0"/>
+          <a:chExt cx="0" cy="0"/>
+        </a:xfrm>
+      </p:grpSpPr>
+      <p:sp>
+        <p:nvSpPr>
+          <p:cNvPr id="2" name="Title 1"/>
+          <p:cNvSpPr>
+            <a:spLocks noGrp="1"/>
+          </p:cNvSpPr>
+          <p:nvPr>
+            <p:ph type="title"/>
+          </p:nvPr>
+        </p:nvSpPr>
+        <p:spPr/>
+        <p:txBody>
+          <a:bodyPr/>
+          <a:lstStyle/>
+          <a:p>
+            <a:r>
+              <a:rPr lang="en-US" dirty="0" smtClean="0"/>
+              <a:t>Link for growth</a:t>
+            </a:r>
+            <a:endParaRPr lang="en-US" dirty="0"/>
+          </a:p>
+        </p:txBody>
+      </p:sp>
+      <p:sp>
+        <p:nvSpPr>
+          <p:cNvPr id="3" name="Content Placeholder 2"/>
+          <p:cNvSpPr>
+            <a:spLocks noGrp="1"/>
+          </p:cNvSpPr>
+          <p:nvPr>
+            <p:ph idx="1"/>
+          </p:nvPr>
+        </p:nvSpPr>
+        <p:spPr/>
+        <p:txBody>
+          <a:bodyPr>
+            <a:normAutofit fontScale="92500" lnSpcReduction="10000"/>
+          </a:bodyPr>
+          <a:lstStyle/>
+          <a:p>
+            <a:r>
+              <a:rPr lang="en-US" dirty="0" smtClean="0"/>
+              <a:t>Step 1: difference in AIC with base model (</a:t>
+            </a:r>
+            <a:r>
+              <a:rPr lang="en-US" dirty="0" err="1" smtClean="0"/>
+              <a:t>EnvLnk</a:t>
+            </a:r>
+            <a:r>
+              <a:rPr lang="en-US" dirty="0" smtClean="0"/>
+              <a:t> – base, so negative number means </a:t>
+            </a:r>
+            <a:r>
+              <a:rPr lang="en-US" dirty="0" err="1" smtClean="0"/>
+              <a:t>EnvLnk</a:t>
+            </a:r>
+            <a:r>
+              <a:rPr lang="en-US" dirty="0" smtClean="0"/>
+              <a:t> model better)</a:t>
+            </a:r>
+          </a:p>
+          <a:p>
+            <a:endParaRPr lang="en-US" dirty="0"/>
+          </a:p>
+          <a:p>
+            <a:endParaRPr lang="en-US" dirty="0" smtClean="0"/>
+          </a:p>
+          <a:p>
+            <a:endParaRPr lang="en-US" dirty="0"/>
+          </a:p>
+          <a:p>
+            <a:endParaRPr lang="en-US" dirty="0" smtClean="0"/>
+          </a:p>
+          <a:p>
+            <a:endParaRPr lang="en-US" dirty="0"/>
+          </a:p>
+          <a:p>
+            <a:endParaRPr lang="en-US" dirty="0" smtClean="0"/>
+          </a:p>
+          <a:p>
+            <a:endParaRPr lang="en-US" dirty="0" smtClean="0"/>
+          </a:p>
+          <a:p>
+            <a:r>
+              <a:rPr lang="en-US" dirty="0" err="1" smtClean="0"/>
+              <a:t>Linf</a:t>
+            </a:r>
+            <a:r>
+              <a:rPr lang="en-US" dirty="0" smtClean="0"/>
+              <a:t> &gt; </a:t>
+            </a:r>
+            <a:r>
+              <a:rPr lang="en-US" dirty="0" err="1" smtClean="0"/>
+              <a:t>Lzero</a:t>
+            </a:r>
+            <a:r>
+              <a:rPr lang="en-US" dirty="0" smtClean="0"/>
+              <a:t> &gt; kappa for model improvement</a:t>
+            </a:r>
+          </a:p>
+        </p:txBody>
+      </p:sp>
+      <p:pic>
+        <p:nvPicPr>
+          <p:cNvPr id="5" name="Picture 4"/>
+          <p:cNvPicPr>
+            <a:picLocks noChangeAspect="1"/>
+          </p:cNvPicPr>
+          <p:nvPr/>
+        </p:nvPicPr>
+        <p:blipFill>
+          <a:blip r:embed="rId2"/>
+          <a:stretch>
+            <a:fillRect/>
+          </a:stretch>
+        </p:blipFill>
+        <p:spPr>
+          <a:xfrm>
+            <a:off x="962273" y="2931721"/>
+            <a:ext cx="3676650" cy="2514600"/>
+          </a:xfrm>
+          <a:prstGeom prst="rect">
+            <a:avLst/>
+          </a:prstGeom>
+        </p:spPr>
+      </p:pic>
+      <p:pic>
+        <p:nvPicPr>
+          <p:cNvPr id="6" name="Picture 5"/>
+          <p:cNvPicPr>
+            <a:picLocks noChangeAspect="1"/>
+          </p:cNvPicPr>
+          <p:nvPr/>
+        </p:nvPicPr>
+        <p:blipFill>
+          <a:blip r:embed="rId3"/>
+          <a:stretch>
+            <a:fillRect/>
+          </a:stretch>
+        </p:blipFill>
+        <p:spPr>
+          <a:xfrm>
+            <a:off x="5094268" y="2931721"/>
+            <a:ext cx="3676650" cy="2514600"/>
+          </a:xfrm>
+          <a:prstGeom prst="rect">
+            <a:avLst/>
+          </a:prstGeom>
+        </p:spPr>
+      </p:pic>
+      <p:pic>
+        <p:nvPicPr>
+          <p:cNvPr id="7" name="Picture 6"/>
+          <p:cNvPicPr>
+            <a:picLocks noChangeAspect="1"/>
+          </p:cNvPicPr>
+          <p:nvPr/>
+        </p:nvPicPr>
+        <p:blipFill>
+          <a:blip r:embed="rId4"/>
+          <a:stretch>
+            <a:fillRect/>
+          </a:stretch>
+        </p:blipFill>
+        <p:spPr>
+          <a:xfrm>
+            <a:off x="9443234" y="2931721"/>
+            <a:ext cx="1238250" cy="2514600"/>
+          </a:xfrm>
+          <a:prstGeom prst="rect">
+            <a:avLst/>
+          </a:prstGeom>
+        </p:spPr>
+      </p:pic>
+    </p:spTree>
+    <p:extLst>
+      <p:ext uri="{BB962C8B-B14F-4D97-AF65-F5344CB8AC3E}">
+        <p14:creationId xmlns:p14="http://schemas.microsoft.com/office/powerpoint/2010/main" val="3079657574"/>
       </p:ext>
     </p:extLst>
   </p:cSld>

</xml_diff>

<commit_message>
finalize draft of sept pt presentation
</commit_message>
<xml_diff>
--- a/2023/presentation/goa_pcod_sept23.pptx
+++ b/2023/presentation/goa_pcod_sept23.pptx
@@ -8,14 +8,26 @@
     <p:sldId id="256" r:id="rId2"/>
     <p:sldId id="257" r:id="rId3"/>
     <p:sldId id="258" r:id="rId4"/>
-    <p:sldId id="263" r:id="rId5"/>
-    <p:sldId id="259" r:id="rId6"/>
-    <p:sldId id="260" r:id="rId7"/>
-    <p:sldId id="266" r:id="rId8"/>
-    <p:sldId id="265" r:id="rId9"/>
-    <p:sldId id="261" r:id="rId10"/>
-    <p:sldId id="262" r:id="rId11"/>
-    <p:sldId id="264" r:id="rId12"/>
+    <p:sldId id="274" r:id="rId5"/>
+    <p:sldId id="263" r:id="rId6"/>
+    <p:sldId id="259" r:id="rId7"/>
+    <p:sldId id="260" r:id="rId8"/>
+    <p:sldId id="271" r:id="rId9"/>
+    <p:sldId id="273" r:id="rId10"/>
+    <p:sldId id="272" r:id="rId11"/>
+    <p:sldId id="266" r:id="rId12"/>
+    <p:sldId id="270" r:id="rId13"/>
+    <p:sldId id="275" r:id="rId14"/>
+    <p:sldId id="267" r:id="rId15"/>
+    <p:sldId id="276" r:id="rId16"/>
+    <p:sldId id="277" r:id="rId17"/>
+    <p:sldId id="265" r:id="rId18"/>
+    <p:sldId id="261" r:id="rId19"/>
+    <p:sldId id="262" r:id="rId20"/>
+    <p:sldId id="278" r:id="rId21"/>
+    <p:sldId id="264" r:id="rId22"/>
+    <p:sldId id="268" r:id="rId23"/>
+    <p:sldId id="269" r:id="rId24"/>
   </p:sldIdLst>
   <p:sldSz cx="12192000" cy="6858000"/>
   <p:notesSz cx="6858000" cy="9144000"/>
@@ -253,7 +265,7 @@
           <a:p>
             <a:fld id="{A36D2051-A124-4F95-BC42-35393635D3A2}" type="datetimeFigureOut">
               <a:rPr lang="en-US" smtClean="0"/>
-              <a:t>9/8/2023</a:t>
+              <a:t>9/10/2023</a:t>
             </a:fld>
             <a:endParaRPr lang="en-US"/>
           </a:p>
@@ -423,7 +435,7 @@
           <a:p>
             <a:fld id="{A36D2051-A124-4F95-BC42-35393635D3A2}" type="datetimeFigureOut">
               <a:rPr lang="en-US" smtClean="0"/>
-              <a:t>9/8/2023</a:t>
+              <a:t>9/10/2023</a:t>
             </a:fld>
             <a:endParaRPr lang="en-US"/>
           </a:p>
@@ -603,7 +615,7 @@
           <a:p>
             <a:fld id="{A36D2051-A124-4F95-BC42-35393635D3A2}" type="datetimeFigureOut">
               <a:rPr lang="en-US" smtClean="0"/>
-              <a:t>9/8/2023</a:t>
+              <a:t>9/10/2023</a:t>
             </a:fld>
             <a:endParaRPr lang="en-US"/>
           </a:p>
@@ -773,7 +785,7 @@
           <a:p>
             <a:fld id="{A36D2051-A124-4F95-BC42-35393635D3A2}" type="datetimeFigureOut">
               <a:rPr lang="en-US" smtClean="0"/>
-              <a:t>9/8/2023</a:t>
+              <a:t>9/10/2023</a:t>
             </a:fld>
             <a:endParaRPr lang="en-US"/>
           </a:p>
@@ -1019,7 +1031,7 @@
           <a:p>
             <a:fld id="{A36D2051-A124-4F95-BC42-35393635D3A2}" type="datetimeFigureOut">
               <a:rPr lang="en-US" smtClean="0"/>
-              <a:t>9/8/2023</a:t>
+              <a:t>9/10/2023</a:t>
             </a:fld>
             <a:endParaRPr lang="en-US"/>
           </a:p>
@@ -1251,7 +1263,7 @@
           <a:p>
             <a:fld id="{A36D2051-A124-4F95-BC42-35393635D3A2}" type="datetimeFigureOut">
               <a:rPr lang="en-US" smtClean="0"/>
-              <a:t>9/8/2023</a:t>
+              <a:t>9/10/2023</a:t>
             </a:fld>
             <a:endParaRPr lang="en-US"/>
           </a:p>
@@ -1618,7 +1630,7 @@
           <a:p>
             <a:fld id="{A36D2051-A124-4F95-BC42-35393635D3A2}" type="datetimeFigureOut">
               <a:rPr lang="en-US" smtClean="0"/>
-              <a:t>9/8/2023</a:t>
+              <a:t>9/10/2023</a:t>
             </a:fld>
             <a:endParaRPr lang="en-US"/>
           </a:p>
@@ -1736,7 +1748,7 @@
           <a:p>
             <a:fld id="{A36D2051-A124-4F95-BC42-35393635D3A2}" type="datetimeFigureOut">
               <a:rPr lang="en-US" smtClean="0"/>
-              <a:t>9/8/2023</a:t>
+              <a:t>9/10/2023</a:t>
             </a:fld>
             <a:endParaRPr lang="en-US"/>
           </a:p>
@@ -1831,7 +1843,7 @@
           <a:p>
             <a:fld id="{A36D2051-A124-4F95-BC42-35393635D3A2}" type="datetimeFigureOut">
               <a:rPr lang="en-US" smtClean="0"/>
-              <a:t>9/8/2023</a:t>
+              <a:t>9/10/2023</a:t>
             </a:fld>
             <a:endParaRPr lang="en-US"/>
           </a:p>
@@ -2108,7 +2120,7 @@
           <a:p>
             <a:fld id="{A36D2051-A124-4F95-BC42-35393635D3A2}" type="datetimeFigureOut">
               <a:rPr lang="en-US" smtClean="0"/>
-              <a:t>9/8/2023</a:t>
+              <a:t>9/10/2023</a:t>
             </a:fld>
             <a:endParaRPr lang="en-US"/>
           </a:p>
@@ -2361,7 +2373,7 @@
           <a:p>
             <a:fld id="{A36D2051-A124-4F95-BC42-35393635D3A2}" type="datetimeFigureOut">
               <a:rPr lang="en-US" smtClean="0"/>
-              <a:t>9/8/2023</a:t>
+              <a:t>9/10/2023</a:t>
             </a:fld>
             <a:endParaRPr lang="en-US"/>
           </a:p>
@@ -2574,7 +2586,7 @@
           <a:p>
             <a:fld id="{A36D2051-A124-4F95-BC42-35393635D3A2}" type="datetimeFigureOut">
               <a:rPr lang="en-US" smtClean="0"/>
-              <a:t>9/8/2023</a:t>
+              <a:t>9/10/2023</a:t>
             </a:fld>
             <a:endParaRPr lang="en-US"/>
           </a:p>
@@ -2996,11 +3008,7 @@
           <a:p>
             <a:r>
               <a:rPr lang="en-US" dirty="0" smtClean="0"/>
-              <a:t>2023 </a:t>
-            </a:r>
-            <a:r>
-              <a:rPr lang="en-US" dirty="0" smtClean="0"/>
-              <a:t>GOA </a:t>
+              <a:t>2023 GOA </a:t>
             </a:r>
             <a:r>
               <a:rPr lang="en-US" dirty="0" err="1" smtClean="0"/>
@@ -3008,11 +3016,7 @@
             </a:r>
             <a:r>
               <a:rPr lang="en-US" dirty="0" smtClean="0"/>
-              <a:t> </a:t>
-            </a:r>
-            <a:r>
-              <a:rPr lang="en-US" dirty="0" smtClean="0"/>
-              <a:t>assessment</a:t>
+              <a:t> assessment</a:t>
             </a:r>
             <a:endParaRPr lang="en-US" dirty="0"/>
           </a:p>
@@ -3088,7 +3092,11 @@
           <a:p>
             <a:r>
               <a:rPr lang="en-US" dirty="0" smtClean="0"/>
-              <a:t>Link for growth</a:t>
+              <a:t>Link for LL </a:t>
+            </a:r>
+            <a:r>
+              <a:rPr lang="en-US" dirty="0" smtClean="0"/>
+              <a:t>survey q: no link comparison</a:t>
             </a:r>
             <a:endParaRPr lang="en-US" dirty="0"/>
           </a:p>
@@ -3104,7 +3112,12 @@
             <p:ph idx="1"/>
           </p:nvPr>
         </p:nvSpPr>
-        <p:spPr/>
+        <p:spPr>
+          <a:xfrm>
+            <a:off x="838199" y="1825625"/>
+            <a:ext cx="10791825" cy="4351338"/>
+          </a:xfrm>
+        </p:spPr>
         <p:txBody>
           <a:bodyPr>
             <a:normAutofit/>
@@ -3113,111 +3126,25 @@
           <a:p>
             <a:r>
               <a:rPr lang="en-US" dirty="0" smtClean="0"/>
-              <a:t>Step 2: AIC</a:t>
-            </a:r>
-            <a:r>
-              <a:rPr lang="en-US" dirty="0"/>
-              <a:t> </a:t>
-            </a:r>
-            <a:r>
-              <a:rPr lang="en-US" dirty="0" smtClean="0"/>
-              <a:t>&amp; likelihoods</a:t>
-            </a:r>
-            <a:endParaRPr lang="en-US" dirty="0"/>
+              <a:t>Recommendation: continue with model that includes environmental link for LL survey q</a:t>
+            </a:r>
           </a:p>
           <a:p>
             <a:endParaRPr lang="en-US" dirty="0" smtClean="0"/>
           </a:p>
           <a:p>
-            <a:endParaRPr lang="en-US" dirty="0"/>
-          </a:p>
-          <a:p>
+            <a:r>
+              <a:rPr lang="en-US" dirty="0" smtClean="0"/>
+              <a:t>Continue to monitor with retro AIC table in SAFE</a:t>
+            </a:r>
             <a:endParaRPr lang="en-US" dirty="0" smtClean="0"/>
           </a:p>
-          <a:p>
-            <a:pPr marL="0" indent="0">
-              <a:buNone/>
-            </a:pPr>
-            <a:endParaRPr lang="en-US" dirty="0"/>
-          </a:p>
-        </p:txBody>
-      </p:sp>
-      <p:pic>
-        <p:nvPicPr>
-          <p:cNvPr id="4" name="Picture 3"/>
-          <p:cNvPicPr>
-            <a:picLocks noChangeAspect="1"/>
-          </p:cNvPicPr>
-          <p:nvPr/>
-        </p:nvPicPr>
-        <p:blipFill>
-          <a:blip r:embed="rId2"/>
-          <a:stretch>
-            <a:fillRect/>
-          </a:stretch>
-        </p:blipFill>
-        <p:spPr>
-          <a:xfrm>
-            <a:off x="904194" y="2433081"/>
-            <a:ext cx="2676525" cy="590550"/>
-          </a:xfrm>
-          <a:prstGeom prst="rect">
-            <a:avLst/>
-          </a:prstGeom>
-        </p:spPr>
-      </p:pic>
-      <p:pic>
-        <p:nvPicPr>
-          <p:cNvPr id="8" name="Picture 7"/>
-          <p:cNvPicPr>
-            <a:picLocks noChangeAspect="1"/>
-          </p:cNvPicPr>
-          <p:nvPr/>
-        </p:nvPicPr>
-        <p:blipFill>
-          <a:blip r:embed="rId3"/>
-          <a:stretch>
-            <a:fillRect/>
-          </a:stretch>
-        </p:blipFill>
-        <p:spPr>
-          <a:xfrm>
-            <a:off x="3788785" y="2447925"/>
-            <a:ext cx="2619375" cy="2305050"/>
-          </a:xfrm>
-          <a:prstGeom prst="rect">
-            <a:avLst/>
-          </a:prstGeom>
-        </p:spPr>
-      </p:pic>
-      <p:pic>
-        <p:nvPicPr>
-          <p:cNvPr id="9" name="Picture 8"/>
-          <p:cNvPicPr>
-            <a:picLocks noChangeAspect="1"/>
-          </p:cNvPicPr>
-          <p:nvPr/>
-        </p:nvPicPr>
-        <p:blipFill>
-          <a:blip r:embed="rId4"/>
-          <a:stretch>
-            <a:fillRect/>
-          </a:stretch>
-        </p:blipFill>
-        <p:spPr>
-          <a:xfrm>
-            <a:off x="6714042" y="2447925"/>
-            <a:ext cx="4333875" cy="1543050"/>
-          </a:xfrm>
-          <a:prstGeom prst="rect">
-            <a:avLst/>
-          </a:prstGeom>
-        </p:spPr>
-      </p:pic>
+        </p:txBody>
+      </p:sp>
     </p:spTree>
     <p:extLst>
       <p:ext uri="{BB962C8B-B14F-4D97-AF65-F5344CB8AC3E}">
-        <p14:creationId xmlns:p14="http://schemas.microsoft.com/office/powerpoint/2010/main" val="3851483548"/>
+        <p14:creationId xmlns:p14="http://schemas.microsoft.com/office/powerpoint/2010/main" val="3364591089"/>
       </p:ext>
     </p:extLst>
   </p:cSld>
@@ -3261,7 +3188,15 @@
           <a:p>
             <a:r>
               <a:rPr lang="en-US" dirty="0" smtClean="0"/>
-              <a:t>Link for growth</a:t>
+              <a:t>Link for LL </a:t>
+            </a:r>
+            <a:r>
+              <a:rPr lang="en-US" dirty="0" smtClean="0"/>
+              <a:t>survey q: </a:t>
+            </a:r>
+            <a:r>
+              <a:rPr lang="en-US" dirty="0" smtClean="0"/>
+              <a:t>re-evaluation</a:t>
             </a:r>
             <a:endParaRPr lang="en-US" dirty="0"/>
           </a:p>
@@ -3279,14 +3214,28 @@
         </p:nvSpPr>
         <p:spPr/>
         <p:txBody>
-          <a:bodyPr>
-            <a:normAutofit/>
-          </a:bodyPr>
-          <a:lstStyle/>
-          <a:p>
-            <a:r>
-              <a:rPr lang="en-US" dirty="0" smtClean="0"/>
-              <a:t>Step 2: Retrospective AIC</a:t>
+          <a:bodyPr/>
+          <a:lstStyle/>
+          <a:p>
+            <a:r>
+              <a:rPr lang="en-US" dirty="0" smtClean="0"/>
+              <a:t>Step 1: </a:t>
+            </a:r>
+            <a:r>
+              <a:rPr lang="en-US" dirty="0" smtClean="0"/>
+              <a:t>AIC difference = </a:t>
+            </a:r>
+            <a:r>
+              <a:rPr lang="en-US" dirty="0" smtClean="0"/>
+              <a:t>base model (2019.1b) – new </a:t>
+            </a:r>
+            <a:r>
+              <a:rPr lang="en-US" dirty="0" err="1" smtClean="0"/>
+              <a:t>env</a:t>
+            </a:r>
+            <a:r>
+              <a:rPr lang="en-US" dirty="0" smtClean="0"/>
+              <a:t> link model (2019.1d)</a:t>
             </a:r>
           </a:p>
           <a:p>
@@ -3304,30 +3253,593 @@
           <a:p>
             <a:endParaRPr lang="en-US" dirty="0"/>
           </a:p>
-          <a:p>
+        </p:txBody>
+      </p:sp>
+      <p:pic>
+        <p:nvPicPr>
+          <p:cNvPr id="7" name="Picture 6"/>
+          <p:cNvPicPr>
+            <a:picLocks noChangeAspect="1"/>
+          </p:cNvPicPr>
+          <p:nvPr/>
+        </p:nvPicPr>
+        <p:blipFill>
+          <a:blip r:embed="rId2"/>
+          <a:stretch>
+            <a:fillRect/>
+          </a:stretch>
+        </p:blipFill>
+        <p:spPr>
+          <a:xfrm>
+            <a:off x="2552699" y="2500312"/>
+            <a:ext cx="5897959" cy="4033837"/>
+          </a:xfrm>
+          <a:prstGeom prst="rect">
+            <a:avLst/>
+          </a:prstGeom>
+        </p:spPr>
+      </p:pic>
+    </p:spTree>
+    <p:extLst>
+      <p:ext uri="{BB962C8B-B14F-4D97-AF65-F5344CB8AC3E}">
+        <p14:creationId xmlns:p14="http://schemas.microsoft.com/office/powerpoint/2010/main" val="2878271501"/>
+      </p:ext>
+    </p:extLst>
+  </p:cSld>
+  <p:clrMapOvr>
+    <a:masterClrMapping/>
+  </p:clrMapOvr>
+</p:sld>
+</file>
+
+<file path=ppt/slides/slide12.xml><?xml version="1.0" encoding="utf-8"?>
+<p:sld xmlns:a="http://schemas.openxmlformats.org/drawingml/2006/main" xmlns:r="http://schemas.openxmlformats.org/officeDocument/2006/relationships" xmlns:p="http://schemas.openxmlformats.org/presentationml/2006/main">
+  <p:cSld>
+    <p:spTree>
+      <p:nvGrpSpPr>
+        <p:cNvPr id="1" name=""/>
+        <p:cNvGrpSpPr/>
+        <p:nvPr/>
+      </p:nvGrpSpPr>
+      <p:grpSpPr>
+        <a:xfrm>
+          <a:off x="0" y="0"/>
+          <a:ext cx="0" cy="0"/>
+          <a:chOff x="0" y="0"/>
+          <a:chExt cx="0" cy="0"/>
+        </a:xfrm>
+      </p:grpSpPr>
+      <p:sp>
+        <p:nvSpPr>
+          <p:cNvPr id="2" name="Title 1"/>
+          <p:cNvSpPr>
+            <a:spLocks noGrp="1"/>
+          </p:cNvSpPr>
+          <p:nvPr>
+            <p:ph type="title"/>
+          </p:nvPr>
+        </p:nvSpPr>
+        <p:spPr/>
+        <p:txBody>
+          <a:bodyPr/>
+          <a:lstStyle/>
+          <a:p>
+            <a:r>
+              <a:rPr lang="en-US" dirty="0" smtClean="0"/>
+              <a:t>Link for LL </a:t>
+            </a:r>
+            <a:r>
+              <a:rPr lang="en-US" dirty="0" smtClean="0"/>
+              <a:t>survey catchability, </a:t>
+            </a:r>
+            <a:r>
+              <a:rPr lang="en-US" dirty="0" smtClean="0"/>
+              <a:t>re-evaluation</a:t>
+            </a:r>
+            <a:endParaRPr lang="en-US" dirty="0"/>
+          </a:p>
+        </p:txBody>
+      </p:sp>
+      <p:sp>
+        <p:nvSpPr>
+          <p:cNvPr id="3" name="Content Placeholder 2"/>
+          <p:cNvSpPr>
+            <a:spLocks noGrp="1"/>
+          </p:cNvSpPr>
+          <p:nvPr>
+            <p:ph idx="1"/>
+          </p:nvPr>
+        </p:nvSpPr>
+        <p:spPr/>
+        <p:txBody>
+          <a:bodyPr/>
+          <a:lstStyle/>
+          <a:p>
+            <a:r>
+              <a:rPr lang="en-US" dirty="0" smtClean="0"/>
+              <a:t>Fit to LL survey:</a:t>
+            </a:r>
+            <a:endParaRPr lang="en-US" dirty="0" smtClean="0"/>
+          </a:p>
+          <a:p>
+            <a:endParaRPr lang="en-US" dirty="0"/>
+          </a:p>
+          <a:p>
+            <a:endParaRPr lang="en-US" dirty="0" smtClean="0"/>
+          </a:p>
+          <a:p>
+            <a:endParaRPr lang="en-US" dirty="0"/>
+          </a:p>
+          <a:p>
+            <a:endParaRPr lang="en-US" dirty="0" smtClean="0"/>
+          </a:p>
+          <a:p>
+            <a:endParaRPr lang="en-US" dirty="0"/>
+          </a:p>
+        </p:txBody>
+      </p:sp>
+      <p:grpSp>
+        <p:nvGrpSpPr>
+          <p:cNvPr id="5" name="Group 4"/>
+          <p:cNvGrpSpPr/>
+          <p:nvPr/>
+        </p:nvGrpSpPr>
+        <p:grpSpPr>
+          <a:xfrm>
+            <a:off x="2952750" y="2315307"/>
+            <a:ext cx="6286500" cy="4447443"/>
+            <a:chOff x="4143375" y="1924782"/>
+            <a:chExt cx="6286500" cy="4447443"/>
+          </a:xfrm>
+        </p:grpSpPr>
+        <p:pic>
+          <p:nvPicPr>
+            <p:cNvPr id="4" name="Picture 3"/>
+            <p:cNvPicPr>
+              <a:picLocks noChangeAspect="1"/>
+            </p:cNvPicPr>
+            <p:nvPr/>
+          </p:nvPicPr>
+          <p:blipFill rotWithShape="1">
+            <a:blip r:embed="rId2" cstate="print">
+              <a:extLst>
+                <a:ext uri="{28A0092B-C50C-407E-A947-70E740481C1C}">
+                  <a14:useLocalDpi xmlns:a14="http://schemas.microsoft.com/office/drawing/2010/main" val="0"/>
+                </a:ext>
+              </a:extLst>
+            </a:blip>
+            <a:srcRect b="8030"/>
+            <a:stretch/>
+          </p:blipFill>
+          <p:spPr>
+            <a:xfrm>
+              <a:off x="4143375" y="1924782"/>
+              <a:ext cx="6286500" cy="4447443"/>
+            </a:xfrm>
+            <a:prstGeom prst="rect">
+              <a:avLst/>
+            </a:prstGeom>
+          </p:spPr>
+        </p:pic>
+        <p:sp>
+          <p:nvSpPr>
+            <p:cNvPr id="6" name="Oval 5"/>
+            <p:cNvSpPr/>
+            <p:nvPr/>
+          </p:nvSpPr>
+          <p:spPr>
+            <a:xfrm>
+              <a:off x="5859266" y="3314700"/>
+              <a:ext cx="680030" cy="1399615"/>
+            </a:xfrm>
+            <a:prstGeom prst="ellipse">
+              <a:avLst/>
+            </a:prstGeom>
+            <a:noFill/>
+            <a:ln w="25400">
+              <a:solidFill>
+                <a:srgbClr val="00B050"/>
+              </a:solidFill>
+            </a:ln>
+          </p:spPr>
+          <p:style>
+            <a:lnRef idx="2">
+              <a:schemeClr val="accent1">
+                <a:shade val="50000"/>
+              </a:schemeClr>
+            </a:lnRef>
+            <a:fillRef idx="1">
+              <a:schemeClr val="accent1"/>
+            </a:fillRef>
+            <a:effectRef idx="0">
+              <a:schemeClr val="accent1"/>
+            </a:effectRef>
+            <a:fontRef idx="minor">
+              <a:schemeClr val="lt1"/>
+            </a:fontRef>
+          </p:style>
+          <p:txBody>
+            <a:bodyPr rtlCol="0" anchor="ctr"/>
+            <a:lstStyle/>
+            <a:p>
+              <a:pPr algn="ctr"/>
+              <a:endParaRPr lang="en-US"/>
+            </a:p>
+          </p:txBody>
+        </p:sp>
+        <p:sp>
+          <p:nvSpPr>
+            <p:cNvPr id="8" name="Oval 7"/>
+            <p:cNvSpPr/>
+            <p:nvPr/>
+          </p:nvSpPr>
+          <p:spPr>
+            <a:xfrm>
+              <a:off x="6661243" y="4445535"/>
+              <a:ext cx="680030" cy="850365"/>
+            </a:xfrm>
+            <a:prstGeom prst="ellipse">
+              <a:avLst/>
+            </a:prstGeom>
+            <a:noFill/>
+            <a:ln w="25400">
+              <a:solidFill>
+                <a:srgbClr val="00B050"/>
+              </a:solidFill>
+            </a:ln>
+          </p:spPr>
+          <p:style>
+            <a:lnRef idx="2">
+              <a:schemeClr val="accent1">
+                <a:shade val="50000"/>
+              </a:schemeClr>
+            </a:lnRef>
+            <a:fillRef idx="1">
+              <a:schemeClr val="accent1"/>
+            </a:fillRef>
+            <a:effectRef idx="0">
+              <a:schemeClr val="accent1"/>
+            </a:effectRef>
+            <a:fontRef idx="minor">
+              <a:schemeClr val="lt1"/>
+            </a:fontRef>
+          </p:style>
+          <p:txBody>
+            <a:bodyPr rtlCol="0" anchor="ctr"/>
+            <a:lstStyle/>
+            <a:p>
+              <a:pPr algn="ctr"/>
+              <a:endParaRPr lang="en-US"/>
+            </a:p>
+          </p:txBody>
+        </p:sp>
+        <p:sp>
+          <p:nvSpPr>
+            <p:cNvPr id="9" name="Oval 8"/>
+            <p:cNvSpPr/>
+            <p:nvPr/>
+          </p:nvSpPr>
+          <p:spPr>
+            <a:xfrm>
+              <a:off x="8545559" y="4001294"/>
+              <a:ext cx="680030" cy="1094581"/>
+            </a:xfrm>
+            <a:prstGeom prst="ellipse">
+              <a:avLst/>
+            </a:prstGeom>
+            <a:noFill/>
+            <a:ln w="25400">
+              <a:solidFill>
+                <a:srgbClr val="00B050"/>
+              </a:solidFill>
+            </a:ln>
+          </p:spPr>
+          <p:style>
+            <a:lnRef idx="2">
+              <a:schemeClr val="accent1">
+                <a:shade val="50000"/>
+              </a:schemeClr>
+            </a:lnRef>
+            <a:fillRef idx="1">
+              <a:schemeClr val="accent1"/>
+            </a:fillRef>
+            <a:effectRef idx="0">
+              <a:schemeClr val="accent1"/>
+            </a:effectRef>
+            <a:fontRef idx="minor">
+              <a:schemeClr val="lt1"/>
+            </a:fontRef>
+          </p:style>
+          <p:txBody>
+            <a:bodyPr rtlCol="0" anchor="ctr"/>
+            <a:lstStyle/>
+            <a:p>
+              <a:pPr algn="ctr"/>
+              <a:endParaRPr lang="en-US"/>
+            </a:p>
+          </p:txBody>
+        </p:sp>
+        <p:sp>
+          <p:nvSpPr>
+            <p:cNvPr id="10" name="Oval 9"/>
+            <p:cNvSpPr/>
+            <p:nvPr/>
+          </p:nvSpPr>
+          <p:spPr>
+            <a:xfrm>
+              <a:off x="9081027" y="5095875"/>
+              <a:ext cx="680030" cy="734486"/>
+            </a:xfrm>
+            <a:prstGeom prst="ellipse">
+              <a:avLst/>
+            </a:prstGeom>
+            <a:noFill/>
+            <a:ln w="25400">
+              <a:solidFill>
+                <a:srgbClr val="C00000"/>
+              </a:solidFill>
+            </a:ln>
+          </p:spPr>
+          <p:style>
+            <a:lnRef idx="2">
+              <a:schemeClr val="accent1">
+                <a:shade val="50000"/>
+              </a:schemeClr>
+            </a:lnRef>
+            <a:fillRef idx="1">
+              <a:schemeClr val="accent1"/>
+            </a:fillRef>
+            <a:effectRef idx="0">
+              <a:schemeClr val="accent1"/>
+            </a:effectRef>
+            <a:fontRef idx="minor">
+              <a:schemeClr val="lt1"/>
+            </a:fontRef>
+          </p:style>
+          <p:txBody>
+            <a:bodyPr rtlCol="0" anchor="ctr"/>
+            <a:lstStyle/>
+            <a:p>
+              <a:pPr algn="ctr"/>
+              <a:endParaRPr lang="en-US"/>
+            </a:p>
+          </p:txBody>
+        </p:sp>
+      </p:grpSp>
+    </p:spTree>
+    <p:extLst>
+      <p:ext uri="{BB962C8B-B14F-4D97-AF65-F5344CB8AC3E}">
+        <p14:creationId xmlns:p14="http://schemas.microsoft.com/office/powerpoint/2010/main" val="2269004290"/>
+      </p:ext>
+    </p:extLst>
+  </p:cSld>
+  <p:clrMapOvr>
+    <a:masterClrMapping/>
+  </p:clrMapOvr>
+</p:sld>
+</file>
+
+<file path=ppt/slides/slide13.xml><?xml version="1.0" encoding="utf-8"?>
+<p:sld xmlns:a="http://schemas.openxmlformats.org/drawingml/2006/main" xmlns:r="http://schemas.openxmlformats.org/officeDocument/2006/relationships" xmlns:p="http://schemas.openxmlformats.org/presentationml/2006/main">
+  <p:cSld>
+    <p:spTree>
+      <p:nvGrpSpPr>
+        <p:cNvPr id="1" name=""/>
+        <p:cNvGrpSpPr/>
+        <p:nvPr/>
+      </p:nvGrpSpPr>
+      <p:grpSpPr>
+        <a:xfrm>
+          <a:off x="0" y="0"/>
+          <a:ext cx="0" cy="0"/>
+          <a:chOff x="0" y="0"/>
+          <a:chExt cx="0" cy="0"/>
+        </a:xfrm>
+      </p:grpSpPr>
+      <p:sp>
+        <p:nvSpPr>
+          <p:cNvPr id="2" name="Title 1"/>
+          <p:cNvSpPr>
+            <a:spLocks noGrp="1"/>
+          </p:cNvSpPr>
+          <p:nvPr>
+            <p:ph type="title"/>
+          </p:nvPr>
+        </p:nvSpPr>
+        <p:spPr/>
+        <p:txBody>
+          <a:bodyPr/>
+          <a:lstStyle/>
+          <a:p>
+            <a:r>
+              <a:rPr lang="en-US" dirty="0" smtClean="0"/>
+              <a:t>Link for LL </a:t>
+            </a:r>
+            <a:r>
+              <a:rPr lang="en-US" dirty="0" smtClean="0"/>
+              <a:t>survey catchability, </a:t>
+            </a:r>
+            <a:r>
+              <a:rPr lang="en-US" dirty="0" smtClean="0"/>
+              <a:t>re-evaluation</a:t>
+            </a:r>
+            <a:endParaRPr lang="en-US" dirty="0"/>
+          </a:p>
+        </p:txBody>
+      </p:sp>
+      <p:sp>
+        <p:nvSpPr>
+          <p:cNvPr id="3" name="Content Placeholder 2"/>
+          <p:cNvSpPr>
+            <a:spLocks noGrp="1"/>
+          </p:cNvSpPr>
+          <p:nvPr>
+            <p:ph idx="1"/>
+          </p:nvPr>
+        </p:nvSpPr>
+        <p:spPr/>
+        <p:txBody>
+          <a:bodyPr/>
+          <a:lstStyle/>
+          <a:p>
+            <a:endParaRPr lang="en-US" dirty="0"/>
+          </a:p>
+          <a:p>
+            <a:endParaRPr lang="en-US" dirty="0" smtClean="0"/>
+          </a:p>
+          <a:p>
+            <a:endParaRPr lang="en-US" dirty="0"/>
+          </a:p>
+          <a:p>
+            <a:endParaRPr lang="en-US" dirty="0" smtClean="0"/>
+          </a:p>
+          <a:p>
+            <a:endParaRPr lang="en-US" dirty="0"/>
+          </a:p>
+        </p:txBody>
+      </p:sp>
+      <p:pic>
+        <p:nvPicPr>
+          <p:cNvPr id="7" name="Picture 6"/>
+          <p:cNvPicPr>
+            <a:picLocks noChangeAspect="1"/>
+          </p:cNvPicPr>
+          <p:nvPr/>
+        </p:nvPicPr>
+        <p:blipFill>
+          <a:blip r:embed="rId2"/>
+          <a:stretch>
+            <a:fillRect/>
+          </a:stretch>
+        </p:blipFill>
+        <p:spPr>
+          <a:xfrm>
+            <a:off x="3019110" y="1825625"/>
+            <a:ext cx="6145436" cy="4273550"/>
+          </a:xfrm>
+          <a:prstGeom prst="rect">
+            <a:avLst/>
+          </a:prstGeom>
+        </p:spPr>
+      </p:pic>
+    </p:spTree>
+    <p:extLst>
+      <p:ext uri="{BB962C8B-B14F-4D97-AF65-F5344CB8AC3E}">
+        <p14:creationId xmlns:p14="http://schemas.microsoft.com/office/powerpoint/2010/main" val="2534341951"/>
+      </p:ext>
+    </p:extLst>
+  </p:cSld>
+  <p:clrMapOvr>
+    <a:masterClrMapping/>
+  </p:clrMapOvr>
+</p:sld>
+</file>
+
+<file path=ppt/slides/slide14.xml><?xml version="1.0" encoding="utf-8"?>
+<p:sld xmlns:a="http://schemas.openxmlformats.org/drawingml/2006/main" xmlns:r="http://schemas.openxmlformats.org/officeDocument/2006/relationships" xmlns:p="http://schemas.openxmlformats.org/presentationml/2006/main">
+  <p:cSld>
+    <p:spTree>
+      <p:nvGrpSpPr>
+        <p:cNvPr id="1" name=""/>
+        <p:cNvGrpSpPr/>
+        <p:nvPr/>
+      </p:nvGrpSpPr>
+      <p:grpSpPr>
+        <a:xfrm>
+          <a:off x="0" y="0"/>
+          <a:ext cx="0" cy="0"/>
+          <a:chOff x="0" y="0"/>
+          <a:chExt cx="0" cy="0"/>
+        </a:xfrm>
+      </p:grpSpPr>
+      <p:sp>
+        <p:nvSpPr>
+          <p:cNvPr id="2" name="Title 1"/>
+          <p:cNvSpPr>
+            <a:spLocks noGrp="1"/>
+          </p:cNvSpPr>
+          <p:nvPr>
+            <p:ph type="title"/>
+          </p:nvPr>
+        </p:nvSpPr>
+        <p:spPr/>
+        <p:txBody>
+          <a:bodyPr/>
+          <a:lstStyle/>
+          <a:p>
+            <a:r>
+              <a:rPr lang="en-US" dirty="0" smtClean="0"/>
+              <a:t>Link for LL survey, re-evaluation</a:t>
+            </a:r>
+            <a:endParaRPr lang="en-US" dirty="0"/>
+          </a:p>
+        </p:txBody>
+      </p:sp>
+      <p:sp>
+        <p:nvSpPr>
+          <p:cNvPr id="3" name="Content Placeholder 2"/>
+          <p:cNvSpPr>
+            <a:spLocks noGrp="1"/>
+          </p:cNvSpPr>
+          <p:nvPr>
+            <p:ph idx="1"/>
+          </p:nvPr>
+        </p:nvSpPr>
+        <p:spPr/>
+        <p:txBody>
+          <a:bodyPr/>
+          <a:lstStyle/>
+          <a:p>
+            <a:r>
+              <a:rPr lang="en-US" dirty="0" smtClean="0"/>
+              <a:t>Retro </a:t>
+            </a:r>
+            <a:r>
+              <a:rPr lang="en-US" dirty="0" smtClean="0"/>
+              <a:t>Total likelihood </a:t>
+            </a:r>
+            <a:r>
+              <a:rPr lang="en-US" dirty="0" smtClean="0"/>
+              <a:t>and </a:t>
+            </a:r>
             <a:r>
               <a:rPr lang="en-US" dirty="0" err="1" smtClean="0"/>
-              <a:t>Mohns</a:t>
-            </a:r>
-            <a:r>
-              <a:rPr lang="en-US" dirty="0" smtClean="0"/>
-              <a:t> rho: 2019.1b = -0.073, 2023.1 = -0.022</a:t>
-            </a:r>
-            <a:endParaRPr lang="en-US" dirty="0"/>
-          </a:p>
-          <a:p>
-            <a:endParaRPr lang="en-US" dirty="0" smtClean="0"/>
-          </a:p>
-          <a:p>
-            <a:endParaRPr lang="en-US" dirty="0"/>
-          </a:p>
-          <a:p>
-            <a:endParaRPr lang="en-US" dirty="0" smtClean="0"/>
-          </a:p>
-          <a:p>
-            <a:pPr marL="0" indent="0">
-              <a:buNone/>
-            </a:pPr>
+              <a:t>mohns</a:t>
+            </a:r>
+            <a:r>
+              <a:rPr lang="en-US" dirty="0" smtClean="0"/>
+              <a:t> </a:t>
+            </a:r>
+            <a:r>
+              <a:rPr lang="en-US" dirty="0" smtClean="0"/>
+              <a:t>rho:</a:t>
+            </a:r>
+          </a:p>
+          <a:p>
+            <a:endParaRPr lang="en-US" dirty="0"/>
+          </a:p>
+          <a:p>
+            <a:r>
+              <a:rPr lang="en-US" dirty="0" err="1" smtClean="0"/>
+              <a:t>Mohn’s</a:t>
+            </a:r>
+            <a:r>
+              <a:rPr lang="en-US" dirty="0" smtClean="0"/>
+              <a:t> rho 2019.1b = -0.0727</a:t>
+            </a:r>
+          </a:p>
+          <a:p>
+            <a:endParaRPr lang="en-US" dirty="0"/>
+          </a:p>
+          <a:p>
+            <a:r>
+              <a:rPr lang="en-US" dirty="0" err="1" smtClean="0"/>
+              <a:t>Mohn’s</a:t>
+            </a:r>
+            <a:r>
+              <a:rPr lang="en-US" dirty="0" smtClean="0"/>
+              <a:t> rho 2019.1d = -0.0579</a:t>
+            </a:r>
             <a:endParaRPr lang="en-US" dirty="0"/>
           </a:p>
         </p:txBody>
@@ -3348,8 +3860,8 @@
         </p:blipFill>
         <p:spPr>
           <a:xfrm>
-            <a:off x="1660937" y="2389539"/>
-            <a:ext cx="2457450" cy="2114550"/>
+            <a:off x="5962649" y="2281238"/>
+            <a:ext cx="5391151" cy="4368012"/>
           </a:xfrm>
           <a:prstGeom prst="rect">
             <a:avLst/>
@@ -3359,7 +3871,756 @@
     </p:spTree>
     <p:extLst>
       <p:ext uri="{BB962C8B-B14F-4D97-AF65-F5344CB8AC3E}">
-        <p14:creationId xmlns:p14="http://schemas.microsoft.com/office/powerpoint/2010/main" val="3405314964"/>
+        <p14:creationId xmlns:p14="http://schemas.microsoft.com/office/powerpoint/2010/main" val="2657878522"/>
+      </p:ext>
+    </p:extLst>
+  </p:cSld>
+  <p:clrMapOvr>
+    <a:masterClrMapping/>
+  </p:clrMapOvr>
+</p:sld>
+</file>
+
+<file path=ppt/slides/slide15.xml><?xml version="1.0" encoding="utf-8"?>
+<p:sld xmlns:a="http://schemas.openxmlformats.org/drawingml/2006/main" xmlns:r="http://schemas.openxmlformats.org/officeDocument/2006/relationships" xmlns:p="http://schemas.openxmlformats.org/presentationml/2006/main">
+  <p:cSld>
+    <p:spTree>
+      <p:nvGrpSpPr>
+        <p:cNvPr id="1" name=""/>
+        <p:cNvGrpSpPr/>
+        <p:nvPr/>
+      </p:nvGrpSpPr>
+      <p:grpSpPr>
+        <a:xfrm>
+          <a:off x="0" y="0"/>
+          <a:ext cx="0" cy="0"/>
+          <a:chOff x="0" y="0"/>
+          <a:chExt cx="0" cy="0"/>
+        </a:xfrm>
+      </p:grpSpPr>
+      <p:sp>
+        <p:nvSpPr>
+          <p:cNvPr id="2" name="Title 1"/>
+          <p:cNvSpPr>
+            <a:spLocks noGrp="1"/>
+          </p:cNvSpPr>
+          <p:nvPr>
+            <p:ph type="title"/>
+          </p:nvPr>
+        </p:nvSpPr>
+        <p:spPr/>
+        <p:txBody>
+          <a:bodyPr/>
+          <a:lstStyle/>
+          <a:p>
+            <a:r>
+              <a:rPr lang="en-US" dirty="0" smtClean="0"/>
+              <a:t>Link for LL survey, re-evaluation</a:t>
+            </a:r>
+            <a:endParaRPr lang="en-US" dirty="0"/>
+          </a:p>
+        </p:txBody>
+      </p:sp>
+      <p:sp>
+        <p:nvSpPr>
+          <p:cNvPr id="3" name="Content Placeholder 2"/>
+          <p:cNvSpPr>
+            <a:spLocks noGrp="1"/>
+          </p:cNvSpPr>
+          <p:nvPr>
+            <p:ph idx="1"/>
+          </p:nvPr>
+        </p:nvSpPr>
+        <p:spPr/>
+        <p:txBody>
+          <a:bodyPr/>
+          <a:lstStyle/>
+          <a:p>
+            <a:r>
+              <a:rPr lang="en-US" dirty="0" smtClean="0"/>
+              <a:t>11% increase in 2022 SSB compared to 2019.1a</a:t>
+            </a:r>
+            <a:endParaRPr lang="en-US" dirty="0"/>
+          </a:p>
+        </p:txBody>
+      </p:sp>
+      <p:pic>
+        <p:nvPicPr>
+          <p:cNvPr id="6" name="Picture 5"/>
+          <p:cNvPicPr>
+            <a:picLocks noChangeAspect="1"/>
+          </p:cNvPicPr>
+          <p:nvPr/>
+        </p:nvPicPr>
+        <p:blipFill rotWithShape="1">
+          <a:blip r:embed="rId2" cstate="print">
+            <a:extLst>
+              <a:ext uri="{28A0092B-C50C-407E-A947-70E740481C1C}">
+                <a14:useLocalDpi xmlns:a14="http://schemas.microsoft.com/office/drawing/2010/main" val="0"/>
+              </a:ext>
+            </a:extLst>
+          </a:blip>
+          <a:srcRect t="2761" b="9892"/>
+          <a:stretch/>
+        </p:blipFill>
+        <p:spPr>
+          <a:xfrm>
+            <a:off x="2690813" y="2216150"/>
+            <a:ext cx="6786562" cy="4559888"/>
+          </a:xfrm>
+          <a:prstGeom prst="rect">
+            <a:avLst/>
+          </a:prstGeom>
+        </p:spPr>
+      </p:pic>
+    </p:spTree>
+    <p:extLst>
+      <p:ext uri="{BB962C8B-B14F-4D97-AF65-F5344CB8AC3E}">
+        <p14:creationId xmlns:p14="http://schemas.microsoft.com/office/powerpoint/2010/main" val="2445982729"/>
+      </p:ext>
+    </p:extLst>
+  </p:cSld>
+  <p:clrMapOvr>
+    <a:masterClrMapping/>
+  </p:clrMapOvr>
+</p:sld>
+</file>
+
+<file path=ppt/slides/slide16.xml><?xml version="1.0" encoding="utf-8"?>
+<p:sld xmlns:a="http://schemas.openxmlformats.org/drawingml/2006/main" xmlns:r="http://schemas.openxmlformats.org/officeDocument/2006/relationships" xmlns:p="http://schemas.openxmlformats.org/presentationml/2006/main">
+  <p:cSld>
+    <p:spTree>
+      <p:nvGrpSpPr>
+        <p:cNvPr id="1" name=""/>
+        <p:cNvGrpSpPr/>
+        <p:nvPr/>
+      </p:nvGrpSpPr>
+      <p:grpSpPr>
+        <a:xfrm>
+          <a:off x="0" y="0"/>
+          <a:ext cx="0" cy="0"/>
+          <a:chOff x="0" y="0"/>
+          <a:chExt cx="0" cy="0"/>
+        </a:xfrm>
+      </p:grpSpPr>
+      <p:sp>
+        <p:nvSpPr>
+          <p:cNvPr id="2" name="Title 1"/>
+          <p:cNvSpPr>
+            <a:spLocks noGrp="1"/>
+          </p:cNvSpPr>
+          <p:nvPr>
+            <p:ph type="title"/>
+          </p:nvPr>
+        </p:nvSpPr>
+        <p:spPr/>
+        <p:txBody>
+          <a:bodyPr/>
+          <a:lstStyle/>
+          <a:p>
+            <a:r>
+              <a:rPr lang="en-US" dirty="0" smtClean="0"/>
+              <a:t>Link for LL survey, re-evaluation</a:t>
+            </a:r>
+            <a:endParaRPr lang="en-US" dirty="0"/>
+          </a:p>
+        </p:txBody>
+      </p:sp>
+      <p:sp>
+        <p:nvSpPr>
+          <p:cNvPr id="3" name="Content Placeholder 2"/>
+          <p:cNvSpPr>
+            <a:spLocks noGrp="1"/>
+          </p:cNvSpPr>
+          <p:nvPr>
+            <p:ph idx="1"/>
+          </p:nvPr>
+        </p:nvSpPr>
+        <p:spPr/>
+        <p:txBody>
+          <a:bodyPr/>
+          <a:lstStyle/>
+          <a:p>
+            <a:r>
+              <a:rPr lang="en-US" dirty="0" smtClean="0"/>
+              <a:t>Recommendation: Bring forward 2019.1d, with new CFSR index, as alternative model in November</a:t>
+            </a:r>
+          </a:p>
+          <a:p>
+            <a:endParaRPr lang="en-US" dirty="0"/>
+          </a:p>
+          <a:p>
+            <a:r>
+              <a:rPr lang="en-US" dirty="0" smtClean="0"/>
+              <a:t>Food for thought:</a:t>
+            </a:r>
+          </a:p>
+          <a:p>
+            <a:pPr lvl="1"/>
+            <a:r>
+              <a:rPr lang="en-US" dirty="0" smtClean="0"/>
+              <a:t>Evaluation of environmental links is a fluid and iterative process</a:t>
+            </a:r>
+          </a:p>
+          <a:p>
+            <a:pPr lvl="1"/>
+            <a:r>
+              <a:rPr lang="en-US" dirty="0" smtClean="0"/>
+              <a:t>Will be evaluating new indices, will be evaluating links, will continually be evaluating model to find improvements</a:t>
+            </a:r>
+            <a:endParaRPr lang="en-US" dirty="0"/>
+          </a:p>
+        </p:txBody>
+      </p:sp>
+    </p:spTree>
+    <p:extLst>
+      <p:ext uri="{BB962C8B-B14F-4D97-AF65-F5344CB8AC3E}">
+        <p14:creationId xmlns:p14="http://schemas.microsoft.com/office/powerpoint/2010/main" val="1105604396"/>
+      </p:ext>
+    </p:extLst>
+  </p:cSld>
+  <p:clrMapOvr>
+    <a:masterClrMapping/>
+  </p:clrMapOvr>
+</p:sld>
+</file>
+
+<file path=ppt/slides/slide17.xml><?xml version="1.0" encoding="utf-8"?>
+<p:sld xmlns:a="http://schemas.openxmlformats.org/drawingml/2006/main" xmlns:r="http://schemas.openxmlformats.org/officeDocument/2006/relationships" xmlns:p="http://schemas.openxmlformats.org/presentationml/2006/main">
+  <p:cSld>
+    <p:spTree>
+      <p:nvGrpSpPr>
+        <p:cNvPr id="1" name=""/>
+        <p:cNvGrpSpPr/>
+        <p:nvPr/>
+      </p:nvGrpSpPr>
+      <p:grpSpPr>
+        <a:xfrm>
+          <a:off x="0" y="0"/>
+          <a:ext cx="0" cy="0"/>
+          <a:chOff x="0" y="0"/>
+          <a:chExt cx="0" cy="0"/>
+        </a:xfrm>
+      </p:grpSpPr>
+      <p:sp>
+        <p:nvSpPr>
+          <p:cNvPr id="2" name="Title 1"/>
+          <p:cNvSpPr>
+            <a:spLocks noGrp="1"/>
+          </p:cNvSpPr>
+          <p:nvPr>
+            <p:ph type="title"/>
+          </p:nvPr>
+        </p:nvSpPr>
+        <p:spPr/>
+        <p:txBody>
+          <a:bodyPr/>
+          <a:lstStyle/>
+          <a:p>
+            <a:r>
+              <a:rPr lang="en-US" dirty="0" smtClean="0"/>
+              <a:t>Environmental l</a:t>
+            </a:r>
+            <a:r>
+              <a:rPr lang="en-US" dirty="0" smtClean="0"/>
+              <a:t>ink </a:t>
+            </a:r>
+            <a:r>
+              <a:rPr lang="en-US" dirty="0" smtClean="0"/>
+              <a:t>for growth</a:t>
+            </a:r>
+            <a:endParaRPr lang="en-US" dirty="0"/>
+          </a:p>
+        </p:txBody>
+      </p:sp>
+      <p:sp>
+        <p:nvSpPr>
+          <p:cNvPr id="3" name="Content Placeholder 2"/>
+          <p:cNvSpPr>
+            <a:spLocks noGrp="1"/>
+          </p:cNvSpPr>
+          <p:nvPr>
+            <p:ph idx="1"/>
+          </p:nvPr>
+        </p:nvSpPr>
+        <p:spPr/>
+        <p:txBody>
+          <a:bodyPr/>
+          <a:lstStyle/>
+          <a:p>
+            <a:r>
+              <a:rPr lang="en-US" dirty="0" smtClean="0"/>
+              <a:t>Step 1: </a:t>
+            </a:r>
+          </a:p>
+          <a:p>
+            <a:pPr lvl="1"/>
+            <a:r>
+              <a:rPr lang="en-US" dirty="0"/>
+              <a:t>E</a:t>
+            </a:r>
+            <a:r>
+              <a:rPr lang="en-US" dirty="0" smtClean="0"/>
+              <a:t>valuated </a:t>
+            </a:r>
+            <a:r>
+              <a:rPr lang="en-US" dirty="0" err="1" smtClean="0"/>
+              <a:t>Linf</a:t>
+            </a:r>
+            <a:r>
+              <a:rPr lang="en-US" dirty="0"/>
+              <a:t> </a:t>
+            </a:r>
+            <a:r>
+              <a:rPr lang="en-US" dirty="0" smtClean="0"/>
+              <a:t>and kappa across length bin and month</a:t>
+            </a:r>
+          </a:p>
+          <a:p>
+            <a:pPr lvl="1"/>
+            <a:r>
+              <a:rPr lang="en-US" dirty="0" smtClean="0"/>
+              <a:t>Evaluated </a:t>
+            </a:r>
+            <a:r>
+              <a:rPr lang="en-US" dirty="0" err="1" smtClean="0"/>
+              <a:t>Lzero</a:t>
+            </a:r>
+            <a:r>
+              <a:rPr lang="en-US" dirty="0" smtClean="0"/>
+              <a:t> across month for 0-20 cm length bin</a:t>
+            </a:r>
+          </a:p>
+          <a:p>
+            <a:r>
+              <a:rPr lang="en-US" dirty="0" smtClean="0"/>
+              <a:t>Step 2:</a:t>
+            </a:r>
+          </a:p>
+          <a:p>
+            <a:pPr lvl="1"/>
+            <a:r>
+              <a:rPr lang="en-US" dirty="0" smtClean="0"/>
+              <a:t>Select best from Step 1, and run model with </a:t>
+            </a:r>
+            <a:r>
+              <a:rPr lang="en-US" dirty="0" err="1" smtClean="0"/>
+              <a:t>env</a:t>
+            </a:r>
+            <a:r>
+              <a:rPr lang="en-US" dirty="0" smtClean="0"/>
+              <a:t> link for all 3 growth parameters</a:t>
+            </a:r>
+          </a:p>
+          <a:p>
+            <a:r>
+              <a:rPr lang="en-US" dirty="0" smtClean="0"/>
+              <a:t>Step 3:</a:t>
+            </a:r>
+          </a:p>
+          <a:p>
+            <a:pPr lvl="1"/>
+            <a:r>
+              <a:rPr lang="en-US" dirty="0" smtClean="0"/>
+              <a:t>Compare with base model</a:t>
+            </a:r>
+          </a:p>
+          <a:p>
+            <a:pPr lvl="1"/>
+            <a:r>
+              <a:rPr lang="en-US" dirty="0" smtClean="0"/>
+              <a:t>Statistics: current year AIC and model fits, retrospective AIC and performance</a:t>
+            </a:r>
+          </a:p>
+        </p:txBody>
+      </p:sp>
+    </p:spTree>
+    <p:extLst>
+      <p:ext uri="{BB962C8B-B14F-4D97-AF65-F5344CB8AC3E}">
+        <p14:creationId xmlns:p14="http://schemas.microsoft.com/office/powerpoint/2010/main" val="916100377"/>
+      </p:ext>
+    </p:extLst>
+  </p:cSld>
+  <p:clrMapOvr>
+    <a:masterClrMapping/>
+  </p:clrMapOvr>
+</p:sld>
+</file>
+
+<file path=ppt/slides/slide18.xml><?xml version="1.0" encoding="utf-8"?>
+<p:sld xmlns:a="http://schemas.openxmlformats.org/drawingml/2006/main" xmlns:r="http://schemas.openxmlformats.org/officeDocument/2006/relationships" xmlns:p="http://schemas.openxmlformats.org/presentationml/2006/main">
+  <p:cSld>
+    <p:spTree>
+      <p:nvGrpSpPr>
+        <p:cNvPr id="1" name=""/>
+        <p:cNvGrpSpPr/>
+        <p:nvPr/>
+      </p:nvGrpSpPr>
+      <p:grpSpPr>
+        <a:xfrm>
+          <a:off x="0" y="0"/>
+          <a:ext cx="0" cy="0"/>
+          <a:chOff x="0" y="0"/>
+          <a:chExt cx="0" cy="0"/>
+        </a:xfrm>
+      </p:grpSpPr>
+      <p:sp>
+        <p:nvSpPr>
+          <p:cNvPr id="2" name="Title 1"/>
+          <p:cNvSpPr>
+            <a:spLocks noGrp="1"/>
+          </p:cNvSpPr>
+          <p:nvPr>
+            <p:ph type="title"/>
+          </p:nvPr>
+        </p:nvSpPr>
+        <p:spPr/>
+        <p:txBody>
+          <a:bodyPr/>
+          <a:lstStyle/>
+          <a:p>
+            <a:r>
+              <a:rPr lang="en-US" dirty="0" smtClean="0"/>
+              <a:t>Link for growth</a:t>
+            </a:r>
+            <a:endParaRPr lang="en-US" dirty="0"/>
+          </a:p>
+        </p:txBody>
+      </p:sp>
+      <p:sp>
+        <p:nvSpPr>
+          <p:cNvPr id="3" name="Content Placeholder 2"/>
+          <p:cNvSpPr>
+            <a:spLocks noGrp="1"/>
+          </p:cNvSpPr>
+          <p:nvPr>
+            <p:ph idx="1"/>
+          </p:nvPr>
+        </p:nvSpPr>
+        <p:spPr>
+          <a:xfrm>
+            <a:off x="838200" y="1400176"/>
+            <a:ext cx="10515600" cy="5457824"/>
+          </a:xfrm>
+        </p:spPr>
+        <p:txBody>
+          <a:bodyPr>
+            <a:normAutofit fontScale="92500" lnSpcReduction="10000"/>
+          </a:bodyPr>
+          <a:lstStyle/>
+          <a:p>
+            <a:r>
+              <a:rPr lang="en-US" dirty="0" smtClean="0"/>
+              <a:t>Step 1: difference in AIC with base model (</a:t>
+            </a:r>
+            <a:r>
+              <a:rPr lang="en-US" dirty="0" err="1" smtClean="0"/>
+              <a:t>EnvLnk</a:t>
+            </a:r>
+            <a:r>
+              <a:rPr lang="en-US" dirty="0" smtClean="0"/>
+              <a:t> – base, so negative number means </a:t>
+            </a:r>
+            <a:r>
+              <a:rPr lang="en-US" dirty="0" err="1" smtClean="0"/>
+              <a:t>EnvLnk</a:t>
+            </a:r>
+            <a:r>
+              <a:rPr lang="en-US" dirty="0" smtClean="0"/>
+              <a:t> model better)</a:t>
+            </a:r>
+          </a:p>
+          <a:p>
+            <a:endParaRPr lang="en-US" dirty="0"/>
+          </a:p>
+          <a:p>
+            <a:endParaRPr lang="en-US" dirty="0" smtClean="0"/>
+          </a:p>
+          <a:p>
+            <a:endParaRPr lang="en-US" dirty="0"/>
+          </a:p>
+          <a:p>
+            <a:endParaRPr lang="en-US" dirty="0" smtClean="0"/>
+          </a:p>
+          <a:p>
+            <a:endParaRPr lang="en-US" dirty="0"/>
+          </a:p>
+          <a:p>
+            <a:endParaRPr lang="en-US" dirty="0" smtClean="0"/>
+          </a:p>
+          <a:p>
+            <a:endParaRPr lang="en-US" dirty="0" smtClean="0"/>
+          </a:p>
+          <a:p>
+            <a:endParaRPr lang="en-US" dirty="0" smtClean="0"/>
+          </a:p>
+          <a:p>
+            <a:endParaRPr lang="en-US" dirty="0"/>
+          </a:p>
+          <a:p>
+            <a:r>
+              <a:rPr lang="en-US" dirty="0" err="1" smtClean="0"/>
+              <a:t>Linf</a:t>
+            </a:r>
+            <a:r>
+              <a:rPr lang="en-US" dirty="0" smtClean="0"/>
+              <a:t> </a:t>
+            </a:r>
+            <a:r>
+              <a:rPr lang="en-US" dirty="0" smtClean="0"/>
+              <a:t>&gt; </a:t>
+            </a:r>
+            <a:r>
+              <a:rPr lang="en-US" dirty="0" err="1" smtClean="0"/>
+              <a:t>Lzero</a:t>
+            </a:r>
+            <a:r>
+              <a:rPr lang="en-US" dirty="0" smtClean="0"/>
+              <a:t> &gt; kappa for model improvement</a:t>
+            </a:r>
+          </a:p>
+        </p:txBody>
+      </p:sp>
+      <p:grpSp>
+        <p:nvGrpSpPr>
+          <p:cNvPr id="12" name="Group 11"/>
+          <p:cNvGrpSpPr/>
+          <p:nvPr/>
+        </p:nvGrpSpPr>
+        <p:grpSpPr>
+          <a:xfrm>
+            <a:off x="428625" y="2019298"/>
+            <a:ext cx="11334750" cy="4067177"/>
+            <a:chOff x="209550" y="2447923"/>
+            <a:chExt cx="9896475" cy="3100461"/>
+          </a:xfrm>
+        </p:grpSpPr>
+        <p:pic>
+          <p:nvPicPr>
+            <p:cNvPr id="4" name="Picture 3"/>
+            <p:cNvPicPr>
+              <a:picLocks noChangeAspect="1"/>
+            </p:cNvPicPr>
+            <p:nvPr/>
+          </p:nvPicPr>
+          <p:blipFill>
+            <a:blip r:embed="rId2"/>
+            <a:stretch>
+              <a:fillRect/>
+            </a:stretch>
+          </p:blipFill>
+          <p:spPr>
+            <a:xfrm>
+              <a:off x="209550" y="2447924"/>
+              <a:ext cx="4207434" cy="3095625"/>
+            </a:xfrm>
+            <a:prstGeom prst="rect">
+              <a:avLst/>
+            </a:prstGeom>
+          </p:spPr>
+        </p:pic>
+        <p:pic>
+          <p:nvPicPr>
+            <p:cNvPr id="8" name="Picture 7"/>
+            <p:cNvPicPr>
+              <a:picLocks noChangeAspect="1"/>
+            </p:cNvPicPr>
+            <p:nvPr/>
+          </p:nvPicPr>
+          <p:blipFill>
+            <a:blip r:embed="rId3"/>
+            <a:stretch>
+              <a:fillRect/>
+            </a:stretch>
+          </p:blipFill>
+          <p:spPr>
+            <a:xfrm>
+              <a:off x="4448175" y="2447923"/>
+              <a:ext cx="4207434" cy="3095625"/>
+            </a:xfrm>
+            <a:prstGeom prst="rect">
+              <a:avLst/>
+            </a:prstGeom>
+          </p:spPr>
+        </p:pic>
+        <p:pic>
+          <p:nvPicPr>
+            <p:cNvPr id="11" name="Picture 10"/>
+            <p:cNvPicPr>
+              <a:picLocks noChangeAspect="1"/>
+            </p:cNvPicPr>
+            <p:nvPr/>
+          </p:nvPicPr>
+          <p:blipFill>
+            <a:blip r:embed="rId4"/>
+            <a:stretch>
+              <a:fillRect/>
+            </a:stretch>
+          </p:blipFill>
+          <p:spPr>
+            <a:xfrm>
+              <a:off x="8686800" y="2447923"/>
+              <a:ext cx="1419225" cy="3100461"/>
+            </a:xfrm>
+            <a:prstGeom prst="rect">
+              <a:avLst/>
+            </a:prstGeom>
+          </p:spPr>
+        </p:pic>
+      </p:grpSp>
+    </p:spTree>
+    <p:extLst>
+      <p:ext uri="{BB962C8B-B14F-4D97-AF65-F5344CB8AC3E}">
+        <p14:creationId xmlns:p14="http://schemas.microsoft.com/office/powerpoint/2010/main" val="3079657574"/>
+      </p:ext>
+    </p:extLst>
+  </p:cSld>
+  <p:clrMapOvr>
+    <a:masterClrMapping/>
+  </p:clrMapOvr>
+</p:sld>
+</file>
+
+<file path=ppt/slides/slide19.xml><?xml version="1.0" encoding="utf-8"?>
+<p:sld xmlns:a="http://schemas.openxmlformats.org/drawingml/2006/main" xmlns:r="http://schemas.openxmlformats.org/officeDocument/2006/relationships" xmlns:p="http://schemas.openxmlformats.org/presentationml/2006/main">
+  <p:cSld>
+    <p:spTree>
+      <p:nvGrpSpPr>
+        <p:cNvPr id="1" name=""/>
+        <p:cNvGrpSpPr/>
+        <p:nvPr/>
+      </p:nvGrpSpPr>
+      <p:grpSpPr>
+        <a:xfrm>
+          <a:off x="0" y="0"/>
+          <a:ext cx="0" cy="0"/>
+          <a:chOff x="0" y="0"/>
+          <a:chExt cx="0" cy="0"/>
+        </a:xfrm>
+      </p:grpSpPr>
+      <p:sp>
+        <p:nvSpPr>
+          <p:cNvPr id="2" name="Title 1"/>
+          <p:cNvSpPr>
+            <a:spLocks noGrp="1"/>
+          </p:cNvSpPr>
+          <p:nvPr>
+            <p:ph type="title"/>
+          </p:nvPr>
+        </p:nvSpPr>
+        <p:spPr/>
+        <p:txBody>
+          <a:bodyPr/>
+          <a:lstStyle/>
+          <a:p>
+            <a:r>
+              <a:rPr lang="en-US" dirty="0" smtClean="0"/>
+              <a:t>Link for growth</a:t>
+            </a:r>
+            <a:endParaRPr lang="en-US" dirty="0"/>
+          </a:p>
+        </p:txBody>
+      </p:sp>
+      <p:sp>
+        <p:nvSpPr>
+          <p:cNvPr id="3" name="Content Placeholder 2"/>
+          <p:cNvSpPr>
+            <a:spLocks noGrp="1"/>
+          </p:cNvSpPr>
+          <p:nvPr>
+            <p:ph idx="1"/>
+          </p:nvPr>
+        </p:nvSpPr>
+        <p:spPr/>
+        <p:txBody>
+          <a:bodyPr>
+            <a:normAutofit/>
+          </a:bodyPr>
+          <a:lstStyle/>
+          <a:p>
+            <a:r>
+              <a:rPr lang="en-US" dirty="0" smtClean="0"/>
+              <a:t>Step 2: AIC</a:t>
+            </a:r>
+            <a:r>
+              <a:rPr lang="en-US" dirty="0"/>
+              <a:t> </a:t>
+            </a:r>
+            <a:r>
+              <a:rPr lang="en-US" dirty="0" smtClean="0"/>
+              <a:t>&amp; likelihoods</a:t>
+            </a:r>
+            <a:endParaRPr lang="en-US" dirty="0"/>
+          </a:p>
+          <a:p>
+            <a:endParaRPr lang="en-US" dirty="0" smtClean="0"/>
+          </a:p>
+          <a:p>
+            <a:endParaRPr lang="en-US" dirty="0"/>
+          </a:p>
+          <a:p>
+            <a:endParaRPr lang="en-US" dirty="0" smtClean="0"/>
+          </a:p>
+          <a:p>
+            <a:pPr marL="0" indent="0">
+              <a:buNone/>
+            </a:pPr>
+            <a:endParaRPr lang="en-US" dirty="0"/>
+          </a:p>
+        </p:txBody>
+      </p:sp>
+      <p:pic>
+        <p:nvPicPr>
+          <p:cNvPr id="13" name="Picture 12"/>
+          <p:cNvPicPr>
+            <a:picLocks noChangeAspect="1"/>
+          </p:cNvPicPr>
+          <p:nvPr/>
+        </p:nvPicPr>
+        <p:blipFill>
+          <a:blip r:embed="rId2"/>
+          <a:stretch>
+            <a:fillRect/>
+          </a:stretch>
+        </p:blipFill>
+        <p:spPr>
+          <a:xfrm>
+            <a:off x="1333499" y="2609849"/>
+            <a:ext cx="4535129" cy="1171575"/>
+          </a:xfrm>
+          <a:prstGeom prst="rect">
+            <a:avLst/>
+          </a:prstGeom>
+        </p:spPr>
+      </p:pic>
+      <p:pic>
+        <p:nvPicPr>
+          <p:cNvPr id="14" name="Picture 13"/>
+          <p:cNvPicPr>
+            <a:picLocks noChangeAspect="1"/>
+          </p:cNvPicPr>
+          <p:nvPr/>
+        </p:nvPicPr>
+        <p:blipFill>
+          <a:blip r:embed="rId3"/>
+          <a:stretch>
+            <a:fillRect/>
+          </a:stretch>
+        </p:blipFill>
+        <p:spPr>
+          <a:xfrm>
+            <a:off x="6363927" y="2266551"/>
+            <a:ext cx="5084572" cy="3029745"/>
+          </a:xfrm>
+          <a:prstGeom prst="rect">
+            <a:avLst/>
+          </a:prstGeom>
+        </p:spPr>
+      </p:pic>
+    </p:spTree>
+    <p:extLst>
+      <p:ext uri="{BB962C8B-B14F-4D97-AF65-F5344CB8AC3E}">
+        <p14:creationId xmlns:p14="http://schemas.microsoft.com/office/powerpoint/2010/main" val="3851483548"/>
       </p:ext>
     </p:extLst>
   </p:cSld>
@@ -3422,17 +4683,17 @@
         <p:spPr/>
         <p:txBody>
           <a:bodyPr>
-            <a:normAutofit lnSpcReduction="10000"/>
+            <a:normAutofit fontScale="92500" lnSpcReduction="10000"/>
           </a:bodyPr>
           <a:lstStyle/>
           <a:p>
             <a:r>
               <a:rPr lang="en-US" dirty="0" smtClean="0"/>
-              <a:t>Housecleaning (</a:t>
-            </a:r>
-            <a:r>
-              <a:rPr lang="en-US" dirty="0" err="1" smtClean="0"/>
-              <a:t>minsamplesize</a:t>
+              <a:t>Housecleaning </a:t>
+            </a:r>
+            <a:r>
+              <a:rPr lang="en-US" dirty="0" smtClean="0"/>
+              <a:t>(CAAL minimum sample size</a:t>
             </a:r>
             <a:r>
               <a:rPr lang="en-US" dirty="0" smtClean="0"/>
@@ -3442,14 +4703,87 @@
           <a:p>
             <a:r>
               <a:rPr lang="en-US" dirty="0" smtClean="0"/>
-              <a:t>Environmental link</a:t>
+              <a:t>Review of e</a:t>
+            </a:r>
+            <a:r>
+              <a:rPr lang="en-US" dirty="0" smtClean="0"/>
+              <a:t>nvironmental </a:t>
+            </a:r>
+            <a:r>
+              <a:rPr lang="en-US" dirty="0" smtClean="0"/>
+              <a:t>link</a:t>
             </a:r>
           </a:p>
           <a:p>
             <a:pPr lvl="1"/>
             <a:r>
               <a:rPr lang="en-US" dirty="0" smtClean="0"/>
-              <a:t>Description of environmental </a:t>
+              <a:t>Refresher on CFSR</a:t>
+            </a:r>
+            <a:endParaRPr lang="en-US" dirty="0" smtClean="0"/>
+          </a:p>
+          <a:p>
+            <a:r>
+              <a:rPr lang="en-US" dirty="0"/>
+              <a:t>Link for </a:t>
+            </a:r>
+            <a:r>
+              <a:rPr lang="en-US" dirty="0" smtClean="0"/>
+              <a:t>Longline </a:t>
+            </a:r>
+            <a:r>
+              <a:rPr lang="en-US" dirty="0"/>
+              <a:t>survey </a:t>
+            </a:r>
+            <a:r>
+              <a:rPr lang="en-US" dirty="0" smtClean="0"/>
+              <a:t>catchability</a:t>
+            </a:r>
+            <a:endParaRPr lang="en-US" dirty="0"/>
+          </a:p>
+          <a:p>
+            <a:pPr lvl="1"/>
+            <a:r>
+              <a:rPr lang="en-US" dirty="0"/>
+              <a:t>Retrospective comparison w/ and w/o </a:t>
+            </a:r>
+            <a:r>
+              <a:rPr lang="en-US" dirty="0" smtClean="0"/>
+              <a:t>environmental link (SSC request)</a:t>
+            </a:r>
+            <a:endParaRPr lang="en-US" dirty="0"/>
+          </a:p>
+          <a:p>
+            <a:pPr lvl="1"/>
+            <a:r>
+              <a:rPr lang="en-US" dirty="0" smtClean="0"/>
+              <a:t>Revaluation of CFSR index</a:t>
+            </a:r>
+            <a:endParaRPr lang="en-US" dirty="0" smtClean="0"/>
+          </a:p>
+          <a:p>
+            <a:r>
+              <a:rPr lang="en-US" dirty="0" smtClean="0"/>
+              <a:t>Link for growth</a:t>
+            </a:r>
+          </a:p>
+          <a:p>
+            <a:pPr lvl="1"/>
+            <a:r>
+              <a:rPr lang="en-US" dirty="0" smtClean="0"/>
+              <a:t>Individual </a:t>
+            </a:r>
+            <a:r>
+              <a:rPr lang="en-US" dirty="0" smtClean="0"/>
+              <a:t>growth parameters</a:t>
+            </a:r>
+            <a:r>
+              <a:rPr lang="en-US" dirty="0" smtClean="0"/>
+              <a:t>: </a:t>
+            </a:r>
+            <a:r>
+              <a:rPr lang="en-US" dirty="0" smtClean="0"/>
+              <a:t>determining most appropriate CFSR </a:t>
             </a:r>
             <a:r>
               <a:rPr lang="en-US" dirty="0" smtClean="0"/>
@@ -3457,75 +4791,43 @@
             </a:r>
           </a:p>
           <a:p>
-            <a:r>
-              <a:rPr lang="en-US" dirty="0"/>
-              <a:t>Link for LL survey q</a:t>
-            </a:r>
-          </a:p>
-          <a:p>
             <a:pPr lvl="1"/>
             <a:r>
-              <a:rPr lang="en-US" dirty="0"/>
-              <a:t>Retrospective comparison w/ and w/o link</a:t>
+              <a:rPr lang="en-US" dirty="0" smtClean="0"/>
+              <a:t>Combined </a:t>
+            </a:r>
+            <a:r>
+              <a:rPr lang="en-US" dirty="0" smtClean="0"/>
+              <a:t>growth model </a:t>
+            </a:r>
+            <a:r>
+              <a:rPr lang="en-US" dirty="0" smtClean="0"/>
+              <a:t>&amp; </a:t>
+            </a:r>
+            <a:r>
+              <a:rPr lang="en-US" dirty="0" smtClean="0"/>
+              <a:t>comparison </a:t>
+            </a:r>
+            <a:r>
+              <a:rPr lang="en-US" dirty="0" smtClean="0"/>
+              <a:t>with base model</a:t>
             </a:r>
           </a:p>
           <a:p>
             <a:pPr lvl="1"/>
             <a:r>
-              <a:rPr lang="en-US" dirty="0"/>
-              <a:t>Evaluation of new </a:t>
-            </a:r>
-            <a:r>
-              <a:rPr lang="en-US" dirty="0" smtClean="0"/>
-              <a:t>index</a:t>
-            </a:r>
-            <a:endParaRPr lang="en-US" dirty="0" smtClean="0"/>
-          </a:p>
-          <a:p>
-            <a:r>
-              <a:rPr lang="en-US" dirty="0" smtClean="0"/>
-              <a:t>Link for growth</a:t>
-            </a:r>
-          </a:p>
-          <a:p>
-            <a:pPr lvl="1"/>
-            <a:r>
-              <a:rPr lang="en-US" dirty="0" smtClean="0"/>
-              <a:t>Individual parameters: determining index</a:t>
-            </a:r>
-          </a:p>
-          <a:p>
-            <a:pPr lvl="1"/>
-            <a:r>
-              <a:rPr lang="en-US" dirty="0" smtClean="0"/>
-              <a:t>Combined </a:t>
-            </a:r>
-            <a:r>
-              <a:rPr lang="en-US" dirty="0" smtClean="0"/>
-              <a:t>model &amp; </a:t>
-            </a:r>
-            <a:r>
-              <a:rPr lang="en-US" dirty="0"/>
-              <a:t>c</a:t>
-            </a:r>
-            <a:r>
-              <a:rPr lang="en-US" dirty="0" smtClean="0"/>
-              <a:t>omparisons </a:t>
-            </a:r>
-            <a:r>
-              <a:rPr lang="en-US" dirty="0" smtClean="0"/>
-              <a:t>with base </a:t>
-            </a:r>
-            <a:r>
-              <a:rPr lang="en-US" dirty="0" smtClean="0"/>
-              <a:t>model</a:t>
-            </a:r>
-          </a:p>
-          <a:p>
-            <a:pPr lvl="1"/>
-            <a:r>
-              <a:rPr lang="en-US" dirty="0" smtClean="0"/>
-              <a:t>Path forward</a:t>
+              <a:rPr lang="en-US" dirty="0" smtClean="0"/>
+              <a:t>Path </a:t>
+            </a:r>
+            <a:r>
+              <a:rPr lang="en-US" dirty="0" smtClean="0"/>
+              <a:t>forward</a:t>
+            </a:r>
+          </a:p>
+          <a:p>
+            <a:r>
+              <a:rPr lang="en-US" dirty="0" smtClean="0"/>
+              <a:t>Recommendations for November 2023</a:t>
             </a:r>
             <a:endParaRPr lang="en-US" dirty="0" smtClean="0"/>
           </a:p>
@@ -3535,6 +4837,1079 @@
     <p:extLst>
       <p:ext uri="{BB962C8B-B14F-4D97-AF65-F5344CB8AC3E}">
         <p14:creationId xmlns:p14="http://schemas.microsoft.com/office/powerpoint/2010/main" val="1519735260"/>
+      </p:ext>
+    </p:extLst>
+  </p:cSld>
+  <p:clrMapOvr>
+    <a:masterClrMapping/>
+  </p:clrMapOvr>
+</p:sld>
+</file>
+
+<file path=ppt/slides/slide20.xml><?xml version="1.0" encoding="utf-8"?>
+<p:sld xmlns:a="http://schemas.openxmlformats.org/drawingml/2006/main" xmlns:r="http://schemas.openxmlformats.org/officeDocument/2006/relationships" xmlns:p="http://schemas.openxmlformats.org/presentationml/2006/main">
+  <p:cSld>
+    <p:spTree>
+      <p:nvGrpSpPr>
+        <p:cNvPr id="1" name=""/>
+        <p:cNvGrpSpPr/>
+        <p:nvPr/>
+      </p:nvGrpSpPr>
+      <p:grpSpPr>
+        <a:xfrm>
+          <a:off x="0" y="0"/>
+          <a:ext cx="0" cy="0"/>
+          <a:chOff x="0" y="0"/>
+          <a:chExt cx="0" cy="0"/>
+        </a:xfrm>
+      </p:grpSpPr>
+      <p:grpSp>
+        <p:nvGrpSpPr>
+          <p:cNvPr id="19" name="Group 18"/>
+          <p:cNvGrpSpPr/>
+          <p:nvPr/>
+        </p:nvGrpSpPr>
+        <p:grpSpPr>
+          <a:xfrm>
+            <a:off x="5019675" y="365126"/>
+            <a:ext cx="7172325" cy="6450162"/>
+            <a:chOff x="5393649" y="1348146"/>
+            <a:chExt cx="6360201" cy="5467141"/>
+          </a:xfrm>
+        </p:grpSpPr>
+        <p:pic>
+          <p:nvPicPr>
+            <p:cNvPr id="16" name="Picture 15"/>
+            <p:cNvPicPr>
+              <a:picLocks noChangeAspect="1"/>
+            </p:cNvPicPr>
+            <p:nvPr/>
+          </p:nvPicPr>
+          <p:blipFill rotWithShape="1">
+            <a:blip r:embed="rId2" cstate="print">
+              <a:extLst>
+                <a:ext uri="{28A0092B-C50C-407E-A947-70E740481C1C}">
+                  <a14:useLocalDpi xmlns:a14="http://schemas.microsoft.com/office/drawing/2010/main" val="0"/>
+                </a:ext>
+              </a:extLst>
+            </a:blip>
+            <a:srcRect t="50801" r="50481" b="29808"/>
+            <a:stretch/>
+          </p:blipFill>
+          <p:spPr>
+            <a:xfrm>
+              <a:off x="8351002" y="1351509"/>
+              <a:ext cx="3375594" cy="1321833"/>
+            </a:xfrm>
+            <a:prstGeom prst="rect">
+              <a:avLst/>
+            </a:prstGeom>
+          </p:spPr>
+        </p:pic>
+        <p:pic>
+          <p:nvPicPr>
+            <p:cNvPr id="17" name="Picture 16"/>
+            <p:cNvPicPr>
+              <a:picLocks noChangeAspect="1"/>
+            </p:cNvPicPr>
+            <p:nvPr/>
+          </p:nvPicPr>
+          <p:blipFill rotWithShape="1">
+            <a:blip r:embed="rId3" cstate="print">
+              <a:extLst>
+                <a:ext uri="{28A0092B-C50C-407E-A947-70E740481C1C}">
+                  <a14:useLocalDpi xmlns:a14="http://schemas.microsoft.com/office/drawing/2010/main" val="0"/>
+                </a:ext>
+              </a:extLst>
+            </a:blip>
+            <a:srcRect t="51122" r="51122" b="29647"/>
+            <a:stretch/>
+          </p:blipFill>
+          <p:spPr>
+            <a:xfrm>
+              <a:off x="8337171" y="2649049"/>
+              <a:ext cx="3363625" cy="1323392"/>
+            </a:xfrm>
+            <a:prstGeom prst="rect">
+              <a:avLst/>
+            </a:prstGeom>
+          </p:spPr>
+        </p:pic>
+        <p:pic>
+          <p:nvPicPr>
+            <p:cNvPr id="18" name="Picture 17"/>
+            <p:cNvPicPr>
+              <a:picLocks noChangeAspect="1"/>
+            </p:cNvPicPr>
+            <p:nvPr/>
+          </p:nvPicPr>
+          <p:blipFill rotWithShape="1">
+            <a:blip r:embed="rId4" cstate="print">
+              <a:extLst>
+                <a:ext uri="{28A0092B-C50C-407E-A947-70E740481C1C}">
+                  <a14:useLocalDpi xmlns:a14="http://schemas.microsoft.com/office/drawing/2010/main" val="0"/>
+                </a:ext>
+              </a:extLst>
+            </a:blip>
+            <a:srcRect t="28525" r="51122" b="52083"/>
+            <a:stretch/>
+          </p:blipFill>
+          <p:spPr>
+            <a:xfrm>
+              <a:off x="8337171" y="3933036"/>
+              <a:ext cx="3363625" cy="1334419"/>
+            </a:xfrm>
+            <a:prstGeom prst="rect">
+              <a:avLst/>
+            </a:prstGeom>
+          </p:spPr>
+        </p:pic>
+        <p:grpSp>
+          <p:nvGrpSpPr>
+            <p:cNvPr id="12" name="Group 11"/>
+            <p:cNvGrpSpPr/>
+            <p:nvPr/>
+          </p:nvGrpSpPr>
+          <p:grpSpPr>
+            <a:xfrm>
+              <a:off x="5393649" y="5200645"/>
+              <a:ext cx="6360201" cy="1614642"/>
+              <a:chOff x="5384124" y="4610100"/>
+              <a:chExt cx="6360201" cy="1614642"/>
+            </a:xfrm>
+          </p:grpSpPr>
+          <p:pic>
+            <p:nvPicPr>
+              <p:cNvPr id="6" name="Picture 5"/>
+              <p:cNvPicPr>
+                <a:picLocks noChangeAspect="1"/>
+              </p:cNvPicPr>
+              <p:nvPr/>
+            </p:nvPicPr>
+            <p:blipFill rotWithShape="1">
+              <a:blip r:embed="rId5" cstate="print">
+                <a:extLst>
+                  <a:ext uri="{28A0092B-C50C-407E-A947-70E740481C1C}">
+                    <a14:useLocalDpi xmlns:a14="http://schemas.microsoft.com/office/drawing/2010/main" val="0"/>
+                  </a:ext>
+                </a:extLst>
+              </a:blip>
+              <a:srcRect t="50425" r="50466" b="26673"/>
+              <a:stretch/>
+            </p:blipFill>
+            <p:spPr>
+              <a:xfrm>
+                <a:off x="8314224" y="4610100"/>
+                <a:ext cx="3430101" cy="1614642"/>
+              </a:xfrm>
+              <a:prstGeom prst="rect">
+                <a:avLst/>
+              </a:prstGeom>
+            </p:spPr>
+          </p:pic>
+          <p:pic>
+            <p:nvPicPr>
+              <p:cNvPr id="5" name="Picture 4"/>
+              <p:cNvPicPr>
+                <a:picLocks noChangeAspect="1"/>
+              </p:cNvPicPr>
+              <p:nvPr/>
+            </p:nvPicPr>
+            <p:blipFill rotWithShape="1">
+              <a:blip r:embed="rId6" cstate="print">
+                <a:extLst>
+                  <a:ext uri="{28A0092B-C50C-407E-A947-70E740481C1C}">
+                    <a14:useLocalDpi xmlns:a14="http://schemas.microsoft.com/office/drawing/2010/main" val="0"/>
+                  </a:ext>
+                </a:extLst>
+              </a:blip>
+              <a:srcRect t="50830" r="51066" b="27173"/>
+              <a:stretch/>
+            </p:blipFill>
+            <p:spPr>
+              <a:xfrm>
+                <a:off x="5384124" y="4638675"/>
+                <a:ext cx="3388594" cy="1550850"/>
+              </a:xfrm>
+              <a:prstGeom prst="rect">
+                <a:avLst/>
+              </a:prstGeom>
+            </p:spPr>
+          </p:pic>
+        </p:grpSp>
+        <p:pic>
+          <p:nvPicPr>
+            <p:cNvPr id="13" name="Picture 12"/>
+            <p:cNvPicPr>
+              <a:picLocks noChangeAspect="1"/>
+            </p:cNvPicPr>
+            <p:nvPr/>
+          </p:nvPicPr>
+          <p:blipFill rotWithShape="1">
+            <a:blip r:embed="rId7" cstate="print">
+              <a:extLst>
+                <a:ext uri="{28A0092B-C50C-407E-A947-70E740481C1C}">
+                  <a14:useLocalDpi xmlns:a14="http://schemas.microsoft.com/office/drawing/2010/main" val="0"/>
+                </a:ext>
+              </a:extLst>
+            </a:blip>
+            <a:srcRect t="50801" r="50641" b="29808"/>
+            <a:stretch/>
+          </p:blipFill>
+          <p:spPr>
+            <a:xfrm>
+              <a:off x="5414556" y="1348146"/>
+              <a:ext cx="3356140" cy="1318482"/>
+            </a:xfrm>
+            <a:prstGeom prst="rect">
+              <a:avLst/>
+            </a:prstGeom>
+          </p:spPr>
+        </p:pic>
+        <p:pic>
+          <p:nvPicPr>
+            <p:cNvPr id="14" name="Picture 13"/>
+            <p:cNvPicPr>
+              <a:picLocks noChangeAspect="1"/>
+            </p:cNvPicPr>
+            <p:nvPr/>
+          </p:nvPicPr>
+          <p:blipFill rotWithShape="1">
+            <a:blip r:embed="rId8" cstate="print">
+              <a:extLst>
+                <a:ext uri="{28A0092B-C50C-407E-A947-70E740481C1C}">
+                  <a14:useLocalDpi xmlns:a14="http://schemas.microsoft.com/office/drawing/2010/main" val="0"/>
+                </a:ext>
+              </a:extLst>
+            </a:blip>
+            <a:srcRect t="50801" r="51122" b="29647"/>
+            <a:stretch/>
+          </p:blipFill>
+          <p:spPr>
+            <a:xfrm>
+              <a:off x="5410294" y="2627112"/>
+              <a:ext cx="3360402" cy="1344159"/>
+            </a:xfrm>
+            <a:prstGeom prst="rect">
+              <a:avLst/>
+            </a:prstGeom>
+          </p:spPr>
+        </p:pic>
+        <p:pic>
+          <p:nvPicPr>
+            <p:cNvPr id="15" name="Picture 14"/>
+            <p:cNvPicPr>
+              <a:picLocks noChangeAspect="1"/>
+            </p:cNvPicPr>
+            <p:nvPr/>
+          </p:nvPicPr>
+          <p:blipFill rotWithShape="1">
+            <a:blip r:embed="rId9" cstate="print">
+              <a:extLst>
+                <a:ext uri="{28A0092B-C50C-407E-A947-70E740481C1C}">
+                  <a14:useLocalDpi xmlns:a14="http://schemas.microsoft.com/office/drawing/2010/main" val="0"/>
+                </a:ext>
+              </a:extLst>
+            </a:blip>
+            <a:srcRect t="28366" r="50962" b="52083"/>
+            <a:stretch/>
+          </p:blipFill>
+          <p:spPr>
+            <a:xfrm>
+              <a:off x="5393649" y="3924295"/>
+              <a:ext cx="3377047" cy="1346402"/>
+            </a:xfrm>
+            <a:prstGeom prst="rect">
+              <a:avLst/>
+            </a:prstGeom>
+          </p:spPr>
+        </p:pic>
+      </p:grpSp>
+      <p:sp>
+        <p:nvSpPr>
+          <p:cNvPr id="2" name="Title 1"/>
+          <p:cNvSpPr>
+            <a:spLocks noGrp="1"/>
+          </p:cNvSpPr>
+          <p:nvPr>
+            <p:ph type="title"/>
+          </p:nvPr>
+        </p:nvSpPr>
+        <p:spPr/>
+        <p:txBody>
+          <a:bodyPr/>
+          <a:lstStyle/>
+          <a:p>
+            <a:r>
+              <a:rPr lang="en-US" dirty="0" smtClean="0"/>
+              <a:t>Link for growth</a:t>
+            </a:r>
+            <a:endParaRPr lang="en-US" dirty="0"/>
+          </a:p>
+        </p:txBody>
+      </p:sp>
+      <p:sp>
+        <p:nvSpPr>
+          <p:cNvPr id="3" name="Content Placeholder 2"/>
+          <p:cNvSpPr>
+            <a:spLocks noGrp="1"/>
+          </p:cNvSpPr>
+          <p:nvPr>
+            <p:ph idx="1"/>
+          </p:nvPr>
+        </p:nvSpPr>
+        <p:spPr>
+          <a:xfrm>
+            <a:off x="838200" y="1825625"/>
+            <a:ext cx="4121647" cy="4351338"/>
+          </a:xfrm>
+        </p:spPr>
+        <p:txBody>
+          <a:bodyPr>
+            <a:normAutofit/>
+          </a:bodyPr>
+          <a:lstStyle/>
+          <a:p>
+            <a:r>
+              <a:rPr lang="en-US" dirty="0" smtClean="0"/>
+              <a:t>Step 2: </a:t>
+            </a:r>
+            <a:r>
+              <a:rPr lang="en-US" dirty="0" smtClean="0"/>
+              <a:t>Example f</a:t>
+            </a:r>
+            <a:r>
+              <a:rPr lang="en-US" dirty="0" smtClean="0"/>
+              <a:t>its</a:t>
+            </a:r>
+          </a:p>
+          <a:p>
+            <a:pPr lvl="1"/>
+            <a:r>
+              <a:rPr lang="en-US" dirty="0" smtClean="0"/>
+              <a:t>Improvement to lack of fit identified in last assessment cycle</a:t>
+            </a:r>
+            <a:endParaRPr lang="en-US" dirty="0" smtClean="0"/>
+          </a:p>
+          <a:p>
+            <a:endParaRPr lang="en-US" dirty="0"/>
+          </a:p>
+          <a:p>
+            <a:endParaRPr lang="en-US" dirty="0" smtClean="0"/>
+          </a:p>
+          <a:p>
+            <a:pPr marL="0" indent="0">
+              <a:buNone/>
+            </a:pPr>
+            <a:endParaRPr lang="en-US" dirty="0"/>
+          </a:p>
+        </p:txBody>
+      </p:sp>
+      <p:sp>
+        <p:nvSpPr>
+          <p:cNvPr id="7" name="TextBox 6"/>
+          <p:cNvSpPr txBox="1"/>
+          <p:nvPr/>
+        </p:nvSpPr>
+        <p:spPr>
+          <a:xfrm>
+            <a:off x="6706350" y="49931"/>
+            <a:ext cx="1106007" cy="438107"/>
+          </a:xfrm>
+          <a:prstGeom prst="rect">
+            <a:avLst/>
+          </a:prstGeom>
+          <a:noFill/>
+        </p:spPr>
+        <p:txBody>
+          <a:bodyPr wrap="none" rtlCol="0">
+            <a:spAutoFit/>
+          </a:bodyPr>
+          <a:lstStyle/>
+          <a:p>
+            <a:r>
+              <a:rPr lang="en-US" dirty="0" smtClean="0"/>
+              <a:t>2019.1b</a:t>
+            </a:r>
+            <a:endParaRPr lang="en-US" dirty="0"/>
+          </a:p>
+        </p:txBody>
+      </p:sp>
+      <p:sp>
+        <p:nvSpPr>
+          <p:cNvPr id="10" name="TextBox 9"/>
+          <p:cNvSpPr txBox="1"/>
+          <p:nvPr/>
+        </p:nvSpPr>
+        <p:spPr>
+          <a:xfrm>
+            <a:off x="10012565" y="41447"/>
+            <a:ext cx="964068" cy="438107"/>
+          </a:xfrm>
+          <a:prstGeom prst="rect">
+            <a:avLst/>
+          </a:prstGeom>
+          <a:noFill/>
+        </p:spPr>
+        <p:txBody>
+          <a:bodyPr wrap="none" rtlCol="0">
+            <a:spAutoFit/>
+          </a:bodyPr>
+          <a:lstStyle/>
+          <a:p>
+            <a:r>
+              <a:rPr lang="en-US" dirty="0" smtClean="0"/>
+              <a:t>2023.1</a:t>
+            </a:r>
+            <a:endParaRPr lang="en-US" dirty="0"/>
+          </a:p>
+        </p:txBody>
+      </p:sp>
+      <p:sp>
+        <p:nvSpPr>
+          <p:cNvPr id="20" name="TextBox 19"/>
+          <p:cNvSpPr txBox="1"/>
+          <p:nvPr/>
+        </p:nvSpPr>
+        <p:spPr>
+          <a:xfrm>
+            <a:off x="8154034" y="1142902"/>
+            <a:ext cx="1373838" cy="369332"/>
+          </a:xfrm>
+          <a:prstGeom prst="rect">
+            <a:avLst/>
+          </a:prstGeom>
+          <a:solidFill>
+            <a:schemeClr val="bg1"/>
+          </a:solidFill>
+          <a:ln>
+            <a:solidFill>
+              <a:schemeClr val="tx1"/>
+            </a:solidFill>
+          </a:ln>
+          <a:effectLst>
+            <a:outerShdw blurRad="50800" dist="38100" dir="2700000" algn="tl" rotWithShape="0">
+              <a:prstClr val="black">
+                <a:alpha val="40000"/>
+              </a:prstClr>
+            </a:outerShdw>
+          </a:effectLst>
+        </p:spPr>
+        <p:txBody>
+          <a:bodyPr wrap="none" rtlCol="0">
+            <a:spAutoFit/>
+          </a:bodyPr>
+          <a:lstStyle/>
+          <a:p>
+            <a:r>
+              <a:rPr lang="en-US" dirty="0" smtClean="0"/>
+              <a:t>Trawl fishery</a:t>
+            </a:r>
+            <a:endParaRPr lang="en-US" dirty="0"/>
+          </a:p>
+        </p:txBody>
+      </p:sp>
+      <p:sp>
+        <p:nvSpPr>
+          <p:cNvPr id="21" name="TextBox 20"/>
+          <p:cNvSpPr txBox="1"/>
+          <p:nvPr/>
+        </p:nvSpPr>
+        <p:spPr>
+          <a:xfrm>
+            <a:off x="8252544" y="2751634"/>
+            <a:ext cx="1069075" cy="369332"/>
+          </a:xfrm>
+          <a:prstGeom prst="rect">
+            <a:avLst/>
+          </a:prstGeom>
+          <a:solidFill>
+            <a:schemeClr val="bg1"/>
+          </a:solidFill>
+          <a:ln>
+            <a:solidFill>
+              <a:schemeClr val="tx1"/>
+            </a:solidFill>
+          </a:ln>
+          <a:effectLst>
+            <a:outerShdw blurRad="50800" dist="38100" dir="2700000" algn="tl" rotWithShape="0">
+              <a:prstClr val="black">
+                <a:alpha val="40000"/>
+              </a:prstClr>
+            </a:outerShdw>
+          </a:effectLst>
+        </p:spPr>
+        <p:txBody>
+          <a:bodyPr wrap="none" rtlCol="0">
+            <a:spAutoFit/>
+          </a:bodyPr>
+          <a:lstStyle/>
+          <a:p>
+            <a:r>
+              <a:rPr lang="en-US" dirty="0" smtClean="0"/>
+              <a:t>LL fishery</a:t>
+            </a:r>
+            <a:endParaRPr lang="en-US" dirty="0"/>
+          </a:p>
+        </p:txBody>
+      </p:sp>
+      <p:sp>
+        <p:nvSpPr>
+          <p:cNvPr id="22" name="TextBox 21"/>
+          <p:cNvSpPr txBox="1"/>
+          <p:nvPr/>
+        </p:nvSpPr>
+        <p:spPr>
+          <a:xfrm>
+            <a:off x="8193937" y="4330489"/>
+            <a:ext cx="1186287" cy="369332"/>
+          </a:xfrm>
+          <a:prstGeom prst="rect">
+            <a:avLst/>
+          </a:prstGeom>
+          <a:solidFill>
+            <a:schemeClr val="bg1"/>
+          </a:solidFill>
+          <a:ln>
+            <a:solidFill>
+              <a:schemeClr val="tx1"/>
+            </a:solidFill>
+          </a:ln>
+          <a:effectLst>
+            <a:outerShdw blurRad="50800" dist="38100" dir="2700000" algn="tl" rotWithShape="0">
+              <a:prstClr val="black">
+                <a:alpha val="40000"/>
+              </a:prstClr>
+            </a:outerShdw>
+          </a:effectLst>
+        </p:spPr>
+        <p:txBody>
+          <a:bodyPr wrap="none" rtlCol="0">
+            <a:spAutoFit/>
+          </a:bodyPr>
+          <a:lstStyle/>
+          <a:p>
+            <a:r>
+              <a:rPr lang="en-US" dirty="0" smtClean="0"/>
+              <a:t>Pot</a:t>
+            </a:r>
+            <a:r>
+              <a:rPr lang="en-US" dirty="0" smtClean="0"/>
+              <a:t> fishery</a:t>
+            </a:r>
+            <a:endParaRPr lang="en-US" dirty="0"/>
+          </a:p>
+        </p:txBody>
+      </p:sp>
+      <p:sp>
+        <p:nvSpPr>
+          <p:cNvPr id="23" name="TextBox 22"/>
+          <p:cNvSpPr txBox="1"/>
+          <p:nvPr/>
+        </p:nvSpPr>
+        <p:spPr>
+          <a:xfrm>
+            <a:off x="8111157" y="5826021"/>
+            <a:ext cx="1351845" cy="369332"/>
+          </a:xfrm>
+          <a:prstGeom prst="rect">
+            <a:avLst/>
+          </a:prstGeom>
+          <a:solidFill>
+            <a:schemeClr val="bg1"/>
+          </a:solidFill>
+          <a:ln>
+            <a:solidFill>
+              <a:schemeClr val="tx1"/>
+            </a:solidFill>
+          </a:ln>
+          <a:effectLst>
+            <a:outerShdw blurRad="50800" dist="38100" dir="2700000" algn="tl" rotWithShape="0">
+              <a:prstClr val="black">
+                <a:alpha val="40000"/>
+              </a:prstClr>
+            </a:outerShdw>
+          </a:effectLst>
+        </p:spPr>
+        <p:txBody>
+          <a:bodyPr wrap="none" rtlCol="0">
+            <a:spAutoFit/>
+          </a:bodyPr>
+          <a:lstStyle/>
+          <a:p>
+            <a:r>
+              <a:rPr lang="en-US" dirty="0" smtClean="0"/>
+              <a:t>Trawl survey</a:t>
+            </a:r>
+            <a:endParaRPr lang="en-US" dirty="0"/>
+          </a:p>
+        </p:txBody>
+      </p:sp>
+    </p:spTree>
+    <p:extLst>
+      <p:ext uri="{BB962C8B-B14F-4D97-AF65-F5344CB8AC3E}">
+        <p14:creationId xmlns:p14="http://schemas.microsoft.com/office/powerpoint/2010/main" val="3229941710"/>
+      </p:ext>
+    </p:extLst>
+  </p:cSld>
+  <p:clrMapOvr>
+    <a:masterClrMapping/>
+  </p:clrMapOvr>
+</p:sld>
+</file>
+
+<file path=ppt/slides/slide21.xml><?xml version="1.0" encoding="utf-8"?>
+<p:sld xmlns:a="http://schemas.openxmlformats.org/drawingml/2006/main" xmlns:r="http://schemas.openxmlformats.org/officeDocument/2006/relationships" xmlns:p="http://schemas.openxmlformats.org/presentationml/2006/main">
+  <p:cSld>
+    <p:spTree>
+      <p:nvGrpSpPr>
+        <p:cNvPr id="1" name=""/>
+        <p:cNvGrpSpPr/>
+        <p:nvPr/>
+      </p:nvGrpSpPr>
+      <p:grpSpPr>
+        <a:xfrm>
+          <a:off x="0" y="0"/>
+          <a:ext cx="0" cy="0"/>
+          <a:chOff x="0" y="0"/>
+          <a:chExt cx="0" cy="0"/>
+        </a:xfrm>
+      </p:grpSpPr>
+      <p:sp>
+        <p:nvSpPr>
+          <p:cNvPr id="2" name="Title 1"/>
+          <p:cNvSpPr>
+            <a:spLocks noGrp="1"/>
+          </p:cNvSpPr>
+          <p:nvPr>
+            <p:ph type="title"/>
+          </p:nvPr>
+        </p:nvSpPr>
+        <p:spPr/>
+        <p:txBody>
+          <a:bodyPr/>
+          <a:lstStyle/>
+          <a:p>
+            <a:r>
+              <a:rPr lang="en-US" dirty="0" smtClean="0"/>
+              <a:t>Link for growth</a:t>
+            </a:r>
+            <a:endParaRPr lang="en-US" dirty="0"/>
+          </a:p>
+        </p:txBody>
+      </p:sp>
+      <p:sp>
+        <p:nvSpPr>
+          <p:cNvPr id="3" name="Content Placeholder 2"/>
+          <p:cNvSpPr>
+            <a:spLocks noGrp="1"/>
+          </p:cNvSpPr>
+          <p:nvPr>
+            <p:ph idx="1"/>
+          </p:nvPr>
+        </p:nvSpPr>
+        <p:spPr/>
+        <p:txBody>
+          <a:bodyPr>
+            <a:normAutofit/>
+          </a:bodyPr>
+          <a:lstStyle/>
+          <a:p>
+            <a:r>
+              <a:rPr lang="en-US" dirty="0" smtClean="0"/>
+              <a:t>Step 2: Retrospective AIC</a:t>
+            </a:r>
+          </a:p>
+          <a:p>
+            <a:endParaRPr lang="en-US" dirty="0"/>
+          </a:p>
+          <a:p>
+            <a:endParaRPr lang="en-US" dirty="0" smtClean="0"/>
+          </a:p>
+          <a:p>
+            <a:endParaRPr lang="en-US" dirty="0"/>
+          </a:p>
+          <a:p>
+            <a:endParaRPr lang="en-US" dirty="0" smtClean="0"/>
+          </a:p>
+          <a:p>
+            <a:endParaRPr lang="en-US" dirty="0"/>
+          </a:p>
+          <a:p>
+            <a:r>
+              <a:rPr lang="en-US" dirty="0" err="1" smtClean="0"/>
+              <a:t>Mohns</a:t>
+            </a:r>
+            <a:r>
+              <a:rPr lang="en-US" dirty="0" smtClean="0"/>
+              <a:t> rho: </a:t>
+            </a:r>
+            <a:endParaRPr lang="en-US" dirty="0" smtClean="0"/>
+          </a:p>
+          <a:p>
+            <a:pPr lvl="1"/>
+            <a:r>
+              <a:rPr lang="en-US" dirty="0" smtClean="0"/>
+              <a:t>2019.1b </a:t>
+            </a:r>
+            <a:r>
+              <a:rPr lang="en-US" dirty="0" smtClean="0"/>
+              <a:t>= -</a:t>
+            </a:r>
+            <a:r>
+              <a:rPr lang="en-US" dirty="0" smtClean="0"/>
+              <a:t>0.073</a:t>
+            </a:r>
+          </a:p>
+          <a:p>
+            <a:pPr lvl="1"/>
+            <a:r>
+              <a:rPr lang="en-US" dirty="0" smtClean="0"/>
+              <a:t>2023.1 </a:t>
+            </a:r>
+            <a:r>
+              <a:rPr lang="en-US" dirty="0" smtClean="0"/>
+              <a:t>= -0.022</a:t>
+            </a:r>
+            <a:endParaRPr lang="en-US" dirty="0"/>
+          </a:p>
+          <a:p>
+            <a:endParaRPr lang="en-US" dirty="0" smtClean="0"/>
+          </a:p>
+          <a:p>
+            <a:endParaRPr lang="en-US" dirty="0"/>
+          </a:p>
+          <a:p>
+            <a:endParaRPr lang="en-US" dirty="0" smtClean="0"/>
+          </a:p>
+          <a:p>
+            <a:pPr marL="0" indent="0">
+              <a:buNone/>
+            </a:pPr>
+            <a:endParaRPr lang="en-US" dirty="0"/>
+          </a:p>
+        </p:txBody>
+      </p:sp>
+      <p:pic>
+        <p:nvPicPr>
+          <p:cNvPr id="4" name="Picture 3"/>
+          <p:cNvPicPr>
+            <a:picLocks noChangeAspect="1"/>
+          </p:cNvPicPr>
+          <p:nvPr/>
+        </p:nvPicPr>
+        <p:blipFill>
+          <a:blip r:embed="rId2"/>
+          <a:stretch>
+            <a:fillRect/>
+          </a:stretch>
+        </p:blipFill>
+        <p:spPr>
+          <a:xfrm>
+            <a:off x="5176837" y="1962151"/>
+            <a:ext cx="4786741" cy="4010024"/>
+          </a:xfrm>
+          <a:prstGeom prst="rect">
+            <a:avLst/>
+          </a:prstGeom>
+        </p:spPr>
+      </p:pic>
+    </p:spTree>
+    <p:extLst>
+      <p:ext uri="{BB962C8B-B14F-4D97-AF65-F5344CB8AC3E}">
+        <p14:creationId xmlns:p14="http://schemas.microsoft.com/office/powerpoint/2010/main" val="3405314964"/>
+      </p:ext>
+    </p:extLst>
+  </p:cSld>
+  <p:clrMapOvr>
+    <a:masterClrMapping/>
+  </p:clrMapOvr>
+</p:sld>
+</file>
+
+<file path=ppt/slides/slide22.xml><?xml version="1.0" encoding="utf-8"?>
+<p:sld xmlns:a="http://schemas.openxmlformats.org/drawingml/2006/main" xmlns:r="http://schemas.openxmlformats.org/officeDocument/2006/relationships" xmlns:p="http://schemas.openxmlformats.org/presentationml/2006/main">
+  <p:cSld>
+    <p:spTree>
+      <p:nvGrpSpPr>
+        <p:cNvPr id="1" name=""/>
+        <p:cNvGrpSpPr/>
+        <p:nvPr/>
+      </p:nvGrpSpPr>
+      <p:grpSpPr>
+        <a:xfrm>
+          <a:off x="0" y="0"/>
+          <a:ext cx="0" cy="0"/>
+          <a:chOff x="0" y="0"/>
+          <a:chExt cx="0" cy="0"/>
+        </a:xfrm>
+      </p:grpSpPr>
+      <p:sp>
+        <p:nvSpPr>
+          <p:cNvPr id="2" name="Title 1"/>
+          <p:cNvSpPr>
+            <a:spLocks noGrp="1"/>
+          </p:cNvSpPr>
+          <p:nvPr>
+            <p:ph type="title"/>
+          </p:nvPr>
+        </p:nvSpPr>
+        <p:spPr/>
+        <p:txBody>
+          <a:bodyPr/>
+          <a:lstStyle/>
+          <a:p>
+            <a:r>
+              <a:rPr lang="en-US" dirty="0" smtClean="0"/>
+              <a:t>Link for growth</a:t>
+            </a:r>
+            <a:endParaRPr lang="en-US" dirty="0"/>
+          </a:p>
+        </p:txBody>
+      </p:sp>
+      <p:sp>
+        <p:nvSpPr>
+          <p:cNvPr id="3" name="Content Placeholder 2"/>
+          <p:cNvSpPr>
+            <a:spLocks noGrp="1"/>
+          </p:cNvSpPr>
+          <p:nvPr>
+            <p:ph idx="1"/>
+          </p:nvPr>
+        </p:nvSpPr>
+        <p:spPr/>
+        <p:txBody>
+          <a:bodyPr>
+            <a:normAutofit/>
+          </a:bodyPr>
+          <a:lstStyle/>
+          <a:p>
+            <a:r>
+              <a:rPr lang="en-US" dirty="0" smtClean="0"/>
+              <a:t>Things to consider:</a:t>
+            </a:r>
+          </a:p>
+          <a:p>
+            <a:pPr lvl="1"/>
+            <a:r>
+              <a:rPr lang="en-US" dirty="0" smtClean="0"/>
+              <a:t>What growth do we use in projections</a:t>
+            </a:r>
+            <a:r>
+              <a:rPr lang="en-US" dirty="0" smtClean="0"/>
+              <a:t>? (Most recent environmental conditions? Some time period of historical?)</a:t>
+            </a:r>
+            <a:endParaRPr lang="en-US" dirty="0" smtClean="0"/>
+          </a:p>
+          <a:p>
+            <a:pPr lvl="1"/>
+            <a:r>
+              <a:rPr lang="en-US" dirty="0" smtClean="0"/>
+              <a:t>Is there another, better, index?</a:t>
+            </a:r>
+          </a:p>
+          <a:p>
+            <a:pPr lvl="1"/>
+            <a:endParaRPr lang="en-US" dirty="0"/>
+          </a:p>
+          <a:p>
+            <a:r>
+              <a:rPr lang="en-US" dirty="0" smtClean="0"/>
+              <a:t>Moving forward:</a:t>
+            </a:r>
+          </a:p>
+          <a:p>
+            <a:pPr lvl="1"/>
+            <a:r>
+              <a:rPr lang="en-US" dirty="0" smtClean="0"/>
+              <a:t>Not going to recommend an environmentally linked model for growth this cycle</a:t>
+            </a:r>
+          </a:p>
+          <a:p>
+            <a:pPr lvl="1"/>
+            <a:r>
+              <a:rPr lang="en-US" dirty="0" smtClean="0"/>
+              <a:t>Have a post doc (Krista </a:t>
+            </a:r>
+            <a:r>
+              <a:rPr lang="en-US" dirty="0" err="1" smtClean="0"/>
+              <a:t>Oke</a:t>
+            </a:r>
+            <a:r>
+              <a:rPr lang="en-US" dirty="0" smtClean="0"/>
+              <a:t>) that will be investigating environmental links over the next 2 years</a:t>
+            </a:r>
+            <a:endParaRPr lang="en-US" dirty="0"/>
+          </a:p>
+          <a:p>
+            <a:endParaRPr lang="en-US" dirty="0" smtClean="0"/>
+          </a:p>
+          <a:p>
+            <a:endParaRPr lang="en-US" dirty="0"/>
+          </a:p>
+          <a:p>
+            <a:endParaRPr lang="en-US" dirty="0" smtClean="0"/>
+          </a:p>
+          <a:p>
+            <a:pPr marL="0" indent="0">
+              <a:buNone/>
+            </a:pPr>
+            <a:endParaRPr lang="en-US" dirty="0"/>
+          </a:p>
+        </p:txBody>
+      </p:sp>
+    </p:spTree>
+    <p:extLst>
+      <p:ext uri="{BB962C8B-B14F-4D97-AF65-F5344CB8AC3E}">
+        <p14:creationId xmlns:p14="http://schemas.microsoft.com/office/powerpoint/2010/main" val="2408764681"/>
+      </p:ext>
+    </p:extLst>
+  </p:cSld>
+  <p:clrMapOvr>
+    <a:masterClrMapping/>
+  </p:clrMapOvr>
+</p:sld>
+</file>
+
+<file path=ppt/slides/slide23.xml><?xml version="1.0" encoding="utf-8"?>
+<p:sld xmlns:a="http://schemas.openxmlformats.org/drawingml/2006/main" xmlns:r="http://schemas.openxmlformats.org/officeDocument/2006/relationships" xmlns:p="http://schemas.openxmlformats.org/presentationml/2006/main">
+  <p:cSld>
+    <p:spTree>
+      <p:nvGrpSpPr>
+        <p:cNvPr id="1" name=""/>
+        <p:cNvGrpSpPr/>
+        <p:nvPr/>
+      </p:nvGrpSpPr>
+      <p:grpSpPr>
+        <a:xfrm>
+          <a:off x="0" y="0"/>
+          <a:ext cx="0" cy="0"/>
+          <a:chOff x="0" y="0"/>
+          <a:chExt cx="0" cy="0"/>
+        </a:xfrm>
+      </p:grpSpPr>
+      <p:sp>
+        <p:nvSpPr>
+          <p:cNvPr id="2" name="Title 1"/>
+          <p:cNvSpPr>
+            <a:spLocks noGrp="1"/>
+          </p:cNvSpPr>
+          <p:nvPr>
+            <p:ph type="title"/>
+          </p:nvPr>
+        </p:nvSpPr>
+        <p:spPr/>
+        <p:txBody>
+          <a:bodyPr/>
+          <a:lstStyle/>
+          <a:p>
+            <a:r>
+              <a:rPr lang="en-US" dirty="0" smtClean="0"/>
+              <a:t>Overall summary</a:t>
+            </a:r>
+            <a:endParaRPr lang="en-US" dirty="0"/>
+          </a:p>
+        </p:txBody>
+      </p:sp>
+      <p:sp>
+        <p:nvSpPr>
+          <p:cNvPr id="3" name="Content Placeholder 2"/>
+          <p:cNvSpPr>
+            <a:spLocks noGrp="1"/>
+          </p:cNvSpPr>
+          <p:nvPr>
+            <p:ph idx="1"/>
+          </p:nvPr>
+        </p:nvSpPr>
+        <p:spPr/>
+        <p:txBody>
+          <a:bodyPr>
+            <a:normAutofit/>
+          </a:bodyPr>
+          <a:lstStyle/>
+          <a:p>
+            <a:r>
+              <a:rPr lang="en-US" dirty="0" smtClean="0"/>
+              <a:t>Recommended model changes for November:</a:t>
+            </a:r>
+          </a:p>
+          <a:p>
+            <a:endParaRPr lang="en-US" dirty="0" smtClean="0"/>
+          </a:p>
+          <a:p>
+            <a:pPr marL="457200" indent="-457200">
+              <a:buFont typeface="+mj-lt"/>
+              <a:buAutoNum type="arabicPeriod"/>
+            </a:pPr>
+            <a:r>
+              <a:rPr lang="en-US" dirty="0" smtClean="0"/>
+              <a:t>Correct minimum sample size issue</a:t>
+            </a:r>
+          </a:p>
+          <a:p>
+            <a:pPr marL="457200" indent="-457200">
+              <a:buFont typeface="+mj-lt"/>
+              <a:buAutoNum type="arabicPeriod"/>
+            </a:pPr>
+            <a:endParaRPr lang="en-US" dirty="0" smtClean="0"/>
+          </a:p>
+          <a:p>
+            <a:pPr marL="457200" indent="-457200">
+              <a:buFont typeface="+mj-lt"/>
+              <a:buAutoNum type="arabicPeriod"/>
+            </a:pPr>
+            <a:r>
+              <a:rPr lang="en-US" dirty="0" smtClean="0"/>
+              <a:t>Use different </a:t>
+            </a:r>
+            <a:r>
+              <a:rPr lang="en-US" dirty="0" smtClean="0"/>
+              <a:t>CFSR index </a:t>
+            </a:r>
+            <a:r>
+              <a:rPr lang="en-US" dirty="0" smtClean="0"/>
+              <a:t>for LL survey q environmental </a:t>
+            </a:r>
+            <a:r>
+              <a:rPr lang="en-US" dirty="0" smtClean="0"/>
+              <a:t>link</a:t>
+            </a:r>
+          </a:p>
+          <a:p>
+            <a:pPr marL="457200" indent="-457200">
+              <a:buFont typeface="+mj-lt"/>
+              <a:buAutoNum type="arabicPeriod"/>
+            </a:pPr>
+            <a:endParaRPr lang="en-US" dirty="0"/>
+          </a:p>
+          <a:p>
+            <a:r>
+              <a:rPr lang="en-US" dirty="0" smtClean="0"/>
+              <a:t>Questions?</a:t>
+            </a:r>
+            <a:endParaRPr lang="en-US" dirty="0"/>
+          </a:p>
+          <a:p>
+            <a:endParaRPr lang="en-US" dirty="0" smtClean="0"/>
+          </a:p>
+          <a:p>
+            <a:endParaRPr lang="en-US" dirty="0"/>
+          </a:p>
+          <a:p>
+            <a:endParaRPr lang="en-US" dirty="0" smtClean="0"/>
+          </a:p>
+          <a:p>
+            <a:pPr marL="0" indent="0">
+              <a:buNone/>
+            </a:pPr>
+            <a:endParaRPr lang="en-US" dirty="0"/>
+          </a:p>
+        </p:txBody>
+      </p:sp>
+    </p:spTree>
+    <p:extLst>
+      <p:ext uri="{BB962C8B-B14F-4D97-AF65-F5344CB8AC3E}">
+        <p14:creationId xmlns:p14="http://schemas.microsoft.com/office/powerpoint/2010/main" val="2829604555"/>
       </p:ext>
     </p:extLst>
   </p:cSld>
@@ -3596,8 +5971,8 @@
         </p:nvSpPr>
         <p:spPr>
           <a:xfrm>
-            <a:off x="838200" y="1825625"/>
-            <a:ext cx="6589816" cy="4351338"/>
+            <a:off x="838200" y="1479788"/>
+            <a:ext cx="11049000" cy="4351338"/>
           </a:xfrm>
         </p:spPr>
         <p:txBody>
@@ -3606,11 +5981,7 @@
           <a:p>
             <a:r>
               <a:rPr lang="en-US" dirty="0" smtClean="0"/>
-              <a:t>Minimum sample </a:t>
-            </a:r>
-            <a:r>
-              <a:rPr lang="en-US" dirty="0" smtClean="0"/>
-              <a:t>size </a:t>
+              <a:t>Minimum sample size </a:t>
             </a:r>
             <a:r>
               <a:rPr lang="en-US" dirty="0" smtClean="0"/>
@@ -3618,191 +5989,56 @@
             </a:r>
           </a:p>
           <a:p>
-            <a:pPr lvl="1"/>
-            <a:r>
-              <a:rPr lang="en-US" dirty="0" smtClean="0"/>
-              <a:t>Removed CAAL data with minimum sample size less than 1 (i.e., weight)</a:t>
-            </a:r>
-          </a:p>
-          <a:p>
-            <a:pPr lvl="1"/>
-            <a:r>
-              <a:rPr lang="en-US" dirty="0" smtClean="0"/>
-              <a:t>1,812 of 2,825 CAAL rows (mostly the small/large fish)</a:t>
-            </a:r>
             <a:endParaRPr lang="en-US" dirty="0" smtClean="0"/>
           </a:p>
           <a:p>
             <a:r>
               <a:rPr lang="en-US" dirty="0" smtClean="0"/>
-              <a:t>Likelihoods</a:t>
-            </a:r>
-          </a:p>
-        </p:txBody>
-      </p:sp>
-      <p:pic>
-        <p:nvPicPr>
-          <p:cNvPr id="7" name="Picture 6"/>
-          <p:cNvPicPr>
-            <a:picLocks noChangeAspect="1"/>
-          </p:cNvPicPr>
-          <p:nvPr/>
-        </p:nvPicPr>
-        <p:blipFill>
-          <a:blip r:embed="rId2"/>
-          <a:stretch>
-            <a:fillRect/>
-          </a:stretch>
-        </p:blipFill>
-        <p:spPr>
-          <a:xfrm>
-            <a:off x="1183634" y="4303291"/>
-            <a:ext cx="2619375" cy="2305050"/>
-          </a:xfrm>
-          <a:prstGeom prst="rect">
-            <a:avLst/>
-          </a:prstGeom>
-        </p:spPr>
-      </p:pic>
-      <p:pic>
-        <p:nvPicPr>
-          <p:cNvPr id="8" name="Picture 7"/>
-          <p:cNvPicPr>
-            <a:picLocks noChangeAspect="1"/>
-          </p:cNvPicPr>
-          <p:nvPr/>
-        </p:nvPicPr>
-        <p:blipFill>
-          <a:blip r:embed="rId3"/>
-          <a:stretch>
-            <a:fillRect/>
-          </a:stretch>
-        </p:blipFill>
-        <p:spPr>
-          <a:xfrm>
-            <a:off x="4240912" y="4303291"/>
-            <a:ext cx="2143125" cy="1162050"/>
-          </a:xfrm>
-          <a:prstGeom prst="rect">
-            <a:avLst/>
-          </a:prstGeom>
-        </p:spPr>
-      </p:pic>
-      <p:pic>
-        <p:nvPicPr>
-          <p:cNvPr id="4" name="Picture 3"/>
-          <p:cNvPicPr>
-            <a:picLocks noChangeAspect="1"/>
-          </p:cNvPicPr>
-          <p:nvPr/>
-        </p:nvPicPr>
-        <p:blipFill rotWithShape="1">
-          <a:blip r:embed="rId4" cstate="print">
-            <a:extLst>
-              <a:ext uri="{28A0092B-C50C-407E-A947-70E740481C1C}">
-                <a14:useLocalDpi xmlns:a14="http://schemas.microsoft.com/office/drawing/2010/main" val="0"/>
-              </a:ext>
-            </a:extLst>
-          </a:blip>
-          <a:srcRect t="5794" b="26273"/>
-          <a:stretch/>
-        </p:blipFill>
-        <p:spPr>
-          <a:xfrm>
-            <a:off x="7428016" y="280466"/>
-            <a:ext cx="4549139" cy="3090318"/>
-          </a:xfrm>
-          <a:prstGeom prst="rect">
-            <a:avLst/>
-          </a:prstGeom>
-        </p:spPr>
-      </p:pic>
-      <p:pic>
-        <p:nvPicPr>
-          <p:cNvPr id="5" name="Picture 4"/>
-          <p:cNvPicPr>
-            <a:picLocks noChangeAspect="1"/>
-          </p:cNvPicPr>
-          <p:nvPr/>
-        </p:nvPicPr>
-        <p:blipFill rotWithShape="1">
-          <a:blip r:embed="rId5" cstate="print">
-            <a:extLst>
-              <a:ext uri="{28A0092B-C50C-407E-A947-70E740481C1C}">
-                <a14:useLocalDpi xmlns:a14="http://schemas.microsoft.com/office/drawing/2010/main" val="0"/>
-              </a:ext>
-            </a:extLst>
-          </a:blip>
-          <a:srcRect t="5794" b="27473"/>
-          <a:stretch/>
-        </p:blipFill>
-        <p:spPr>
-          <a:xfrm>
-            <a:off x="7428016" y="3722266"/>
-            <a:ext cx="4549139" cy="3035784"/>
-          </a:xfrm>
-          <a:prstGeom prst="rect">
-            <a:avLst/>
-          </a:prstGeom>
-        </p:spPr>
-      </p:pic>
-      <p:sp>
-        <p:nvSpPr>
-          <p:cNvPr id="6" name="TextBox 5"/>
-          <p:cNvSpPr txBox="1"/>
-          <p:nvPr/>
-        </p:nvSpPr>
-        <p:spPr>
-          <a:xfrm>
-            <a:off x="9286949" y="-4207"/>
-            <a:ext cx="938077" cy="369332"/>
-          </a:xfrm>
-          <a:prstGeom prst="rect">
-            <a:avLst/>
-          </a:prstGeom>
-          <a:noFill/>
-        </p:spPr>
-        <p:txBody>
-          <a:bodyPr wrap="none" rtlCol="0">
-            <a:spAutoFit/>
-          </a:bodyPr>
-          <a:lstStyle/>
-          <a:p>
-            <a:r>
-              <a:rPr lang="en-US" dirty="0" smtClean="0"/>
-              <a:t>2019.1a</a:t>
-            </a:r>
-            <a:endParaRPr lang="en-US" dirty="0"/>
-          </a:p>
-        </p:txBody>
-      </p:sp>
-      <p:sp>
-        <p:nvSpPr>
-          <p:cNvPr id="17" name="TextBox 16"/>
-          <p:cNvSpPr txBox="1"/>
-          <p:nvPr/>
-        </p:nvSpPr>
-        <p:spPr>
-          <a:xfrm>
-            <a:off x="9286949" y="3352934"/>
-            <a:ext cx="949299" cy="369332"/>
-          </a:xfrm>
-          <a:prstGeom prst="rect">
-            <a:avLst/>
-          </a:prstGeom>
-          <a:noFill/>
-        </p:spPr>
-        <p:txBody>
-          <a:bodyPr wrap="none" rtlCol="0">
-            <a:spAutoFit/>
-          </a:bodyPr>
-          <a:lstStyle/>
-          <a:p>
-            <a:r>
-              <a:rPr lang="en-US" dirty="0" smtClean="0"/>
-              <a:t>2019.1b</a:t>
-            </a:r>
-            <a:endParaRPr lang="en-US" dirty="0"/>
+              <a:t>Historical assessments r</a:t>
+            </a:r>
+            <a:r>
+              <a:rPr lang="en-US" dirty="0" smtClean="0"/>
+              <a:t>emoved </a:t>
+            </a:r>
+            <a:r>
+              <a:rPr lang="en-US" dirty="0" smtClean="0"/>
+              <a:t>CAAL data with minimum sample size less than 1 (i.e., weight</a:t>
+            </a:r>
+            <a:r>
+              <a:rPr lang="en-US" dirty="0" smtClean="0"/>
+              <a:t>)</a:t>
+            </a:r>
+          </a:p>
+          <a:p>
+            <a:endParaRPr lang="en-US" dirty="0" smtClean="0"/>
+          </a:p>
+          <a:p>
+            <a:r>
+              <a:rPr lang="en-US" dirty="0" smtClean="0"/>
+              <a:t>1,812 of </a:t>
+            </a:r>
+            <a:r>
+              <a:rPr lang="en-US" dirty="0" smtClean="0"/>
+              <a:t>2,825 (64%) </a:t>
+            </a:r>
+            <a:r>
+              <a:rPr lang="en-US" dirty="0" smtClean="0"/>
+              <a:t>CAAL </a:t>
+            </a:r>
+            <a:r>
+              <a:rPr lang="en-US" dirty="0" smtClean="0"/>
+              <a:t>length-age data removed</a:t>
+            </a:r>
+          </a:p>
+          <a:p>
+            <a:endParaRPr lang="en-US" dirty="0"/>
+          </a:p>
+          <a:p>
+            <a:r>
+              <a:rPr lang="en-US" dirty="0" smtClean="0"/>
+              <a:t>Model 2019.1b corrects minimum sample size so all CAAL data included</a:t>
+            </a:r>
+            <a:endParaRPr lang="en-US" dirty="0" smtClean="0"/>
           </a:p>
         </p:txBody>
       </p:sp>
@@ -3853,6 +6089,260 @@
           <a:p>
             <a:r>
               <a:rPr lang="en-US" dirty="0" smtClean="0"/>
+              <a:t>Housecleaning:</a:t>
+            </a:r>
+            <a:endParaRPr lang="en-US" dirty="0"/>
+          </a:p>
+        </p:txBody>
+      </p:sp>
+      <p:sp>
+        <p:nvSpPr>
+          <p:cNvPr id="3" name="Content Placeholder 2"/>
+          <p:cNvSpPr>
+            <a:spLocks noGrp="1"/>
+          </p:cNvSpPr>
+          <p:nvPr>
+            <p:ph idx="1"/>
+          </p:nvPr>
+        </p:nvSpPr>
+        <p:spPr>
+          <a:xfrm>
+            <a:off x="838200" y="1479788"/>
+            <a:ext cx="6589816" cy="4351338"/>
+          </a:xfrm>
+        </p:spPr>
+        <p:txBody>
+          <a:bodyPr/>
+          <a:lstStyle/>
+          <a:p>
+            <a:r>
+              <a:rPr lang="en-US" dirty="0" smtClean="0"/>
+              <a:t>Likelihoods &amp; Fits</a:t>
+            </a:r>
+            <a:endParaRPr lang="en-US" dirty="0" smtClean="0"/>
+          </a:p>
+        </p:txBody>
+      </p:sp>
+      <p:pic>
+        <p:nvPicPr>
+          <p:cNvPr id="4" name="Picture 3"/>
+          <p:cNvPicPr>
+            <a:picLocks noChangeAspect="1"/>
+          </p:cNvPicPr>
+          <p:nvPr/>
+        </p:nvPicPr>
+        <p:blipFill rotWithShape="1">
+          <a:blip r:embed="rId2" cstate="print">
+            <a:extLst>
+              <a:ext uri="{28A0092B-C50C-407E-A947-70E740481C1C}">
+                <a14:useLocalDpi xmlns:a14="http://schemas.microsoft.com/office/drawing/2010/main" val="0"/>
+              </a:ext>
+            </a:extLst>
+          </a:blip>
+          <a:srcRect t="5794" b="26273"/>
+          <a:stretch/>
+        </p:blipFill>
+        <p:spPr>
+          <a:xfrm>
+            <a:off x="7428016" y="280466"/>
+            <a:ext cx="4549139" cy="3090318"/>
+          </a:xfrm>
+          <a:prstGeom prst="rect">
+            <a:avLst/>
+          </a:prstGeom>
+        </p:spPr>
+      </p:pic>
+      <p:pic>
+        <p:nvPicPr>
+          <p:cNvPr id="5" name="Picture 4"/>
+          <p:cNvPicPr>
+            <a:picLocks noChangeAspect="1"/>
+          </p:cNvPicPr>
+          <p:nvPr/>
+        </p:nvPicPr>
+        <p:blipFill rotWithShape="1">
+          <a:blip r:embed="rId3" cstate="print">
+            <a:extLst>
+              <a:ext uri="{28A0092B-C50C-407E-A947-70E740481C1C}">
+                <a14:useLocalDpi xmlns:a14="http://schemas.microsoft.com/office/drawing/2010/main" val="0"/>
+              </a:ext>
+            </a:extLst>
+          </a:blip>
+          <a:srcRect t="5794" b="27473"/>
+          <a:stretch/>
+        </p:blipFill>
+        <p:spPr>
+          <a:xfrm>
+            <a:off x="7428016" y="3722266"/>
+            <a:ext cx="4549139" cy="3035784"/>
+          </a:xfrm>
+          <a:prstGeom prst="rect">
+            <a:avLst/>
+          </a:prstGeom>
+        </p:spPr>
+      </p:pic>
+      <p:sp>
+        <p:nvSpPr>
+          <p:cNvPr id="6" name="TextBox 5"/>
+          <p:cNvSpPr txBox="1"/>
+          <p:nvPr/>
+        </p:nvSpPr>
+        <p:spPr>
+          <a:xfrm>
+            <a:off x="8417034" y="-41284"/>
+            <a:ext cx="2936766" cy="369332"/>
+          </a:xfrm>
+          <a:prstGeom prst="rect">
+            <a:avLst/>
+          </a:prstGeom>
+          <a:noFill/>
+        </p:spPr>
+        <p:txBody>
+          <a:bodyPr wrap="none" rtlCol="0">
+            <a:spAutoFit/>
+          </a:bodyPr>
+          <a:lstStyle/>
+          <a:p>
+            <a:r>
+              <a:rPr lang="en-US" dirty="0" smtClean="0"/>
+              <a:t>2019.1a (recent </a:t>
+            </a:r>
+            <a:r>
+              <a:rPr lang="en-US" dirty="0"/>
+              <a:t>t</a:t>
+            </a:r>
+            <a:r>
+              <a:rPr lang="en-US" dirty="0" smtClean="0"/>
+              <a:t>rawl survey)</a:t>
+            </a:r>
+            <a:endParaRPr lang="en-US" dirty="0"/>
+          </a:p>
+        </p:txBody>
+      </p:sp>
+      <p:sp>
+        <p:nvSpPr>
+          <p:cNvPr id="17" name="TextBox 16"/>
+          <p:cNvSpPr txBox="1"/>
+          <p:nvPr/>
+        </p:nvSpPr>
+        <p:spPr>
+          <a:xfrm>
+            <a:off x="9286949" y="3352934"/>
+            <a:ext cx="949299" cy="369332"/>
+          </a:xfrm>
+          <a:prstGeom prst="rect">
+            <a:avLst/>
+          </a:prstGeom>
+          <a:noFill/>
+        </p:spPr>
+        <p:txBody>
+          <a:bodyPr wrap="none" rtlCol="0">
+            <a:spAutoFit/>
+          </a:bodyPr>
+          <a:lstStyle/>
+          <a:p>
+            <a:r>
+              <a:rPr lang="en-US" dirty="0" smtClean="0"/>
+              <a:t>2019.1b</a:t>
+            </a:r>
+            <a:endParaRPr lang="en-US" dirty="0"/>
+          </a:p>
+        </p:txBody>
+      </p:sp>
+      <p:pic>
+        <p:nvPicPr>
+          <p:cNvPr id="9" name="Picture 8"/>
+          <p:cNvPicPr>
+            <a:picLocks noChangeAspect="1"/>
+          </p:cNvPicPr>
+          <p:nvPr/>
+        </p:nvPicPr>
+        <p:blipFill rotWithShape="1">
+          <a:blip r:embed="rId4"/>
+          <a:srcRect b="26365"/>
+          <a:stretch/>
+        </p:blipFill>
+        <p:spPr>
+          <a:xfrm>
+            <a:off x="1696849" y="1949946"/>
+            <a:ext cx="4848583" cy="2482765"/>
+          </a:xfrm>
+          <a:prstGeom prst="rect">
+            <a:avLst/>
+          </a:prstGeom>
+        </p:spPr>
+      </p:pic>
+      <p:pic>
+        <p:nvPicPr>
+          <p:cNvPr id="11" name="Picture 10"/>
+          <p:cNvPicPr>
+            <a:picLocks noChangeAspect="1"/>
+          </p:cNvPicPr>
+          <p:nvPr/>
+        </p:nvPicPr>
+        <p:blipFill>
+          <a:blip r:embed="rId5"/>
+          <a:stretch>
+            <a:fillRect/>
+          </a:stretch>
+        </p:blipFill>
+        <p:spPr>
+          <a:xfrm>
+            <a:off x="1545503" y="4539570"/>
+            <a:ext cx="5175209" cy="1851541"/>
+          </a:xfrm>
+          <a:prstGeom prst="rect">
+            <a:avLst/>
+          </a:prstGeom>
+        </p:spPr>
+      </p:pic>
+    </p:spTree>
+    <p:extLst>
+      <p:ext uri="{BB962C8B-B14F-4D97-AF65-F5344CB8AC3E}">
+        <p14:creationId xmlns:p14="http://schemas.microsoft.com/office/powerpoint/2010/main" val="102163035"/>
+      </p:ext>
+    </p:extLst>
+  </p:cSld>
+  <p:clrMapOvr>
+    <a:masterClrMapping/>
+  </p:clrMapOvr>
+</p:sld>
+</file>
+
+<file path=ppt/slides/slide5.xml><?xml version="1.0" encoding="utf-8"?>
+<p:sld xmlns:a="http://schemas.openxmlformats.org/drawingml/2006/main" xmlns:r="http://schemas.openxmlformats.org/officeDocument/2006/relationships" xmlns:p="http://schemas.openxmlformats.org/presentationml/2006/main">
+  <p:cSld>
+    <p:spTree>
+      <p:nvGrpSpPr>
+        <p:cNvPr id="1" name=""/>
+        <p:cNvGrpSpPr/>
+        <p:nvPr/>
+      </p:nvGrpSpPr>
+      <p:grpSpPr>
+        <a:xfrm>
+          <a:off x="0" y="0"/>
+          <a:ext cx="0" cy="0"/>
+          <a:chOff x="0" y="0"/>
+          <a:chExt cx="0" cy="0"/>
+        </a:xfrm>
+      </p:grpSpPr>
+      <p:sp>
+        <p:nvSpPr>
+          <p:cNvPr id="2" name="Title 1"/>
+          <p:cNvSpPr>
+            <a:spLocks noGrp="1"/>
+          </p:cNvSpPr>
+          <p:nvPr>
+            <p:ph type="title"/>
+          </p:nvPr>
+        </p:nvSpPr>
+        <p:spPr/>
+        <p:txBody>
+          <a:bodyPr/>
+          <a:lstStyle/>
+          <a:p>
+            <a:r>
+              <a:rPr lang="en-US" dirty="0" smtClean="0"/>
               <a:t>Housecleaning</a:t>
             </a:r>
             <a:endParaRPr lang="en-US" dirty="0"/>
@@ -3869,22 +6359,34 @@
             <p:ph idx="1"/>
           </p:nvPr>
         </p:nvSpPr>
-        <p:spPr/>
-        <p:txBody>
-          <a:bodyPr/>
-          <a:lstStyle/>
-          <a:p>
-            <a:r>
-              <a:rPr lang="en-US" dirty="0" smtClean="0"/>
-              <a:t>This </a:t>
-            </a:r>
-            <a:r>
-              <a:rPr lang="en-US" dirty="0" smtClean="0"/>
-              <a:t>is new base model from here </a:t>
-            </a:r>
-            <a:r>
-              <a:rPr lang="en-US" dirty="0" smtClean="0"/>
-              <a:t>out (2019.1b)</a:t>
+        <p:spPr>
+          <a:xfrm>
+            <a:off x="838200" y="1825625"/>
+            <a:ext cx="7143750" cy="4351338"/>
+          </a:xfrm>
+        </p:spPr>
+        <p:txBody>
+          <a:bodyPr/>
+          <a:lstStyle/>
+          <a:p>
+            <a:r>
+              <a:rPr lang="en-US" dirty="0" smtClean="0"/>
+              <a:t>Recommendation: Correct minimum sample size and use this as new </a:t>
+            </a:r>
+            <a:r>
+              <a:rPr lang="en-US" dirty="0" smtClean="0"/>
+              <a:t>base </a:t>
+            </a:r>
+            <a:r>
+              <a:rPr lang="en-US" dirty="0" smtClean="0"/>
+              <a:t>model (2019.1b)</a:t>
+            </a:r>
+          </a:p>
+          <a:p>
+            <a:pPr lvl="1"/>
+            <a:r>
+              <a:rPr lang="en-US" dirty="0" smtClean="0"/>
+              <a:t>6% increase in 2022 SSB</a:t>
             </a:r>
             <a:endParaRPr lang="en-US" dirty="0"/>
           </a:p>
@@ -3912,8 +6414,8 @@
         </p:blipFill>
         <p:spPr>
           <a:xfrm>
-            <a:off x="2060172" y="2756869"/>
-            <a:ext cx="4446122" cy="3420094"/>
+            <a:off x="2221377" y="3033094"/>
+            <a:ext cx="4798547" cy="3691190"/>
           </a:xfrm>
           <a:prstGeom prst="rect">
             <a:avLst/>
@@ -3993,93 +6495,6 @@
 </p:sld>
 </file>
 
-<file path=ppt/slides/slide5.xml><?xml version="1.0" encoding="utf-8"?>
-<p:sld xmlns:a="http://schemas.openxmlformats.org/drawingml/2006/main" xmlns:r="http://schemas.openxmlformats.org/officeDocument/2006/relationships" xmlns:p="http://schemas.openxmlformats.org/presentationml/2006/main">
-  <p:cSld>
-    <p:spTree>
-      <p:nvGrpSpPr>
-        <p:cNvPr id="1" name=""/>
-        <p:cNvGrpSpPr/>
-        <p:nvPr/>
-      </p:nvGrpSpPr>
-      <p:grpSpPr>
-        <a:xfrm>
-          <a:off x="0" y="0"/>
-          <a:ext cx="0" cy="0"/>
-          <a:chOff x="0" y="0"/>
-          <a:chExt cx="0" cy="0"/>
-        </a:xfrm>
-      </p:grpSpPr>
-      <p:sp>
-        <p:nvSpPr>
-          <p:cNvPr id="2" name="Title 1"/>
-          <p:cNvSpPr>
-            <a:spLocks noGrp="1"/>
-          </p:cNvSpPr>
-          <p:nvPr>
-            <p:ph type="title"/>
-          </p:nvPr>
-        </p:nvSpPr>
-        <p:spPr/>
-        <p:txBody>
-          <a:bodyPr/>
-          <a:lstStyle/>
-          <a:p>
-            <a:r>
-              <a:rPr lang="en-US" dirty="0" smtClean="0"/>
-              <a:t>Environmental link</a:t>
-            </a:r>
-            <a:endParaRPr lang="en-US" dirty="0"/>
-          </a:p>
-        </p:txBody>
-      </p:sp>
-      <p:sp>
-        <p:nvSpPr>
-          <p:cNvPr id="3" name="Content Placeholder 2"/>
-          <p:cNvSpPr>
-            <a:spLocks noGrp="1"/>
-          </p:cNvSpPr>
-          <p:nvPr>
-            <p:ph idx="1"/>
-          </p:nvPr>
-        </p:nvSpPr>
-        <p:spPr/>
-        <p:txBody>
-          <a:bodyPr/>
-          <a:lstStyle/>
-          <a:p>
-            <a:r>
-              <a:rPr lang="en-US" dirty="0" smtClean="0"/>
-              <a:t>Description of </a:t>
-            </a:r>
-            <a:r>
-              <a:rPr lang="en-US" dirty="0" err="1" smtClean="0"/>
-              <a:t>cfsr</a:t>
-            </a:r>
-            <a:endParaRPr lang="en-US" dirty="0" smtClean="0"/>
-          </a:p>
-          <a:p>
-            <a:r>
-              <a:rPr lang="en-US" dirty="0" smtClean="0"/>
-              <a:t>Available by length bin and month</a:t>
-            </a:r>
-            <a:endParaRPr lang="en-US" dirty="0"/>
-          </a:p>
-        </p:txBody>
-      </p:sp>
-    </p:spTree>
-    <p:extLst>
-      <p:ext uri="{BB962C8B-B14F-4D97-AF65-F5344CB8AC3E}">
-        <p14:creationId xmlns:p14="http://schemas.microsoft.com/office/powerpoint/2010/main" val="89867169"/>
-      </p:ext>
-    </p:extLst>
-  </p:cSld>
-  <p:clrMapOvr>
-    <a:masterClrMapping/>
-  </p:clrMapOvr>
-</p:sld>
-</file>
-
 <file path=ppt/slides/slide6.xml><?xml version="1.0" encoding="utf-8"?>
 <p:sld xmlns:a="http://schemas.openxmlformats.org/drawingml/2006/main" xmlns:r="http://schemas.openxmlformats.org/officeDocument/2006/relationships" xmlns:p="http://schemas.openxmlformats.org/presentationml/2006/main">
   <p:cSld>
@@ -4114,11 +6529,11 @@
           <a:p>
             <a:r>
               <a:rPr lang="en-US" dirty="0" smtClean="0"/>
-              <a:t>Link for </a:t>
-            </a:r>
-            <a:r>
-              <a:rPr lang="en-US" dirty="0" smtClean="0"/>
-              <a:t>LL survey</a:t>
+              <a:t>Environmental </a:t>
+            </a:r>
+            <a:r>
+              <a:rPr lang="en-US" dirty="0" smtClean="0"/>
+              <a:t>index</a:t>
             </a:r>
             <a:endParaRPr lang="en-US" dirty="0"/>
           </a:p>
@@ -4136,119 +6551,32 @@
         </p:nvSpPr>
         <p:spPr/>
         <p:txBody>
-          <a:bodyPr>
-            <a:normAutofit/>
-          </a:bodyPr>
-          <a:lstStyle/>
-          <a:p>
-            <a:r>
-              <a:rPr lang="en-US" dirty="0" smtClean="0"/>
-              <a:t>SSC request to evaluate whether link still appropriate</a:t>
-            </a:r>
-          </a:p>
-          <a:p>
-            <a:r>
-              <a:rPr lang="en-US" dirty="0" smtClean="0"/>
-              <a:t>Construct model with no </a:t>
-            </a:r>
-            <a:r>
-              <a:rPr lang="en-US" dirty="0" err="1" smtClean="0"/>
-              <a:t>env</a:t>
-            </a:r>
-            <a:r>
-              <a:rPr lang="en-US" dirty="0" smtClean="0"/>
-              <a:t> link to LL survey q (2019.1c)</a:t>
-            </a:r>
-          </a:p>
-          <a:p>
-            <a:r>
-              <a:rPr lang="en-US" dirty="0" smtClean="0"/>
-              <a:t>Added... re-evaluate </a:t>
-            </a:r>
-            <a:r>
-              <a:rPr lang="en-US" dirty="0" err="1" smtClean="0"/>
-              <a:t>cfsr</a:t>
-            </a:r>
-            <a:r>
-              <a:rPr lang="en-US" dirty="0" smtClean="0"/>
-              <a:t> index used</a:t>
-            </a:r>
-            <a:endParaRPr lang="en-US" dirty="0"/>
-          </a:p>
-          <a:p>
-            <a:pPr lvl="1"/>
-            <a:r>
-              <a:rPr lang="en-US" dirty="0" smtClean="0"/>
-              <a:t>Step </a:t>
-            </a:r>
-            <a:r>
-              <a:rPr lang="en-US" dirty="0" smtClean="0"/>
-              <a:t>1: </a:t>
-            </a:r>
-            <a:r>
-              <a:rPr lang="en-US" dirty="0" smtClean="0"/>
-              <a:t>Evaluated q across </a:t>
-            </a:r>
-            <a:r>
-              <a:rPr lang="en-US" dirty="0" smtClean="0"/>
-              <a:t>length bin and </a:t>
-            </a:r>
-            <a:r>
-              <a:rPr lang="en-US" dirty="0" smtClean="0"/>
-              <a:t>month</a:t>
-            </a:r>
-          </a:p>
-          <a:p>
-            <a:pPr lvl="1"/>
-            <a:r>
-              <a:rPr lang="en-US" dirty="0" smtClean="0"/>
-              <a:t>Step 2: best </a:t>
-            </a:r>
-            <a:r>
-              <a:rPr lang="en-US" dirty="0" smtClean="0"/>
-              <a:t>from Step </a:t>
-            </a:r>
-            <a:r>
-              <a:rPr lang="en-US" dirty="0" smtClean="0"/>
-              <a:t>1 as new </a:t>
-            </a:r>
-            <a:r>
-              <a:rPr lang="en-US" dirty="0" err="1" smtClean="0"/>
-              <a:t>env</a:t>
-            </a:r>
-            <a:r>
-              <a:rPr lang="en-US" dirty="0" smtClean="0"/>
-              <a:t> link model (2019.1d), </a:t>
-            </a:r>
-            <a:r>
-              <a:rPr lang="en-US" dirty="0" smtClean="0"/>
-              <a:t>and run model with </a:t>
-            </a:r>
-            <a:r>
-              <a:rPr lang="en-US" dirty="0" err="1" smtClean="0"/>
-              <a:t>env</a:t>
-            </a:r>
-            <a:r>
-              <a:rPr lang="en-US" dirty="0" smtClean="0"/>
-              <a:t> link for all 3 growth parameters</a:t>
-            </a:r>
-          </a:p>
-          <a:p>
-            <a:r>
-              <a:rPr lang="en-US" dirty="0" smtClean="0"/>
-              <a:t>Statistics</a:t>
-            </a:r>
-            <a:r>
-              <a:rPr lang="en-US" dirty="0" smtClean="0"/>
-              <a:t>: current year AIC and model fits, retrospective AIC and performance</a:t>
-            </a:r>
+          <a:bodyPr/>
+          <a:lstStyle/>
+          <a:p>
+            <a:r>
+              <a:rPr lang="en-US" dirty="0" smtClean="0"/>
+              <a:t>Description of </a:t>
+            </a:r>
+            <a:r>
+              <a:rPr lang="en-US" dirty="0" smtClean="0"/>
+              <a:t>CFSR</a:t>
+            </a:r>
+            <a:endParaRPr lang="en-US" dirty="0" smtClean="0"/>
+          </a:p>
+          <a:p>
+            <a:r>
+              <a:rPr lang="en-US" dirty="0" smtClean="0"/>
+              <a:t>Available by length bin and month</a:t>
+            </a:r>
+            <a:endParaRPr lang="en-US" dirty="0"/>
           </a:p>
         </p:txBody>
       </p:sp>
     </p:spTree>
     <p:extLst>
       <p:ext uri="{BB962C8B-B14F-4D97-AF65-F5344CB8AC3E}">
-        <p14:creationId xmlns:p14="http://schemas.microsoft.com/office/powerpoint/2010/main" val="1471501903"/>
+        <p14:creationId xmlns:p14="http://schemas.microsoft.com/office/powerpoint/2010/main" val="89867169"/>
       </p:ext>
     </p:extLst>
   </p:cSld>
@@ -4292,11 +6620,19 @@
           <a:p>
             <a:r>
               <a:rPr lang="en-US" dirty="0" smtClean="0"/>
-              <a:t>Link for </a:t>
-            </a:r>
-            <a:r>
-              <a:rPr lang="en-US" dirty="0" smtClean="0"/>
-              <a:t>LL survey, re-evaluation</a:t>
+              <a:t>Environmental L</a:t>
+            </a:r>
+            <a:r>
+              <a:rPr lang="en-US" dirty="0" smtClean="0"/>
+              <a:t>ink </a:t>
+            </a:r>
+            <a:r>
+              <a:rPr lang="en-US" dirty="0" smtClean="0"/>
+              <a:t>for LL </a:t>
+            </a:r>
+            <a:r>
+              <a:rPr lang="en-US" dirty="0" smtClean="0"/>
+              <a:t>survey catchability</a:t>
             </a:r>
             <a:endParaRPr lang="en-US" dirty="0"/>
           </a:p>
@@ -4314,16 +6650,62 @@
         </p:nvSpPr>
         <p:spPr/>
         <p:txBody>
-          <a:bodyPr/>
-          <a:lstStyle/>
-          <a:p>
-            <a:r>
-              <a:rPr lang="en-US" dirty="0" smtClean="0"/>
-              <a:t>Step 1</a:t>
-            </a:r>
-            <a:r>
-              <a:rPr lang="en-US" dirty="0" smtClean="0"/>
-              <a:t>: AIC base model (2019.1b) – new </a:t>
+          <a:bodyPr>
+            <a:normAutofit/>
+          </a:bodyPr>
+          <a:lstStyle/>
+          <a:p>
+            <a:r>
+              <a:rPr lang="en-US" dirty="0" smtClean="0"/>
+              <a:t>SSC request to evaluate whether link still appropriate</a:t>
+            </a:r>
+          </a:p>
+          <a:p>
+            <a:r>
+              <a:rPr lang="en-US" dirty="0" smtClean="0"/>
+              <a:t>Construct model with no </a:t>
+            </a:r>
+            <a:r>
+              <a:rPr lang="en-US" dirty="0" smtClean="0"/>
+              <a:t>environmental </a:t>
+            </a:r>
+            <a:r>
+              <a:rPr lang="en-US" dirty="0" smtClean="0"/>
+              <a:t>link to LL survey q (2019.1c)</a:t>
+            </a:r>
+          </a:p>
+          <a:p>
+            <a:r>
+              <a:rPr lang="en-US" dirty="0" smtClean="0"/>
+              <a:t>Added... re-evaluate </a:t>
+            </a:r>
+            <a:r>
+              <a:rPr lang="en-US" dirty="0" smtClean="0"/>
+              <a:t>CFSR</a:t>
+            </a:r>
+            <a:r>
+              <a:rPr lang="en-US" dirty="0" smtClean="0"/>
+              <a:t> </a:t>
+            </a:r>
+            <a:r>
+              <a:rPr lang="en-US" dirty="0" smtClean="0"/>
+              <a:t>index </a:t>
+            </a:r>
+            <a:r>
+              <a:rPr lang="en-US" dirty="0" smtClean="0"/>
+              <a:t>used (2019.1d)</a:t>
+            </a:r>
+            <a:endParaRPr lang="en-US" dirty="0"/>
+          </a:p>
+          <a:p>
+            <a:pPr lvl="1"/>
+            <a:r>
+              <a:rPr lang="en-US" dirty="0" smtClean="0"/>
+              <a:t>Step 1: Evaluated </a:t>
+            </a:r>
+            <a:r>
+              <a:rPr lang="en-US" dirty="0" smtClean="0"/>
+              <a:t>q </a:t>
             </a:r>
             <a:r>
               <a:rPr lang="en-US" dirty="0" err="1" smtClean="0"/>
@@ -4331,54 +6713,61 @@
             </a:r>
             <a:r>
               <a:rPr lang="en-US" dirty="0" smtClean="0"/>
-              <a:t> link model (2019.1d)</a:t>
-            </a:r>
-          </a:p>
-          <a:p>
-            <a:endParaRPr lang="en-US" dirty="0"/>
-          </a:p>
-          <a:p>
+              <a:t> link </a:t>
+            </a:r>
+            <a:r>
+              <a:rPr lang="en-US" dirty="0" smtClean="0"/>
+              <a:t>across length bin and month</a:t>
+            </a:r>
+          </a:p>
+          <a:p>
+            <a:pPr lvl="1"/>
+            <a:r>
+              <a:rPr lang="en-US" dirty="0" smtClean="0"/>
+              <a:t>Step 2: </a:t>
+            </a:r>
+            <a:r>
+              <a:rPr lang="en-US" dirty="0" smtClean="0"/>
+              <a:t>Select best </a:t>
+            </a:r>
+            <a:r>
+              <a:rPr lang="en-US" dirty="0" smtClean="0"/>
+              <a:t>from Step 1 as new </a:t>
+            </a:r>
+            <a:r>
+              <a:rPr lang="en-US" dirty="0" err="1" smtClean="0"/>
+              <a:t>env</a:t>
+            </a:r>
+            <a:r>
+              <a:rPr lang="en-US" dirty="0" smtClean="0"/>
+              <a:t> link </a:t>
+            </a:r>
+            <a:r>
+              <a:rPr lang="en-US" dirty="0" smtClean="0"/>
+              <a:t>model</a:t>
+            </a:r>
             <a:endParaRPr lang="en-US" dirty="0" smtClean="0"/>
           </a:p>
           <a:p>
-            <a:endParaRPr lang="en-US" dirty="0"/>
-          </a:p>
-          <a:p>
-            <a:endParaRPr lang="en-US" dirty="0" smtClean="0"/>
-          </a:p>
-          <a:p>
-            <a:endParaRPr lang="en-US" dirty="0"/>
-          </a:p>
-        </p:txBody>
-      </p:sp>
-      <p:pic>
-        <p:nvPicPr>
-          <p:cNvPr id="4" name="Picture 3"/>
-          <p:cNvPicPr>
-            <a:picLocks noChangeAspect="1"/>
-          </p:cNvPicPr>
-          <p:nvPr/>
-        </p:nvPicPr>
-        <p:blipFill>
-          <a:blip r:embed="rId2"/>
-          <a:stretch>
-            <a:fillRect/>
-          </a:stretch>
-        </p:blipFill>
-        <p:spPr>
-          <a:xfrm>
-            <a:off x="3491717" y="2373580"/>
-            <a:ext cx="3676650" cy="2514600"/>
-          </a:xfrm>
-          <a:prstGeom prst="rect">
-            <a:avLst/>
-          </a:prstGeom>
-        </p:spPr>
-      </p:pic>
+            <a:r>
+              <a:rPr lang="en-US" dirty="0" smtClean="0"/>
+              <a:t>Performance metrics: </a:t>
+            </a:r>
+            <a:r>
+              <a:rPr lang="en-US" dirty="0" smtClean="0"/>
+              <a:t>current year AIC and model fits, retrospective AIC and </a:t>
+            </a:r>
+            <a:r>
+              <a:rPr lang="en-US" dirty="0" smtClean="0"/>
+              <a:t>performance</a:t>
+            </a:r>
+          </a:p>
+        </p:txBody>
+      </p:sp>
     </p:spTree>
     <p:extLst>
       <p:ext uri="{BB962C8B-B14F-4D97-AF65-F5344CB8AC3E}">
-        <p14:creationId xmlns:p14="http://schemas.microsoft.com/office/powerpoint/2010/main" val="2878271501"/>
+        <p14:creationId xmlns:p14="http://schemas.microsoft.com/office/powerpoint/2010/main" val="1471501903"/>
       </p:ext>
     </p:extLst>
   </p:cSld>
@@ -4422,7 +6811,11 @@
           <a:p>
             <a:r>
               <a:rPr lang="en-US" dirty="0" smtClean="0"/>
-              <a:t>Link for growth</a:t>
+              <a:t>Link for LL </a:t>
+            </a:r>
+            <a:r>
+              <a:rPr lang="en-US" dirty="0" smtClean="0"/>
+              <a:t>survey q: no link comparison</a:t>
             </a:r>
             <a:endParaRPr lang="en-US" dirty="0"/>
           </a:p>
@@ -4438,101 +6831,269 @@
             <p:ph idx="1"/>
           </p:nvPr>
         </p:nvSpPr>
-        <p:spPr/>
-        <p:txBody>
-          <a:bodyPr/>
-          <a:lstStyle/>
-          <a:p>
-            <a:r>
-              <a:rPr lang="en-US" dirty="0" smtClean="0"/>
-              <a:t>Step 1: </a:t>
-            </a:r>
-          </a:p>
-          <a:p>
-            <a:pPr lvl="1"/>
-            <a:r>
-              <a:rPr lang="en-US" dirty="0"/>
-              <a:t>E</a:t>
-            </a:r>
-            <a:r>
-              <a:rPr lang="en-US" dirty="0" smtClean="0"/>
-              <a:t>valuated </a:t>
-            </a:r>
-            <a:r>
-              <a:rPr lang="en-US" dirty="0" err="1" smtClean="0"/>
-              <a:t>Linf</a:t>
-            </a:r>
-            <a:r>
-              <a:rPr lang="en-US" dirty="0"/>
-              <a:t> </a:t>
-            </a:r>
-            <a:r>
-              <a:rPr lang="en-US" dirty="0" smtClean="0"/>
-              <a:t>and kappa across length bin and month</a:t>
-            </a:r>
-          </a:p>
-          <a:p>
-            <a:pPr lvl="1"/>
-            <a:r>
-              <a:rPr lang="en-US" dirty="0" smtClean="0"/>
-              <a:t>Evaluated </a:t>
-            </a:r>
-            <a:r>
-              <a:rPr lang="en-US" dirty="0" err="1" smtClean="0"/>
-              <a:t>Lzero</a:t>
-            </a:r>
-            <a:r>
-              <a:rPr lang="en-US" dirty="0" smtClean="0"/>
-              <a:t> across month for 0-20 cm length bin</a:t>
-            </a:r>
-          </a:p>
-          <a:p>
-            <a:r>
-              <a:rPr lang="en-US" dirty="0" smtClean="0"/>
-              <a:t>Step 2:</a:t>
-            </a:r>
-          </a:p>
-          <a:p>
-            <a:pPr lvl="1"/>
-            <a:r>
-              <a:rPr lang="en-US" dirty="0" smtClean="0"/>
-              <a:t>Select best from Step 1, and run model with </a:t>
-            </a:r>
-            <a:r>
-              <a:rPr lang="en-US" dirty="0" err="1" smtClean="0"/>
-              <a:t>env</a:t>
-            </a:r>
-            <a:r>
-              <a:rPr lang="en-US" dirty="0" smtClean="0"/>
-              <a:t> link for all 3 growth parameters</a:t>
-            </a:r>
-          </a:p>
-          <a:p>
-            <a:r>
-              <a:rPr lang="en-US" dirty="0" smtClean="0"/>
-              <a:t>Step 3:</a:t>
-            </a:r>
-          </a:p>
-          <a:p>
-            <a:pPr lvl="1"/>
-            <a:r>
-              <a:rPr lang="en-US" dirty="0" smtClean="0"/>
-              <a:t>Compare with base model</a:t>
-            </a:r>
-          </a:p>
-          <a:p>
-            <a:pPr lvl="1"/>
-            <a:r>
-              <a:rPr lang="en-US" dirty="0" smtClean="0"/>
-              <a:t>Statistics: current year AIC and model fits, retrospective AIC and performance</a:t>
-            </a:r>
-          </a:p>
-        </p:txBody>
-      </p:sp>
+        <p:spPr>
+          <a:xfrm>
+            <a:off x="838199" y="1825625"/>
+            <a:ext cx="10791825" cy="4351338"/>
+          </a:xfrm>
+        </p:spPr>
+        <p:txBody>
+          <a:bodyPr>
+            <a:normAutofit/>
+          </a:bodyPr>
+          <a:lstStyle/>
+          <a:p>
+            <a:r>
+              <a:rPr lang="en-US" dirty="0" smtClean="0"/>
+              <a:t>Fit to LL survey index:</a:t>
+            </a:r>
+          </a:p>
+          <a:p>
+            <a:endParaRPr lang="en-US" dirty="0"/>
+          </a:p>
+          <a:p>
+            <a:endParaRPr lang="en-US" dirty="0" smtClean="0"/>
+          </a:p>
+          <a:p>
+            <a:endParaRPr lang="en-US" dirty="0"/>
+          </a:p>
+          <a:p>
+            <a:endParaRPr lang="en-US" dirty="0" smtClean="0"/>
+          </a:p>
+        </p:txBody>
+      </p:sp>
+      <p:grpSp>
+        <p:nvGrpSpPr>
+          <p:cNvPr id="11" name="Group 10"/>
+          <p:cNvGrpSpPr/>
+          <p:nvPr/>
+        </p:nvGrpSpPr>
+        <p:grpSpPr>
+          <a:xfrm>
+            <a:off x="3100085" y="2333906"/>
+            <a:ext cx="5991830" cy="3843057"/>
+            <a:chOff x="7317106" y="3067050"/>
+            <a:chExt cx="4532000" cy="3156814"/>
+          </a:xfrm>
+        </p:grpSpPr>
+        <p:pic>
+          <p:nvPicPr>
+            <p:cNvPr id="5" name="Picture 4"/>
+            <p:cNvPicPr>
+              <a:picLocks noChangeAspect="1"/>
+            </p:cNvPicPr>
+            <p:nvPr/>
+          </p:nvPicPr>
+          <p:blipFill rotWithShape="1">
+            <a:blip r:embed="rId2" cstate="print">
+              <a:extLst>
+                <a:ext uri="{28A0092B-C50C-407E-A947-70E740481C1C}">
+                  <a14:useLocalDpi xmlns:a14="http://schemas.microsoft.com/office/drawing/2010/main" val="0"/>
+                </a:ext>
+              </a:extLst>
+            </a:blip>
+            <a:srcRect b="9447"/>
+            <a:stretch/>
+          </p:blipFill>
+          <p:spPr>
+            <a:xfrm>
+              <a:off x="7317106" y="3067050"/>
+              <a:ext cx="4532000" cy="3156814"/>
+            </a:xfrm>
+            <a:prstGeom prst="rect">
+              <a:avLst/>
+            </a:prstGeom>
+          </p:spPr>
+        </p:pic>
+        <p:sp>
+          <p:nvSpPr>
+            <p:cNvPr id="6" name="Oval 5"/>
+            <p:cNvSpPr/>
+            <p:nvPr/>
+          </p:nvSpPr>
+          <p:spPr>
+            <a:xfrm>
+              <a:off x="8496300" y="4410077"/>
+              <a:ext cx="514350" cy="800100"/>
+            </a:xfrm>
+            <a:prstGeom prst="ellipse">
+              <a:avLst/>
+            </a:prstGeom>
+            <a:noFill/>
+            <a:ln w="25400">
+              <a:solidFill>
+                <a:srgbClr val="00B050"/>
+              </a:solidFill>
+            </a:ln>
+          </p:spPr>
+          <p:style>
+            <a:lnRef idx="2">
+              <a:schemeClr val="accent1">
+                <a:shade val="50000"/>
+              </a:schemeClr>
+            </a:lnRef>
+            <a:fillRef idx="1">
+              <a:schemeClr val="accent1"/>
+            </a:fillRef>
+            <a:effectRef idx="0">
+              <a:schemeClr val="accent1"/>
+            </a:effectRef>
+            <a:fontRef idx="minor">
+              <a:schemeClr val="lt1"/>
+            </a:fontRef>
+          </p:style>
+          <p:txBody>
+            <a:bodyPr rtlCol="0" anchor="ctr"/>
+            <a:lstStyle/>
+            <a:p>
+              <a:pPr algn="ctr"/>
+              <a:endParaRPr lang="en-US"/>
+            </a:p>
+          </p:txBody>
+        </p:sp>
+        <p:sp>
+          <p:nvSpPr>
+            <p:cNvPr id="7" name="Oval 6"/>
+            <p:cNvSpPr/>
+            <p:nvPr/>
+          </p:nvSpPr>
+          <p:spPr>
+            <a:xfrm>
+              <a:off x="9124950" y="5033965"/>
+              <a:ext cx="458156" cy="352423"/>
+            </a:xfrm>
+            <a:prstGeom prst="ellipse">
+              <a:avLst/>
+            </a:prstGeom>
+            <a:noFill/>
+            <a:ln w="25400">
+              <a:solidFill>
+                <a:srgbClr val="00B050"/>
+              </a:solidFill>
+            </a:ln>
+          </p:spPr>
+          <p:style>
+            <a:lnRef idx="2">
+              <a:schemeClr val="accent1">
+                <a:shade val="50000"/>
+              </a:schemeClr>
+            </a:lnRef>
+            <a:fillRef idx="1">
+              <a:schemeClr val="accent1"/>
+            </a:fillRef>
+            <a:effectRef idx="0">
+              <a:schemeClr val="accent1"/>
+            </a:effectRef>
+            <a:fontRef idx="minor">
+              <a:schemeClr val="lt1"/>
+            </a:fontRef>
+          </p:style>
+          <p:txBody>
+            <a:bodyPr rtlCol="0" anchor="ctr"/>
+            <a:lstStyle/>
+            <a:p>
+              <a:pPr algn="ctr"/>
+              <a:endParaRPr lang="en-US"/>
+            </a:p>
+          </p:txBody>
+        </p:sp>
+        <p:sp>
+          <p:nvSpPr>
+            <p:cNvPr id="8" name="Oval 7"/>
+            <p:cNvSpPr/>
+            <p:nvPr/>
+          </p:nvSpPr>
+          <p:spPr>
+            <a:xfrm>
+              <a:off x="10429875" y="4681542"/>
+              <a:ext cx="458156" cy="938208"/>
+            </a:xfrm>
+            <a:prstGeom prst="ellipse">
+              <a:avLst/>
+            </a:prstGeom>
+            <a:noFill/>
+            <a:ln w="25400">
+              <a:solidFill>
+                <a:srgbClr val="00B050"/>
+              </a:solidFill>
+            </a:ln>
+          </p:spPr>
+          <p:style>
+            <a:lnRef idx="2">
+              <a:schemeClr val="accent1">
+                <a:shade val="50000"/>
+              </a:schemeClr>
+            </a:lnRef>
+            <a:fillRef idx="1">
+              <a:schemeClr val="accent1"/>
+            </a:fillRef>
+            <a:effectRef idx="0">
+              <a:schemeClr val="accent1"/>
+            </a:effectRef>
+            <a:fontRef idx="minor">
+              <a:schemeClr val="lt1"/>
+            </a:fontRef>
+          </p:style>
+          <p:txBody>
+            <a:bodyPr rtlCol="0" anchor="ctr"/>
+            <a:lstStyle/>
+            <a:p>
+              <a:pPr algn="ctr"/>
+              <a:endParaRPr lang="en-US"/>
+            </a:p>
+          </p:txBody>
+        </p:sp>
+        <p:sp>
+          <p:nvSpPr>
+            <p:cNvPr id="9" name="Oval 8"/>
+            <p:cNvSpPr/>
+            <p:nvPr/>
+          </p:nvSpPr>
+          <p:spPr>
+            <a:xfrm>
+              <a:off x="10914219" y="5364954"/>
+              <a:ext cx="458156" cy="509592"/>
+            </a:xfrm>
+            <a:prstGeom prst="ellipse">
+              <a:avLst/>
+            </a:prstGeom>
+            <a:noFill/>
+            <a:ln w="25400">
+              <a:solidFill>
+                <a:srgbClr val="C00000"/>
+              </a:solidFill>
+            </a:ln>
+          </p:spPr>
+          <p:style>
+            <a:lnRef idx="2">
+              <a:schemeClr val="accent1">
+                <a:shade val="50000"/>
+              </a:schemeClr>
+            </a:lnRef>
+            <a:fillRef idx="1">
+              <a:schemeClr val="accent1"/>
+            </a:fillRef>
+            <a:effectRef idx="0">
+              <a:schemeClr val="accent1"/>
+            </a:effectRef>
+            <a:fontRef idx="minor">
+              <a:schemeClr val="lt1"/>
+            </a:fontRef>
+          </p:style>
+          <p:txBody>
+            <a:bodyPr rtlCol="0" anchor="ctr"/>
+            <a:lstStyle/>
+            <a:p>
+              <a:pPr algn="ctr"/>
+              <a:endParaRPr lang="en-US"/>
+            </a:p>
+          </p:txBody>
+        </p:sp>
+      </p:grpSp>
     </p:spTree>
     <p:extLst>
       <p:ext uri="{BB962C8B-B14F-4D97-AF65-F5344CB8AC3E}">
-        <p14:creationId xmlns:p14="http://schemas.microsoft.com/office/powerpoint/2010/main" val="916100377"/>
+        <p14:creationId xmlns:p14="http://schemas.microsoft.com/office/powerpoint/2010/main" val="3483996684"/>
       </p:ext>
     </p:extLst>
   </p:cSld>
@@ -4576,7 +7137,11 @@
           <a:p>
             <a:r>
               <a:rPr lang="en-US" dirty="0" smtClean="0"/>
-              <a:t>Link for growth</a:t>
+              <a:t>Link for LL </a:t>
+            </a:r>
+            <a:r>
+              <a:rPr lang="en-US" dirty="0" smtClean="0"/>
+              <a:t>survey q: no link comparison</a:t>
             </a:r>
             <a:endParaRPr lang="en-US" dirty="0"/>
           </a:p>
@@ -4592,32 +7157,41 @@
             <p:ph idx="1"/>
           </p:nvPr>
         </p:nvSpPr>
-        <p:spPr/>
+        <p:spPr>
+          <a:xfrm>
+            <a:off x="838199" y="1825625"/>
+            <a:ext cx="10791825" cy="4351338"/>
+          </a:xfrm>
+        </p:spPr>
         <p:txBody>
           <a:bodyPr>
-            <a:normAutofit fontScale="92500" lnSpcReduction="10000"/>
+            <a:normAutofit/>
           </a:bodyPr>
           <a:lstStyle/>
           <a:p>
             <a:r>
               <a:rPr lang="en-US" dirty="0" smtClean="0"/>
-              <a:t>Step 1: difference in AIC with base model (</a:t>
-            </a:r>
+              <a:t>In every retrospective year, model with link preferred over model without link</a:t>
+            </a:r>
+          </a:p>
+          <a:p>
             <a:r>
               <a:rPr lang="en-US" dirty="0" err="1" smtClean="0"/>
-              <a:t>EnvLnk</a:t>
-            </a:r>
-            <a:r>
-              <a:rPr lang="en-US" dirty="0" smtClean="0"/>
-              <a:t> – base, so negative number means </a:t>
-            </a:r>
+              <a:t>Mohn’s</a:t>
+            </a:r>
+            <a:r>
+              <a:rPr lang="en-US" dirty="0" smtClean="0"/>
+              <a:t> rho 2019.1b = -0.0727</a:t>
+            </a:r>
+          </a:p>
+          <a:p>
             <a:r>
               <a:rPr lang="en-US" dirty="0" err="1" smtClean="0"/>
-              <a:t>EnvLnk</a:t>
-            </a:r>
-            <a:r>
-              <a:rPr lang="en-US" dirty="0" smtClean="0"/>
-              <a:t> model better)</a:t>
+              <a:t>Mohn’s</a:t>
+            </a:r>
+            <a:r>
+              <a:rPr lang="en-US" dirty="0" smtClean="0"/>
+              <a:t> rho 2019.1c = -0.0722</a:t>
             </a:r>
           </a:p>
           <a:p>
@@ -4631,39 +7205,12 @@
           </a:p>
           <a:p>
             <a:endParaRPr lang="en-US" dirty="0" smtClean="0"/>
-          </a:p>
-          <a:p>
-            <a:endParaRPr lang="en-US" dirty="0"/>
-          </a:p>
-          <a:p>
-            <a:endParaRPr lang="en-US" dirty="0" smtClean="0"/>
-          </a:p>
-          <a:p>
-            <a:endParaRPr lang="en-US" dirty="0" smtClean="0"/>
-          </a:p>
-          <a:p>
-            <a:r>
-              <a:rPr lang="en-US" dirty="0" err="1" smtClean="0"/>
-              <a:t>Linf</a:t>
-            </a:r>
-            <a:r>
-              <a:rPr lang="en-US" dirty="0" smtClean="0"/>
-              <a:t> &gt; </a:t>
-            </a:r>
-            <a:r>
-              <a:rPr lang="en-US" dirty="0" err="1" smtClean="0"/>
-              <a:t>Lzero</a:t>
-            </a:r>
-            <a:r>
-              <a:rPr lang="en-US" dirty="0" smtClean="0"/>
-              <a:t> &gt; kappa for model improvement</a:t>
-            </a:r>
           </a:p>
         </p:txBody>
       </p:sp>
       <p:pic>
         <p:nvPicPr>
-          <p:cNvPr id="5" name="Picture 4"/>
+          <p:cNvPr id="12" name="Picture 11"/>
           <p:cNvPicPr>
             <a:picLocks noChangeAspect="1"/>
           </p:cNvPicPr>
@@ -4677,56 +7224,8 @@
         </p:blipFill>
         <p:spPr>
           <a:xfrm>
-            <a:off x="962273" y="2931721"/>
-            <a:ext cx="3676650" cy="2514600"/>
-          </a:xfrm>
-          <a:prstGeom prst="rect">
-            <a:avLst/>
-          </a:prstGeom>
-        </p:spPr>
-      </p:pic>
-      <p:pic>
-        <p:nvPicPr>
-          <p:cNvPr id="6" name="Picture 5"/>
-          <p:cNvPicPr>
-            <a:picLocks noChangeAspect="1"/>
-          </p:cNvPicPr>
-          <p:nvPr/>
-        </p:nvPicPr>
-        <p:blipFill>
-          <a:blip r:embed="rId3"/>
-          <a:stretch>
-            <a:fillRect/>
-          </a:stretch>
-        </p:blipFill>
-        <p:spPr>
-          <a:xfrm>
-            <a:off x="5094268" y="2931721"/>
-            <a:ext cx="3676650" cy="2514600"/>
-          </a:xfrm>
-          <a:prstGeom prst="rect">
-            <a:avLst/>
-          </a:prstGeom>
-        </p:spPr>
-      </p:pic>
-      <p:pic>
-        <p:nvPicPr>
-          <p:cNvPr id="7" name="Picture 6"/>
-          <p:cNvPicPr>
-            <a:picLocks noChangeAspect="1"/>
-          </p:cNvPicPr>
-          <p:nvPr/>
-        </p:nvPicPr>
-        <p:blipFill>
-          <a:blip r:embed="rId4"/>
-          <a:stretch>
-            <a:fillRect/>
-          </a:stretch>
-        </p:blipFill>
-        <p:spPr>
-          <a:xfrm>
-            <a:off x="9443234" y="2931721"/>
-            <a:ext cx="1238250" cy="2514600"/>
+            <a:off x="6124574" y="2405161"/>
+            <a:ext cx="4819651" cy="4037594"/>
           </a:xfrm>
           <a:prstGeom prst="rect">
             <a:avLst/>
@@ -4736,7 +7235,7 @@
     </p:spTree>
     <p:extLst>
       <p:ext uri="{BB962C8B-B14F-4D97-AF65-F5344CB8AC3E}">
-        <p14:creationId xmlns:p14="http://schemas.microsoft.com/office/powerpoint/2010/main" val="3079657574"/>
+        <p14:creationId xmlns:p14="http://schemas.microsoft.com/office/powerpoint/2010/main" val="4285928814"/>
       </p:ext>
     </p:extLst>
   </p:cSld>

</xml_diff>

<commit_message>
get pt doc drafted
</commit_message>
<xml_diff>
--- a/2023/presentation/goa_pcod_sept23.pptx
+++ b/2023/presentation/goa_pcod_sept23.pptx
@@ -9,25 +9,26 @@
     <p:sldId id="257" r:id="rId3"/>
     <p:sldId id="258" r:id="rId4"/>
     <p:sldId id="274" r:id="rId5"/>
-    <p:sldId id="263" r:id="rId6"/>
-    <p:sldId id="259" r:id="rId7"/>
-    <p:sldId id="260" r:id="rId8"/>
-    <p:sldId id="271" r:id="rId9"/>
-    <p:sldId id="273" r:id="rId10"/>
-    <p:sldId id="272" r:id="rId11"/>
-    <p:sldId id="266" r:id="rId12"/>
-    <p:sldId id="270" r:id="rId13"/>
-    <p:sldId id="275" r:id="rId14"/>
-    <p:sldId id="267" r:id="rId15"/>
-    <p:sldId id="276" r:id="rId16"/>
-    <p:sldId id="277" r:id="rId17"/>
-    <p:sldId id="265" r:id="rId18"/>
-    <p:sldId id="261" r:id="rId19"/>
-    <p:sldId id="262" r:id="rId20"/>
-    <p:sldId id="278" r:id="rId21"/>
-    <p:sldId id="264" r:id="rId22"/>
-    <p:sldId id="268" r:id="rId23"/>
-    <p:sldId id="269" r:id="rId24"/>
+    <p:sldId id="279" r:id="rId6"/>
+    <p:sldId id="263" r:id="rId7"/>
+    <p:sldId id="259" r:id="rId8"/>
+    <p:sldId id="260" r:id="rId9"/>
+    <p:sldId id="271" r:id="rId10"/>
+    <p:sldId id="273" r:id="rId11"/>
+    <p:sldId id="272" r:id="rId12"/>
+    <p:sldId id="266" r:id="rId13"/>
+    <p:sldId id="270" r:id="rId14"/>
+    <p:sldId id="275" r:id="rId15"/>
+    <p:sldId id="267" r:id="rId16"/>
+    <p:sldId id="276" r:id="rId17"/>
+    <p:sldId id="277" r:id="rId18"/>
+    <p:sldId id="265" r:id="rId19"/>
+    <p:sldId id="261" r:id="rId20"/>
+    <p:sldId id="262" r:id="rId21"/>
+    <p:sldId id="278" r:id="rId22"/>
+    <p:sldId id="264" r:id="rId23"/>
+    <p:sldId id="268" r:id="rId24"/>
+    <p:sldId id="269" r:id="rId25"/>
   </p:sldIdLst>
   <p:sldSz cx="12192000" cy="6858000"/>
   <p:notesSz cx="6858000" cy="9144000"/>
@@ -265,7 +266,7 @@
           <a:p>
             <a:fld id="{A36D2051-A124-4F95-BC42-35393635D3A2}" type="datetimeFigureOut">
               <a:rPr lang="en-US" smtClean="0"/>
-              <a:t>9/10/2023</a:t>
+              <a:t>9/12/2023</a:t>
             </a:fld>
             <a:endParaRPr lang="en-US"/>
           </a:p>
@@ -435,7 +436,7 @@
           <a:p>
             <a:fld id="{A36D2051-A124-4F95-BC42-35393635D3A2}" type="datetimeFigureOut">
               <a:rPr lang="en-US" smtClean="0"/>
-              <a:t>9/10/2023</a:t>
+              <a:t>9/12/2023</a:t>
             </a:fld>
             <a:endParaRPr lang="en-US"/>
           </a:p>
@@ -615,7 +616,7 @@
           <a:p>
             <a:fld id="{A36D2051-A124-4F95-BC42-35393635D3A2}" type="datetimeFigureOut">
               <a:rPr lang="en-US" smtClean="0"/>
-              <a:t>9/10/2023</a:t>
+              <a:t>9/12/2023</a:t>
             </a:fld>
             <a:endParaRPr lang="en-US"/>
           </a:p>
@@ -785,7 +786,7 @@
           <a:p>
             <a:fld id="{A36D2051-A124-4F95-BC42-35393635D3A2}" type="datetimeFigureOut">
               <a:rPr lang="en-US" smtClean="0"/>
-              <a:t>9/10/2023</a:t>
+              <a:t>9/12/2023</a:t>
             </a:fld>
             <a:endParaRPr lang="en-US"/>
           </a:p>
@@ -1031,7 +1032,7 @@
           <a:p>
             <a:fld id="{A36D2051-A124-4F95-BC42-35393635D3A2}" type="datetimeFigureOut">
               <a:rPr lang="en-US" smtClean="0"/>
-              <a:t>9/10/2023</a:t>
+              <a:t>9/12/2023</a:t>
             </a:fld>
             <a:endParaRPr lang="en-US"/>
           </a:p>
@@ -1263,7 +1264,7 @@
           <a:p>
             <a:fld id="{A36D2051-A124-4F95-BC42-35393635D3A2}" type="datetimeFigureOut">
               <a:rPr lang="en-US" smtClean="0"/>
-              <a:t>9/10/2023</a:t>
+              <a:t>9/12/2023</a:t>
             </a:fld>
             <a:endParaRPr lang="en-US"/>
           </a:p>
@@ -1630,7 +1631,7 @@
           <a:p>
             <a:fld id="{A36D2051-A124-4F95-BC42-35393635D3A2}" type="datetimeFigureOut">
               <a:rPr lang="en-US" smtClean="0"/>
-              <a:t>9/10/2023</a:t>
+              <a:t>9/12/2023</a:t>
             </a:fld>
             <a:endParaRPr lang="en-US"/>
           </a:p>
@@ -1748,7 +1749,7 @@
           <a:p>
             <a:fld id="{A36D2051-A124-4F95-BC42-35393635D3A2}" type="datetimeFigureOut">
               <a:rPr lang="en-US" smtClean="0"/>
-              <a:t>9/10/2023</a:t>
+              <a:t>9/12/2023</a:t>
             </a:fld>
             <a:endParaRPr lang="en-US"/>
           </a:p>
@@ -1843,7 +1844,7 @@
           <a:p>
             <a:fld id="{A36D2051-A124-4F95-BC42-35393635D3A2}" type="datetimeFigureOut">
               <a:rPr lang="en-US" smtClean="0"/>
-              <a:t>9/10/2023</a:t>
+              <a:t>9/12/2023</a:t>
             </a:fld>
             <a:endParaRPr lang="en-US"/>
           </a:p>
@@ -2120,7 +2121,7 @@
           <a:p>
             <a:fld id="{A36D2051-A124-4F95-BC42-35393635D3A2}" type="datetimeFigureOut">
               <a:rPr lang="en-US" smtClean="0"/>
-              <a:t>9/10/2023</a:t>
+              <a:t>9/12/2023</a:t>
             </a:fld>
             <a:endParaRPr lang="en-US"/>
           </a:p>
@@ -2373,7 +2374,7 @@
           <a:p>
             <a:fld id="{A36D2051-A124-4F95-BC42-35393635D3A2}" type="datetimeFigureOut">
               <a:rPr lang="en-US" smtClean="0"/>
-              <a:t>9/10/2023</a:t>
+              <a:t>9/12/2023</a:t>
             </a:fld>
             <a:endParaRPr lang="en-US"/>
           </a:p>
@@ -2586,7 +2587,7 @@
           <a:p>
             <a:fld id="{A36D2051-A124-4F95-BC42-35393635D3A2}" type="datetimeFigureOut">
               <a:rPr lang="en-US" smtClean="0"/>
-              <a:t>9/10/2023</a:t>
+              <a:t>9/12/2023</a:t>
             </a:fld>
             <a:endParaRPr lang="en-US"/>
           </a:p>
@@ -3092,11 +3093,7 @@
           <a:p>
             <a:r>
               <a:rPr lang="en-US" dirty="0" smtClean="0"/>
-              <a:t>Link for LL </a:t>
-            </a:r>
-            <a:r>
-              <a:rPr lang="en-US" dirty="0" smtClean="0"/>
-              <a:t>survey q: no link comparison</a:t>
+              <a:t>Link for LL survey q: no link comparison</a:t>
             </a:r>
             <a:endParaRPr lang="en-US" dirty="0"/>
           </a:p>
@@ -3126,25 +3123,71 @@
           <a:p>
             <a:r>
               <a:rPr lang="en-US" dirty="0" smtClean="0"/>
-              <a:t>Recommendation: continue with model that includes environmental link for LL survey q</a:t>
-            </a:r>
+              <a:t>In every retrospective year, model with link preferred over model without link</a:t>
+            </a:r>
+          </a:p>
+          <a:p>
+            <a:r>
+              <a:rPr lang="en-US" dirty="0" err="1" smtClean="0"/>
+              <a:t>Mohn’s</a:t>
+            </a:r>
+            <a:r>
+              <a:rPr lang="en-US" dirty="0" smtClean="0"/>
+              <a:t> rho 2019.1b = -0.0727</a:t>
+            </a:r>
+          </a:p>
+          <a:p>
+            <a:r>
+              <a:rPr lang="en-US" dirty="0" err="1" smtClean="0"/>
+              <a:t>Mohn’s</a:t>
+            </a:r>
+            <a:r>
+              <a:rPr lang="en-US" dirty="0" smtClean="0"/>
+              <a:t> rho 2019.1c = -0.0722</a:t>
+            </a:r>
+          </a:p>
+          <a:p>
+            <a:endParaRPr lang="en-US" dirty="0"/>
           </a:p>
           <a:p>
             <a:endParaRPr lang="en-US" dirty="0" smtClean="0"/>
           </a:p>
           <a:p>
-            <a:r>
-              <a:rPr lang="en-US" dirty="0" smtClean="0"/>
-              <a:t>Continue to monitor with retro AIC table in SAFE</a:t>
-            </a:r>
+            <a:endParaRPr lang="en-US" dirty="0"/>
+          </a:p>
+          <a:p>
             <a:endParaRPr lang="en-US" dirty="0" smtClean="0"/>
           </a:p>
         </p:txBody>
       </p:sp>
+      <p:pic>
+        <p:nvPicPr>
+          <p:cNvPr id="12" name="Picture 11"/>
+          <p:cNvPicPr>
+            <a:picLocks noChangeAspect="1"/>
+          </p:cNvPicPr>
+          <p:nvPr/>
+        </p:nvPicPr>
+        <p:blipFill>
+          <a:blip r:embed="rId2"/>
+          <a:stretch>
+            <a:fillRect/>
+          </a:stretch>
+        </p:blipFill>
+        <p:spPr>
+          <a:xfrm>
+            <a:off x="6124574" y="2405161"/>
+            <a:ext cx="4819651" cy="4037594"/>
+          </a:xfrm>
+          <a:prstGeom prst="rect">
+            <a:avLst/>
+          </a:prstGeom>
+        </p:spPr>
+      </p:pic>
     </p:spTree>
     <p:extLst>
       <p:ext uri="{BB962C8B-B14F-4D97-AF65-F5344CB8AC3E}">
-        <p14:creationId xmlns:p14="http://schemas.microsoft.com/office/powerpoint/2010/main" val="3364591089"/>
+        <p14:creationId xmlns:p14="http://schemas.microsoft.com/office/powerpoint/2010/main" val="4285928814"/>
       </p:ext>
     </p:extLst>
   </p:cSld>
@@ -3188,15 +3231,7 @@
           <a:p>
             <a:r>
               <a:rPr lang="en-US" dirty="0" smtClean="0"/>
-              <a:t>Link for LL </a:t>
-            </a:r>
-            <a:r>
-              <a:rPr lang="en-US" dirty="0" smtClean="0"/>
-              <a:t>survey q: </a:t>
-            </a:r>
-            <a:r>
-              <a:rPr lang="en-US" dirty="0" smtClean="0"/>
-              <a:t>re-evaluation</a:t>
+              <a:t>Link for LL survey q: no link comparison</a:t>
             </a:r>
             <a:endParaRPr lang="en-US" dirty="0"/>
           </a:p>
@@ -3212,6 +3247,74 @@
             <p:ph idx="1"/>
           </p:nvPr>
         </p:nvSpPr>
+        <p:spPr>
+          <a:xfrm>
+            <a:off x="838199" y="1825625"/>
+            <a:ext cx="10791825" cy="4351338"/>
+          </a:xfrm>
+        </p:spPr>
+        <p:txBody>
+          <a:bodyPr>
+            <a:normAutofit/>
+          </a:bodyPr>
+          <a:lstStyle/>
+          <a:p>
+            <a:r>
+              <a:rPr lang="en-US" dirty="0" smtClean="0"/>
+              <a:t>Recommendation: continue with model that includes environmental link for LL survey q</a:t>
+            </a:r>
+          </a:p>
+          <a:p>
+            <a:endParaRPr lang="en-US" dirty="0" smtClean="0"/>
+          </a:p>
+          <a:p>
+            <a:r>
+              <a:rPr lang="en-US" dirty="0" smtClean="0"/>
+              <a:t>Continue to monitor with retro AIC table in SAFE</a:t>
+            </a:r>
+          </a:p>
+        </p:txBody>
+      </p:sp>
+    </p:spTree>
+    <p:extLst>
+      <p:ext uri="{BB962C8B-B14F-4D97-AF65-F5344CB8AC3E}">
+        <p14:creationId xmlns:p14="http://schemas.microsoft.com/office/powerpoint/2010/main" val="3364591089"/>
+      </p:ext>
+    </p:extLst>
+  </p:cSld>
+  <p:clrMapOvr>
+    <a:masterClrMapping/>
+  </p:clrMapOvr>
+</p:sld>
+</file>
+
+<file path=ppt/slides/slide12.xml><?xml version="1.0" encoding="utf-8"?>
+<p:sld xmlns:a="http://schemas.openxmlformats.org/drawingml/2006/main" xmlns:r="http://schemas.openxmlformats.org/officeDocument/2006/relationships" xmlns:p="http://schemas.openxmlformats.org/presentationml/2006/main">
+  <p:cSld>
+    <p:spTree>
+      <p:nvGrpSpPr>
+        <p:cNvPr id="1" name=""/>
+        <p:cNvGrpSpPr/>
+        <p:nvPr/>
+      </p:nvGrpSpPr>
+      <p:grpSpPr>
+        <a:xfrm>
+          <a:off x="0" y="0"/>
+          <a:ext cx="0" cy="0"/>
+          <a:chOff x="0" y="0"/>
+          <a:chExt cx="0" cy="0"/>
+        </a:xfrm>
+      </p:grpSpPr>
+      <p:sp>
+        <p:nvSpPr>
+          <p:cNvPr id="2" name="Title 1"/>
+          <p:cNvSpPr>
+            <a:spLocks noGrp="1"/>
+          </p:cNvSpPr>
+          <p:nvPr>
+            <p:ph type="title"/>
+          </p:nvPr>
+        </p:nvSpPr>
         <p:spPr/>
         <p:txBody>
           <a:bodyPr/>
@@ -3219,15 +3322,30 @@
           <a:p>
             <a:r>
               <a:rPr lang="en-US" dirty="0" smtClean="0"/>
-              <a:t>Step 1: </a:t>
-            </a:r>
-            <a:r>
-              <a:rPr lang="en-US" dirty="0" smtClean="0"/>
-              <a:t>AIC difference = </a:t>
-            </a:r>
-            <a:r>
-              <a:rPr lang="en-US" dirty="0" smtClean="0"/>
-              <a:t>base model (2019.1b) – new </a:t>
+              <a:t>Link for LL survey q: re-evaluation</a:t>
+            </a:r>
+            <a:endParaRPr lang="en-US" dirty="0"/>
+          </a:p>
+        </p:txBody>
+      </p:sp>
+      <p:sp>
+        <p:nvSpPr>
+          <p:cNvPr id="3" name="Content Placeholder 2"/>
+          <p:cNvSpPr>
+            <a:spLocks noGrp="1"/>
+          </p:cNvSpPr>
+          <p:nvPr>
+            <p:ph idx="1"/>
+          </p:nvPr>
+        </p:nvSpPr>
+        <p:spPr/>
+        <p:txBody>
+          <a:bodyPr/>
+          <a:lstStyle/>
+          <a:p>
+            <a:r>
+              <a:rPr lang="en-US" dirty="0" smtClean="0"/>
+              <a:t>Step 1: AIC difference = base model (2019.1b) – new </a:t>
             </a:r>
             <a:r>
               <a:rPr lang="en-US" dirty="0" err="1" smtClean="0"/>
@@ -3292,7 +3410,7 @@
 </p:sld>
 </file>
 
-<file path=ppt/slides/slide12.xml><?xml version="1.0" encoding="utf-8"?>
+<file path=ppt/slides/slide13.xml><?xml version="1.0" encoding="utf-8"?>
 <p:sld xmlns:a="http://schemas.openxmlformats.org/drawingml/2006/main" xmlns:r="http://schemas.openxmlformats.org/officeDocument/2006/relationships" xmlns:p="http://schemas.openxmlformats.org/presentationml/2006/main">
   <p:cSld>
     <p:spTree>
@@ -3326,15 +3444,7 @@
           <a:p>
             <a:r>
               <a:rPr lang="en-US" dirty="0" smtClean="0"/>
-              <a:t>Link for LL </a:t>
-            </a:r>
-            <a:r>
-              <a:rPr lang="en-US" dirty="0" smtClean="0"/>
-              <a:t>survey catchability, </a:t>
-            </a:r>
-            <a:r>
-              <a:rPr lang="en-US" dirty="0" smtClean="0"/>
-              <a:t>re-evaluation</a:t>
+              <a:t>Link for LL survey catchability, re-evaluation</a:t>
             </a:r>
             <a:endParaRPr lang="en-US" dirty="0"/>
           </a:p>
@@ -3359,7 +3469,6 @@
               <a:rPr lang="en-US" dirty="0" smtClean="0"/>
               <a:t>Fit to LL survey:</a:t>
             </a:r>
-            <a:endParaRPr lang="en-US" dirty="0" smtClean="0"/>
           </a:p>
           <a:p>
             <a:endParaRPr lang="en-US" dirty="0"/>
@@ -3619,7 +3728,7 @@
 </p:sld>
 </file>
 
-<file path=ppt/slides/slide13.xml><?xml version="1.0" encoding="utf-8"?>
+<file path=ppt/slides/slide14.xml><?xml version="1.0" encoding="utf-8"?>
 <p:sld xmlns:a="http://schemas.openxmlformats.org/drawingml/2006/main" xmlns:r="http://schemas.openxmlformats.org/officeDocument/2006/relationships" xmlns:p="http://schemas.openxmlformats.org/presentationml/2006/main">
   <p:cSld>
     <p:spTree>
@@ -3653,15 +3762,7 @@
           <a:p>
             <a:r>
               <a:rPr lang="en-US" dirty="0" smtClean="0"/>
-              <a:t>Link for LL </a:t>
-            </a:r>
-            <a:r>
-              <a:rPr lang="en-US" dirty="0" smtClean="0"/>
-              <a:t>survey catchability, </a:t>
-            </a:r>
-            <a:r>
-              <a:rPr lang="en-US" dirty="0" smtClean="0"/>
-              <a:t>re-evaluation</a:t>
+              <a:t>Link for LL survey catchability, re-evaluation</a:t>
             </a:r>
             <a:endParaRPr lang="en-US" dirty="0"/>
           </a:p>
@@ -3735,7 +3836,7 @@
 </p:sld>
 </file>
 
-<file path=ppt/slides/slide14.xml><?xml version="1.0" encoding="utf-8"?>
+<file path=ppt/slides/slide15.xml><?xml version="1.0" encoding="utf-8"?>
 <p:sld xmlns:a="http://schemas.openxmlformats.org/drawingml/2006/main" xmlns:r="http://schemas.openxmlformats.org/officeDocument/2006/relationships" xmlns:p="http://schemas.openxmlformats.org/presentationml/2006/main">
   <p:cSld>
     <p:spTree>
@@ -3792,15 +3893,7 @@
           <a:p>
             <a:r>
               <a:rPr lang="en-US" dirty="0" smtClean="0"/>
-              <a:t>Retro </a:t>
-            </a:r>
-            <a:r>
-              <a:rPr lang="en-US" dirty="0" smtClean="0"/>
-              <a:t>Total likelihood </a:t>
-            </a:r>
-            <a:r>
-              <a:rPr lang="en-US" dirty="0" smtClean="0"/>
-              <a:t>and </a:t>
+              <a:t>Retro Total likelihood and </a:t>
             </a:r>
             <a:r>
               <a:rPr lang="en-US" dirty="0" err="1" smtClean="0"/>
@@ -3808,11 +3901,7 @@
             </a:r>
             <a:r>
               <a:rPr lang="en-US" dirty="0" smtClean="0"/>
-              <a:t> </a:t>
-            </a:r>
-            <a:r>
-              <a:rPr lang="en-US" dirty="0" smtClean="0"/>
-              <a:t>rho:</a:t>
+              <a:t> rho:</a:t>
             </a:r>
           </a:p>
           <a:p>
@@ -3881,7 +3970,7 @@
 </p:sld>
 </file>
 
-<file path=ppt/slides/slide15.xml><?xml version="1.0" encoding="utf-8"?>
+<file path=ppt/slides/slide16.xml><?xml version="1.0" encoding="utf-8"?>
 <p:sld xmlns:a="http://schemas.openxmlformats.org/drawingml/2006/main" xmlns:r="http://schemas.openxmlformats.org/officeDocument/2006/relationships" xmlns:p="http://schemas.openxmlformats.org/presentationml/2006/main">
   <p:cSld>
     <p:spTree>
@@ -3986,105 +4075,6 @@
 </p:sld>
 </file>
 
-<file path=ppt/slides/slide16.xml><?xml version="1.0" encoding="utf-8"?>
-<p:sld xmlns:a="http://schemas.openxmlformats.org/drawingml/2006/main" xmlns:r="http://schemas.openxmlformats.org/officeDocument/2006/relationships" xmlns:p="http://schemas.openxmlformats.org/presentationml/2006/main">
-  <p:cSld>
-    <p:spTree>
-      <p:nvGrpSpPr>
-        <p:cNvPr id="1" name=""/>
-        <p:cNvGrpSpPr/>
-        <p:nvPr/>
-      </p:nvGrpSpPr>
-      <p:grpSpPr>
-        <a:xfrm>
-          <a:off x="0" y="0"/>
-          <a:ext cx="0" cy="0"/>
-          <a:chOff x="0" y="0"/>
-          <a:chExt cx="0" cy="0"/>
-        </a:xfrm>
-      </p:grpSpPr>
-      <p:sp>
-        <p:nvSpPr>
-          <p:cNvPr id="2" name="Title 1"/>
-          <p:cNvSpPr>
-            <a:spLocks noGrp="1"/>
-          </p:cNvSpPr>
-          <p:nvPr>
-            <p:ph type="title"/>
-          </p:nvPr>
-        </p:nvSpPr>
-        <p:spPr/>
-        <p:txBody>
-          <a:bodyPr/>
-          <a:lstStyle/>
-          <a:p>
-            <a:r>
-              <a:rPr lang="en-US" dirty="0" smtClean="0"/>
-              <a:t>Link for LL survey, re-evaluation</a:t>
-            </a:r>
-            <a:endParaRPr lang="en-US" dirty="0"/>
-          </a:p>
-        </p:txBody>
-      </p:sp>
-      <p:sp>
-        <p:nvSpPr>
-          <p:cNvPr id="3" name="Content Placeholder 2"/>
-          <p:cNvSpPr>
-            <a:spLocks noGrp="1"/>
-          </p:cNvSpPr>
-          <p:nvPr>
-            <p:ph idx="1"/>
-          </p:nvPr>
-        </p:nvSpPr>
-        <p:spPr/>
-        <p:txBody>
-          <a:bodyPr/>
-          <a:lstStyle/>
-          <a:p>
-            <a:r>
-              <a:rPr lang="en-US" dirty="0" smtClean="0"/>
-              <a:t>Recommendation: Bring forward 2019.1d, with new CFSR index, as alternative model in November</a:t>
-            </a:r>
-          </a:p>
-          <a:p>
-            <a:endParaRPr lang="en-US" dirty="0"/>
-          </a:p>
-          <a:p>
-            <a:r>
-              <a:rPr lang="en-US" dirty="0" smtClean="0"/>
-              <a:t>Food for thought:</a:t>
-            </a:r>
-          </a:p>
-          <a:p>
-            <a:pPr lvl="1"/>
-            <a:r>
-              <a:rPr lang="en-US" dirty="0" smtClean="0"/>
-              <a:t>Evaluation of environmental links is a fluid and iterative process</a:t>
-            </a:r>
-          </a:p>
-          <a:p>
-            <a:pPr lvl="1"/>
-            <a:r>
-              <a:rPr lang="en-US" dirty="0" smtClean="0"/>
-              <a:t>Will be evaluating new indices, will be evaluating links, will continually be evaluating model to find improvements</a:t>
-            </a:r>
-            <a:endParaRPr lang="en-US" dirty="0"/>
-          </a:p>
-        </p:txBody>
-      </p:sp>
-    </p:spTree>
-    <p:extLst>
-      <p:ext uri="{BB962C8B-B14F-4D97-AF65-F5344CB8AC3E}">
-        <p14:creationId xmlns:p14="http://schemas.microsoft.com/office/powerpoint/2010/main" val="1105604396"/>
-      </p:ext>
-    </p:extLst>
-  </p:cSld>
-  <p:clrMapOvr>
-    <a:masterClrMapping/>
-  </p:clrMapOvr>
-</p:sld>
-</file>
-
 <file path=ppt/slides/slide17.xml><?xml version="1.0" encoding="utf-8"?>
 <p:sld xmlns:a="http://schemas.openxmlformats.org/drawingml/2006/main" xmlns:r="http://schemas.openxmlformats.org/officeDocument/2006/relationships" xmlns:p="http://schemas.openxmlformats.org/presentationml/2006/main">
   <p:cSld>
@@ -4119,15 +4109,7 @@
           <a:p>
             <a:r>
               <a:rPr lang="en-US" dirty="0" smtClean="0"/>
-              <a:t>Environmental l</a:t>
-            </a:r>
-            <a:r>
-              <a:rPr lang="en-US" dirty="0" smtClean="0"/>
-              <a:t>ink </a:t>
-            </a:r>
-            <a:r>
-              <a:rPr lang="en-US" dirty="0" smtClean="0"/>
-              <a:t>for growth</a:t>
+              <a:t>Link for LL survey, re-evaluation</a:t>
             </a:r>
             <a:endParaRPr lang="en-US" dirty="0"/>
           </a:p>
@@ -4150,94 +4132,39 @@
           <a:p>
             <a:r>
               <a:rPr lang="en-US" dirty="0" smtClean="0"/>
-              <a:t>Step 1: </a:t>
+              <a:t>Recommendation: Bring forward 2019.1d, with new CFSR index, as alternative model in November</a:t>
+            </a:r>
+          </a:p>
+          <a:p>
+            <a:endParaRPr lang="en-US" dirty="0"/>
+          </a:p>
+          <a:p>
+            <a:r>
+              <a:rPr lang="en-US" dirty="0" smtClean="0"/>
+              <a:t>Food for thought:</a:t>
             </a:r>
           </a:p>
           <a:p>
             <a:pPr lvl="1"/>
             <a:r>
-              <a:rPr lang="en-US" dirty="0"/>
-              <a:t>E</a:t>
-            </a:r>
-            <a:r>
-              <a:rPr lang="en-US" dirty="0" smtClean="0"/>
-              <a:t>valuated </a:t>
-            </a:r>
-            <a:r>
-              <a:rPr lang="en-US" dirty="0" err="1" smtClean="0"/>
-              <a:t>Linf</a:t>
-            </a:r>
-            <a:r>
-              <a:rPr lang="en-US" dirty="0"/>
-              <a:t> </a:t>
-            </a:r>
-            <a:r>
-              <a:rPr lang="en-US" dirty="0" smtClean="0"/>
-              <a:t>and kappa across length bin and month</a:t>
+              <a:rPr lang="en-US" dirty="0" smtClean="0"/>
+              <a:t>Evaluation of environmental links is a fluid and iterative process</a:t>
             </a:r>
           </a:p>
           <a:p>
             <a:pPr lvl="1"/>
             <a:r>
               <a:rPr lang="en-US" dirty="0" smtClean="0"/>
-              <a:t>Evaluated </a:t>
-            </a:r>
-            <a:r>
-              <a:rPr lang="en-US" dirty="0" err="1" smtClean="0"/>
-              <a:t>Lzero</a:t>
-            </a:r>
-            <a:r>
-              <a:rPr lang="en-US" dirty="0" smtClean="0"/>
-              <a:t> across month for 0-20 cm length bin</a:t>
-            </a:r>
-          </a:p>
-          <a:p>
-            <a:r>
-              <a:rPr lang="en-US" dirty="0" smtClean="0"/>
-              <a:t>Step 2:</a:t>
-            </a:r>
-          </a:p>
-          <a:p>
-            <a:pPr lvl="1"/>
-            <a:r>
-              <a:rPr lang="en-US" dirty="0" smtClean="0"/>
-              <a:t>Select best from Step 1, and run model with </a:t>
-            </a:r>
-            <a:r>
-              <a:rPr lang="en-US" dirty="0" err="1" smtClean="0"/>
-              <a:t>env</a:t>
-            </a:r>
-            <a:r>
-              <a:rPr lang="en-US" dirty="0" smtClean="0"/>
-              <a:t> link for all 3 growth parameters</a:t>
-            </a:r>
-          </a:p>
-          <a:p>
-            <a:r>
-              <a:rPr lang="en-US" dirty="0" smtClean="0"/>
-              <a:t>Step 3:</a:t>
-            </a:r>
-          </a:p>
-          <a:p>
-            <a:pPr lvl="1"/>
-            <a:r>
-              <a:rPr lang="en-US" dirty="0" smtClean="0"/>
-              <a:t>Compare with base model</a:t>
-            </a:r>
-          </a:p>
-          <a:p>
-            <a:pPr lvl="1"/>
-            <a:r>
-              <a:rPr lang="en-US" dirty="0" smtClean="0"/>
-              <a:t>Statistics: current year AIC and model fits, retrospective AIC and performance</a:t>
-            </a:r>
+              <a:t>Will be evaluating new indices, will be evaluating links, will continually be evaluating model to find improvements</a:t>
+            </a:r>
+            <a:endParaRPr lang="en-US" dirty="0"/>
           </a:p>
         </p:txBody>
       </p:sp>
     </p:spTree>
     <p:extLst>
       <p:ext uri="{BB962C8B-B14F-4D97-AF65-F5344CB8AC3E}">
-        <p14:creationId xmlns:p14="http://schemas.microsoft.com/office/powerpoint/2010/main" val="916100377"/>
+        <p14:creationId xmlns:p14="http://schemas.microsoft.com/office/powerpoint/2010/main" val="1105604396"/>
       </p:ext>
     </p:extLst>
   </p:cSld>
@@ -4281,6 +4208,160 @@
           <a:p>
             <a:r>
               <a:rPr lang="en-US" dirty="0" smtClean="0"/>
+              <a:t>Environmental link for growth</a:t>
+            </a:r>
+            <a:endParaRPr lang="en-US" dirty="0"/>
+          </a:p>
+        </p:txBody>
+      </p:sp>
+      <p:sp>
+        <p:nvSpPr>
+          <p:cNvPr id="3" name="Content Placeholder 2"/>
+          <p:cNvSpPr>
+            <a:spLocks noGrp="1"/>
+          </p:cNvSpPr>
+          <p:nvPr>
+            <p:ph idx="1"/>
+          </p:nvPr>
+        </p:nvSpPr>
+        <p:spPr/>
+        <p:txBody>
+          <a:bodyPr/>
+          <a:lstStyle/>
+          <a:p>
+            <a:r>
+              <a:rPr lang="en-US" dirty="0" smtClean="0"/>
+              <a:t>Step 1: </a:t>
+            </a:r>
+          </a:p>
+          <a:p>
+            <a:pPr lvl="1"/>
+            <a:r>
+              <a:rPr lang="en-US" dirty="0"/>
+              <a:t>E</a:t>
+            </a:r>
+            <a:r>
+              <a:rPr lang="en-US" dirty="0" smtClean="0"/>
+              <a:t>valuated </a:t>
+            </a:r>
+            <a:r>
+              <a:rPr lang="en-US" dirty="0" err="1" smtClean="0"/>
+              <a:t>Linf</a:t>
+            </a:r>
+            <a:r>
+              <a:rPr lang="en-US" dirty="0"/>
+              <a:t> </a:t>
+            </a:r>
+            <a:r>
+              <a:rPr lang="en-US" dirty="0" smtClean="0"/>
+              <a:t>and kappa across length bin and month</a:t>
+            </a:r>
+          </a:p>
+          <a:p>
+            <a:pPr lvl="1"/>
+            <a:r>
+              <a:rPr lang="en-US" dirty="0" smtClean="0"/>
+              <a:t>Evaluated </a:t>
+            </a:r>
+            <a:r>
+              <a:rPr lang="en-US" dirty="0" err="1" smtClean="0"/>
+              <a:t>Lzero</a:t>
+            </a:r>
+            <a:r>
+              <a:rPr lang="en-US" dirty="0" smtClean="0"/>
+              <a:t> across month for 0-20 cm length bin</a:t>
+            </a:r>
+          </a:p>
+          <a:p>
+            <a:r>
+              <a:rPr lang="en-US" dirty="0" smtClean="0"/>
+              <a:t>Step 2:</a:t>
+            </a:r>
+          </a:p>
+          <a:p>
+            <a:pPr lvl="1"/>
+            <a:r>
+              <a:rPr lang="en-US" dirty="0" smtClean="0"/>
+              <a:t>Select best from Step 1, and run model with </a:t>
+            </a:r>
+            <a:r>
+              <a:rPr lang="en-US" dirty="0" err="1" smtClean="0"/>
+              <a:t>env</a:t>
+            </a:r>
+            <a:r>
+              <a:rPr lang="en-US" dirty="0" smtClean="0"/>
+              <a:t> link for all 3 growth parameters</a:t>
+            </a:r>
+          </a:p>
+          <a:p>
+            <a:r>
+              <a:rPr lang="en-US" dirty="0" smtClean="0"/>
+              <a:t>Step 3:</a:t>
+            </a:r>
+          </a:p>
+          <a:p>
+            <a:pPr lvl="1"/>
+            <a:r>
+              <a:rPr lang="en-US" dirty="0" smtClean="0"/>
+              <a:t>Compare with base model</a:t>
+            </a:r>
+          </a:p>
+          <a:p>
+            <a:pPr lvl="1"/>
+            <a:r>
+              <a:rPr lang="en-US" dirty="0" smtClean="0"/>
+              <a:t>Statistics: current year AIC and model fits, retrospective AIC and performance</a:t>
+            </a:r>
+          </a:p>
+        </p:txBody>
+      </p:sp>
+    </p:spTree>
+    <p:extLst>
+      <p:ext uri="{BB962C8B-B14F-4D97-AF65-F5344CB8AC3E}">
+        <p14:creationId xmlns:p14="http://schemas.microsoft.com/office/powerpoint/2010/main" val="916100377"/>
+      </p:ext>
+    </p:extLst>
+  </p:cSld>
+  <p:clrMapOvr>
+    <a:masterClrMapping/>
+  </p:clrMapOvr>
+</p:sld>
+</file>
+
+<file path=ppt/slides/slide19.xml><?xml version="1.0" encoding="utf-8"?>
+<p:sld xmlns:a="http://schemas.openxmlformats.org/drawingml/2006/main" xmlns:r="http://schemas.openxmlformats.org/officeDocument/2006/relationships" xmlns:p="http://schemas.openxmlformats.org/presentationml/2006/main">
+  <p:cSld>
+    <p:spTree>
+      <p:nvGrpSpPr>
+        <p:cNvPr id="1" name=""/>
+        <p:cNvGrpSpPr/>
+        <p:nvPr/>
+      </p:nvGrpSpPr>
+      <p:grpSpPr>
+        <a:xfrm>
+          <a:off x="0" y="0"/>
+          <a:ext cx="0" cy="0"/>
+          <a:chOff x="0" y="0"/>
+          <a:chExt cx="0" cy="0"/>
+        </a:xfrm>
+      </p:grpSpPr>
+      <p:sp>
+        <p:nvSpPr>
+          <p:cNvPr id="2" name="Title 1"/>
+          <p:cNvSpPr>
+            <a:spLocks noGrp="1"/>
+          </p:cNvSpPr>
+          <p:nvPr>
+            <p:ph type="title"/>
+          </p:nvPr>
+        </p:nvSpPr>
+        <p:spPr/>
+        <p:txBody>
+          <a:bodyPr/>
+          <a:lstStyle/>
+          <a:p>
+            <a:r>
+              <a:rPr lang="en-US" dirty="0" smtClean="0"/>
               <a:t>Link for growth</a:t>
             </a:r>
             <a:endParaRPr lang="en-US" dirty="0"/>
@@ -4364,11 +4445,7 @@
             </a:r>
             <a:r>
               <a:rPr lang="en-US" dirty="0" smtClean="0"/>
-              <a:t> </a:t>
-            </a:r>
-            <a:r>
-              <a:rPr lang="en-US" dirty="0" smtClean="0"/>
-              <a:t>&gt; </a:t>
+              <a:t> &gt; </a:t>
             </a:r>
             <a:r>
               <a:rPr lang="en-US" dirty="0" err="1" smtClean="0"/>
@@ -4481,7 +4558,184 @@
 </p:sld>
 </file>
 
-<file path=ppt/slides/slide19.xml><?xml version="1.0" encoding="utf-8"?>
+<file path=ppt/slides/slide2.xml><?xml version="1.0" encoding="utf-8"?>
+<p:sld xmlns:a="http://schemas.openxmlformats.org/drawingml/2006/main" xmlns:r="http://schemas.openxmlformats.org/officeDocument/2006/relationships" xmlns:p="http://schemas.openxmlformats.org/presentationml/2006/main">
+  <p:cSld>
+    <p:spTree>
+      <p:nvGrpSpPr>
+        <p:cNvPr id="1" name=""/>
+        <p:cNvGrpSpPr/>
+        <p:nvPr/>
+      </p:nvGrpSpPr>
+      <p:grpSpPr>
+        <a:xfrm>
+          <a:off x="0" y="0"/>
+          <a:ext cx="0" cy="0"/>
+          <a:chOff x="0" y="0"/>
+          <a:chExt cx="0" cy="0"/>
+        </a:xfrm>
+      </p:grpSpPr>
+      <p:sp>
+        <p:nvSpPr>
+          <p:cNvPr id="2" name="Title 1"/>
+          <p:cNvSpPr>
+            <a:spLocks noGrp="1"/>
+          </p:cNvSpPr>
+          <p:nvPr>
+            <p:ph type="title"/>
+          </p:nvPr>
+        </p:nvSpPr>
+        <p:spPr/>
+        <p:txBody>
+          <a:bodyPr/>
+          <a:lstStyle/>
+          <a:p>
+            <a:r>
+              <a:rPr lang="en-US" dirty="0" smtClean="0"/>
+              <a:t>Overview</a:t>
+            </a:r>
+            <a:endParaRPr lang="en-US" dirty="0"/>
+          </a:p>
+        </p:txBody>
+      </p:sp>
+      <p:sp>
+        <p:nvSpPr>
+          <p:cNvPr id="3" name="Content Placeholder 2"/>
+          <p:cNvSpPr>
+            <a:spLocks noGrp="1"/>
+          </p:cNvSpPr>
+          <p:nvPr>
+            <p:ph idx="1"/>
+          </p:nvPr>
+        </p:nvSpPr>
+        <p:spPr/>
+        <p:txBody>
+          <a:bodyPr>
+            <a:normAutofit fontScale="92500" lnSpcReduction="10000"/>
+          </a:bodyPr>
+          <a:lstStyle/>
+          <a:p>
+            <a:r>
+              <a:rPr lang="en-US" dirty="0" smtClean="0"/>
+              <a:t>Housecleaning (CAAL minimum sample size)</a:t>
+            </a:r>
+          </a:p>
+          <a:p>
+            <a:r>
+              <a:rPr lang="en-US" dirty="0" smtClean="0"/>
+              <a:t>Review of environmental link</a:t>
+            </a:r>
+          </a:p>
+          <a:p>
+            <a:pPr lvl="1"/>
+            <a:r>
+              <a:rPr lang="en-US" dirty="0" smtClean="0"/>
+              <a:t>Refresher on CFSR</a:t>
+            </a:r>
+          </a:p>
+          <a:p>
+            <a:r>
+              <a:rPr lang="en-US" dirty="0"/>
+              <a:t>Link for </a:t>
+            </a:r>
+            <a:r>
+              <a:rPr lang="en-US" dirty="0" smtClean="0"/>
+              <a:t>Longline </a:t>
+            </a:r>
+            <a:r>
+              <a:rPr lang="en-US" dirty="0"/>
+              <a:t>survey </a:t>
+            </a:r>
+            <a:r>
+              <a:rPr lang="en-US" dirty="0" smtClean="0"/>
+              <a:t>catchability</a:t>
+            </a:r>
+            <a:endParaRPr lang="en-US" dirty="0"/>
+          </a:p>
+          <a:p>
+            <a:pPr lvl="1"/>
+            <a:r>
+              <a:rPr lang="en-US" dirty="0"/>
+              <a:t>Retrospective comparison w/ and w/o </a:t>
+            </a:r>
+            <a:r>
+              <a:rPr lang="en-US" dirty="0" smtClean="0"/>
+              <a:t>environmental link </a:t>
+            </a:r>
+            <a:r>
+              <a:rPr lang="en-US" dirty="0" smtClean="0"/>
+              <a:t>(</a:t>
+            </a:r>
+            <a:r>
+              <a:rPr lang="en-US" dirty="0" smtClean="0"/>
+              <a:t>PT</a:t>
+            </a:r>
+            <a:r>
+              <a:rPr lang="en-US" dirty="0" smtClean="0"/>
+              <a:t> </a:t>
+            </a:r>
+            <a:r>
+              <a:rPr lang="en-US" dirty="0" smtClean="0"/>
+              <a:t>request)</a:t>
+            </a:r>
+            <a:endParaRPr lang="en-US" dirty="0"/>
+          </a:p>
+          <a:p>
+            <a:pPr lvl="1"/>
+            <a:r>
+              <a:rPr lang="en-US" dirty="0" smtClean="0"/>
+              <a:t>Revaluation of CFSR index</a:t>
+            </a:r>
+          </a:p>
+          <a:p>
+            <a:r>
+              <a:rPr lang="en-US" dirty="0" smtClean="0"/>
+              <a:t>Link for growth</a:t>
+            </a:r>
+          </a:p>
+          <a:p>
+            <a:pPr lvl="1"/>
+            <a:r>
+              <a:rPr lang="en-US" dirty="0" smtClean="0"/>
+              <a:t>Individual growth parameters: determining most appropriate CFSR index</a:t>
+            </a:r>
+          </a:p>
+          <a:p>
+            <a:pPr lvl="1"/>
+            <a:r>
+              <a:rPr lang="en-US" dirty="0" smtClean="0"/>
+              <a:t>Combined growth model &amp; comparison with base model</a:t>
+            </a:r>
+          </a:p>
+          <a:p>
+            <a:pPr lvl="1"/>
+            <a:r>
+              <a:rPr lang="en-US" dirty="0" smtClean="0"/>
+              <a:t>Path forward</a:t>
+            </a:r>
+          </a:p>
+          <a:p>
+            <a:r>
+              <a:rPr lang="en-US" dirty="0" smtClean="0"/>
+              <a:t>Recommendations for November 2023</a:t>
+            </a:r>
+          </a:p>
+        </p:txBody>
+      </p:sp>
+    </p:spTree>
+    <p:extLst>
+      <p:ext uri="{BB962C8B-B14F-4D97-AF65-F5344CB8AC3E}">
+        <p14:creationId xmlns:p14="http://schemas.microsoft.com/office/powerpoint/2010/main" val="1519735260"/>
+      </p:ext>
+    </p:extLst>
+  </p:cSld>
+  <p:clrMapOvr>
+    <a:masterClrMapping/>
+  </p:clrMapOvr>
+</p:sld>
+</file>
+
+<file path=ppt/slides/slide20.xml><?xml version="1.0" encoding="utf-8"?>
 <p:sld xmlns:a="http://schemas.openxmlformats.org/drawingml/2006/main" xmlns:r="http://schemas.openxmlformats.org/officeDocument/2006/relationships" xmlns:p="http://schemas.openxmlformats.org/presentationml/2006/main">
   <p:cSld>
     <p:spTree>
@@ -4630,223 +4884,7 @@
 </p:sld>
 </file>
 
-<file path=ppt/slides/slide2.xml><?xml version="1.0" encoding="utf-8"?>
-<p:sld xmlns:a="http://schemas.openxmlformats.org/drawingml/2006/main" xmlns:r="http://schemas.openxmlformats.org/officeDocument/2006/relationships" xmlns:p="http://schemas.openxmlformats.org/presentationml/2006/main">
-  <p:cSld>
-    <p:spTree>
-      <p:nvGrpSpPr>
-        <p:cNvPr id="1" name=""/>
-        <p:cNvGrpSpPr/>
-        <p:nvPr/>
-      </p:nvGrpSpPr>
-      <p:grpSpPr>
-        <a:xfrm>
-          <a:off x="0" y="0"/>
-          <a:ext cx="0" cy="0"/>
-          <a:chOff x="0" y="0"/>
-          <a:chExt cx="0" cy="0"/>
-        </a:xfrm>
-      </p:grpSpPr>
-      <p:sp>
-        <p:nvSpPr>
-          <p:cNvPr id="2" name="Title 1"/>
-          <p:cNvSpPr>
-            <a:spLocks noGrp="1"/>
-          </p:cNvSpPr>
-          <p:nvPr>
-            <p:ph type="title"/>
-          </p:nvPr>
-        </p:nvSpPr>
-        <p:spPr/>
-        <p:txBody>
-          <a:bodyPr/>
-          <a:lstStyle/>
-          <a:p>
-            <a:r>
-              <a:rPr lang="en-US" dirty="0" smtClean="0"/>
-              <a:t>Overview</a:t>
-            </a:r>
-            <a:endParaRPr lang="en-US" dirty="0"/>
-          </a:p>
-        </p:txBody>
-      </p:sp>
-      <p:sp>
-        <p:nvSpPr>
-          <p:cNvPr id="3" name="Content Placeholder 2"/>
-          <p:cNvSpPr>
-            <a:spLocks noGrp="1"/>
-          </p:cNvSpPr>
-          <p:nvPr>
-            <p:ph idx="1"/>
-          </p:nvPr>
-        </p:nvSpPr>
-        <p:spPr/>
-        <p:txBody>
-          <a:bodyPr>
-            <a:normAutofit fontScale="92500" lnSpcReduction="10000"/>
-          </a:bodyPr>
-          <a:lstStyle/>
-          <a:p>
-            <a:r>
-              <a:rPr lang="en-US" dirty="0" smtClean="0"/>
-              <a:t>Housecleaning </a:t>
-            </a:r>
-            <a:r>
-              <a:rPr lang="en-US" dirty="0" smtClean="0"/>
-              <a:t>(CAAL minimum sample size</a:t>
-            </a:r>
-            <a:r>
-              <a:rPr lang="en-US" dirty="0" smtClean="0"/>
-              <a:t>)</a:t>
-            </a:r>
-          </a:p>
-          <a:p>
-            <a:r>
-              <a:rPr lang="en-US" dirty="0" smtClean="0"/>
-              <a:t>Review of e</a:t>
-            </a:r>
-            <a:r>
-              <a:rPr lang="en-US" dirty="0" smtClean="0"/>
-              <a:t>nvironmental </a:t>
-            </a:r>
-            <a:r>
-              <a:rPr lang="en-US" dirty="0" smtClean="0"/>
-              <a:t>link</a:t>
-            </a:r>
-          </a:p>
-          <a:p>
-            <a:pPr lvl="1"/>
-            <a:r>
-              <a:rPr lang="en-US" dirty="0" smtClean="0"/>
-              <a:t>Refresher on CFSR</a:t>
-            </a:r>
-            <a:endParaRPr lang="en-US" dirty="0" smtClean="0"/>
-          </a:p>
-          <a:p>
-            <a:r>
-              <a:rPr lang="en-US" dirty="0"/>
-              <a:t>Link for </a:t>
-            </a:r>
-            <a:r>
-              <a:rPr lang="en-US" dirty="0" smtClean="0"/>
-              <a:t>Longline </a:t>
-            </a:r>
-            <a:r>
-              <a:rPr lang="en-US" dirty="0"/>
-              <a:t>survey </a:t>
-            </a:r>
-            <a:r>
-              <a:rPr lang="en-US" dirty="0" smtClean="0"/>
-              <a:t>catchability</a:t>
-            </a:r>
-            <a:endParaRPr lang="en-US" dirty="0"/>
-          </a:p>
-          <a:p>
-            <a:pPr lvl="1"/>
-            <a:r>
-              <a:rPr lang="en-US" dirty="0"/>
-              <a:t>Retrospective comparison w/ and w/o </a:t>
-            </a:r>
-            <a:r>
-              <a:rPr lang="en-US" dirty="0" smtClean="0"/>
-              <a:t>environmental link (SSC request)</a:t>
-            </a:r>
-            <a:endParaRPr lang="en-US" dirty="0"/>
-          </a:p>
-          <a:p>
-            <a:pPr lvl="1"/>
-            <a:r>
-              <a:rPr lang="en-US" dirty="0" smtClean="0"/>
-              <a:t>Revaluation of CFSR index</a:t>
-            </a:r>
-            <a:endParaRPr lang="en-US" dirty="0" smtClean="0"/>
-          </a:p>
-          <a:p>
-            <a:r>
-              <a:rPr lang="en-US" dirty="0" smtClean="0"/>
-              <a:t>Link for growth</a:t>
-            </a:r>
-          </a:p>
-          <a:p>
-            <a:pPr lvl="1"/>
-            <a:r>
-              <a:rPr lang="en-US" dirty="0" smtClean="0"/>
-              <a:t>Individual </a:t>
-            </a:r>
-            <a:r>
-              <a:rPr lang="en-US" dirty="0" smtClean="0"/>
-              <a:t>growth parameters</a:t>
-            </a:r>
-            <a:r>
-              <a:rPr lang="en-US" dirty="0" smtClean="0"/>
-              <a:t>: </a:t>
-            </a:r>
-            <a:r>
-              <a:rPr lang="en-US" dirty="0" smtClean="0"/>
-              <a:t>determining most appropriate CFSR </a:t>
-            </a:r>
-            <a:r>
-              <a:rPr lang="en-US" dirty="0" smtClean="0"/>
-              <a:t>index</a:t>
-            </a:r>
-          </a:p>
-          <a:p>
-            <a:pPr lvl="1"/>
-            <a:r>
-              <a:rPr lang="en-US" dirty="0" smtClean="0"/>
-              <a:t>Combined </a:t>
-            </a:r>
-            <a:r>
-              <a:rPr lang="en-US" dirty="0" smtClean="0"/>
-              <a:t>growth model </a:t>
-            </a:r>
-            <a:r>
-              <a:rPr lang="en-US" dirty="0" smtClean="0"/>
-              <a:t>&amp; </a:t>
-            </a:r>
-            <a:r>
-              <a:rPr lang="en-US" dirty="0" smtClean="0"/>
-              <a:t>comparison </a:t>
-            </a:r>
-            <a:r>
-              <a:rPr lang="en-US" dirty="0" smtClean="0"/>
-              <a:t>with base model</a:t>
-            </a:r>
-          </a:p>
-          <a:p>
-            <a:pPr lvl="1"/>
-            <a:r>
-              <a:rPr lang="en-US" dirty="0" smtClean="0"/>
-              <a:t>Path </a:t>
-            </a:r>
-            <a:r>
-              <a:rPr lang="en-US" dirty="0" smtClean="0"/>
-              <a:t>forward</a:t>
-            </a:r>
-          </a:p>
-          <a:p>
-            <a:r>
-              <a:rPr lang="en-US" dirty="0" smtClean="0"/>
-              <a:t>Recommendations for November 2023</a:t>
-            </a:r>
-            <a:endParaRPr lang="en-US" dirty="0" smtClean="0"/>
-          </a:p>
-        </p:txBody>
-      </p:sp>
-    </p:spTree>
-    <p:extLst>
-      <p:ext uri="{BB962C8B-B14F-4D97-AF65-F5344CB8AC3E}">
-        <p14:creationId xmlns:p14="http://schemas.microsoft.com/office/powerpoint/2010/main" val="1519735260"/>
-      </p:ext>
-    </p:extLst>
-  </p:cSld>
-  <p:clrMapOvr>
-    <a:masterClrMapping/>
-  </p:clrMapOvr>
-</p:sld>
-</file>
-
-<file path=ppt/slides/slide20.xml><?xml version="1.0" encoding="utf-8"?>
+<file path=ppt/slides/slide21.xml><?xml version="1.0" encoding="utf-8"?>
 <p:sld xmlns:a="http://schemas.openxmlformats.org/drawingml/2006/main" xmlns:r="http://schemas.openxmlformats.org/officeDocument/2006/relationships" xmlns:p="http://schemas.openxmlformats.org/presentationml/2006/main">
   <p:cSld>
     <p:spTree>
@@ -5172,15 +5210,7 @@
           <a:p>
             <a:r>
               <a:rPr lang="en-US" dirty="0" smtClean="0"/>
-              <a:t>Step 2: </a:t>
-            </a:r>
-            <a:r>
-              <a:rPr lang="en-US" dirty="0" smtClean="0"/>
-              <a:t>Example f</a:t>
-            </a:r>
-            <a:r>
-              <a:rPr lang="en-US" dirty="0" smtClean="0"/>
-              <a:t>its</a:t>
+              <a:t>Step 2: Example fits</a:t>
             </a:r>
           </a:p>
           <a:p>
@@ -5189,7 +5219,6 @@
               <a:rPr lang="en-US" dirty="0" smtClean="0"/>
               <a:t>Improvement to lack of fit identified in last assessment cycle</a:t>
             </a:r>
-            <a:endParaRPr lang="en-US" dirty="0" smtClean="0"/>
           </a:p>
           <a:p>
             <a:endParaRPr lang="en-US" dirty="0"/>
@@ -5391,11 +5420,7 @@
           <a:p>
             <a:r>
               <a:rPr lang="en-US" dirty="0" smtClean="0"/>
-              <a:t>Pot</a:t>
-            </a:r>
-            <a:r>
-              <a:rPr lang="en-US" dirty="0" smtClean="0"/>
-              <a:t> fishery</a:t>
+              <a:t>Pot fishery</a:t>
             </a:r>
             <a:endParaRPr lang="en-US" dirty="0"/>
           </a:p>
@@ -5445,6 +5470,382 @@
           </a:p>
         </p:txBody>
       </p:sp>
+      <p:sp>
+        <p:nvSpPr>
+          <p:cNvPr id="4" name="Oval 3"/>
+          <p:cNvSpPr/>
+          <p:nvPr/>
+        </p:nvSpPr>
+        <p:spPr>
+          <a:xfrm rot="20134836">
+            <a:off x="6709233" y="1104536"/>
+            <a:ext cx="1267580" cy="417729"/>
+          </a:xfrm>
+          <a:prstGeom prst="ellipse">
+            <a:avLst/>
+          </a:prstGeom>
+          <a:noFill/>
+          <a:ln w="25400">
+            <a:solidFill>
+              <a:srgbClr val="C00000"/>
+            </a:solidFill>
+          </a:ln>
+        </p:spPr>
+        <p:style>
+          <a:lnRef idx="2">
+            <a:schemeClr val="accent1">
+              <a:shade val="50000"/>
+            </a:schemeClr>
+          </a:lnRef>
+          <a:fillRef idx="1">
+            <a:schemeClr val="accent1"/>
+          </a:fillRef>
+          <a:effectRef idx="0">
+            <a:schemeClr val="accent1"/>
+          </a:effectRef>
+          <a:fontRef idx="minor">
+            <a:schemeClr val="lt1"/>
+          </a:fontRef>
+        </p:style>
+        <p:txBody>
+          <a:bodyPr rtlCol="0" anchor="ctr"/>
+          <a:lstStyle/>
+          <a:p>
+            <a:pPr algn="ctr"/>
+            <a:endParaRPr lang="en-US"/>
+          </a:p>
+        </p:txBody>
+      </p:sp>
+      <p:sp>
+        <p:nvSpPr>
+          <p:cNvPr id="24" name="Oval 23"/>
+          <p:cNvSpPr/>
+          <p:nvPr/>
+        </p:nvSpPr>
+        <p:spPr>
+          <a:xfrm rot="20134836">
+            <a:off x="6608836" y="2602367"/>
+            <a:ext cx="1533235" cy="389638"/>
+          </a:xfrm>
+          <a:prstGeom prst="ellipse">
+            <a:avLst/>
+          </a:prstGeom>
+          <a:noFill/>
+          <a:ln w="25400">
+            <a:solidFill>
+              <a:srgbClr val="C00000"/>
+            </a:solidFill>
+          </a:ln>
+        </p:spPr>
+        <p:style>
+          <a:lnRef idx="2">
+            <a:schemeClr val="accent1">
+              <a:shade val="50000"/>
+            </a:schemeClr>
+          </a:lnRef>
+          <a:fillRef idx="1">
+            <a:schemeClr val="accent1"/>
+          </a:fillRef>
+          <a:effectRef idx="0">
+            <a:schemeClr val="accent1"/>
+          </a:effectRef>
+          <a:fontRef idx="minor">
+            <a:schemeClr val="lt1"/>
+          </a:fontRef>
+        </p:style>
+        <p:txBody>
+          <a:bodyPr rtlCol="0" anchor="ctr"/>
+          <a:lstStyle/>
+          <a:p>
+            <a:pPr algn="ctr"/>
+            <a:endParaRPr lang="en-US"/>
+          </a:p>
+        </p:txBody>
+      </p:sp>
+      <p:sp>
+        <p:nvSpPr>
+          <p:cNvPr id="25" name="Oval 24"/>
+          <p:cNvSpPr/>
+          <p:nvPr/>
+        </p:nvSpPr>
+        <p:spPr>
+          <a:xfrm rot="20134836">
+            <a:off x="6892313" y="4068089"/>
+            <a:ext cx="1207842" cy="314583"/>
+          </a:xfrm>
+          <a:prstGeom prst="ellipse">
+            <a:avLst/>
+          </a:prstGeom>
+          <a:noFill/>
+          <a:ln w="25400">
+            <a:solidFill>
+              <a:srgbClr val="C00000"/>
+            </a:solidFill>
+          </a:ln>
+        </p:spPr>
+        <p:style>
+          <a:lnRef idx="2">
+            <a:schemeClr val="accent1">
+              <a:shade val="50000"/>
+            </a:schemeClr>
+          </a:lnRef>
+          <a:fillRef idx="1">
+            <a:schemeClr val="accent1"/>
+          </a:fillRef>
+          <a:effectRef idx="0">
+            <a:schemeClr val="accent1"/>
+          </a:effectRef>
+          <a:fontRef idx="minor">
+            <a:schemeClr val="lt1"/>
+          </a:fontRef>
+        </p:style>
+        <p:txBody>
+          <a:bodyPr rtlCol="0" anchor="ctr"/>
+          <a:lstStyle/>
+          <a:p>
+            <a:pPr algn="ctr"/>
+            <a:endParaRPr lang="en-US"/>
+          </a:p>
+        </p:txBody>
+      </p:sp>
+      <p:sp>
+        <p:nvSpPr>
+          <p:cNvPr id="26" name="Oval 25"/>
+          <p:cNvSpPr/>
+          <p:nvPr/>
+        </p:nvSpPr>
+        <p:spPr>
+          <a:xfrm rot="20134836">
+            <a:off x="6694364" y="5657598"/>
+            <a:ext cx="1194132" cy="421070"/>
+          </a:xfrm>
+          <a:prstGeom prst="ellipse">
+            <a:avLst/>
+          </a:prstGeom>
+          <a:noFill/>
+          <a:ln w="25400">
+            <a:solidFill>
+              <a:srgbClr val="C00000"/>
+            </a:solidFill>
+          </a:ln>
+        </p:spPr>
+        <p:style>
+          <a:lnRef idx="2">
+            <a:schemeClr val="accent1">
+              <a:shade val="50000"/>
+            </a:schemeClr>
+          </a:lnRef>
+          <a:fillRef idx="1">
+            <a:schemeClr val="accent1"/>
+          </a:fillRef>
+          <a:effectRef idx="0">
+            <a:schemeClr val="accent1"/>
+          </a:effectRef>
+          <a:fontRef idx="minor">
+            <a:schemeClr val="lt1"/>
+          </a:fontRef>
+        </p:style>
+        <p:txBody>
+          <a:bodyPr rtlCol="0" anchor="ctr"/>
+          <a:lstStyle/>
+          <a:p>
+            <a:pPr algn="ctr"/>
+            <a:endParaRPr lang="en-US"/>
+          </a:p>
+        </p:txBody>
+      </p:sp>
+      <p:sp>
+        <p:nvSpPr>
+          <p:cNvPr id="27" name="Oval 26"/>
+          <p:cNvSpPr/>
+          <p:nvPr/>
+        </p:nvSpPr>
+        <p:spPr>
+          <a:xfrm rot="20134836">
+            <a:off x="9902029" y="5657599"/>
+            <a:ext cx="1194132" cy="421070"/>
+          </a:xfrm>
+          <a:prstGeom prst="ellipse">
+            <a:avLst/>
+          </a:prstGeom>
+          <a:noFill/>
+          <a:ln w="25400">
+            <a:solidFill>
+              <a:schemeClr val="accent6">
+                <a:lumMod val="75000"/>
+              </a:schemeClr>
+            </a:solidFill>
+          </a:ln>
+        </p:spPr>
+        <p:style>
+          <a:lnRef idx="2">
+            <a:schemeClr val="accent1">
+              <a:shade val="50000"/>
+            </a:schemeClr>
+          </a:lnRef>
+          <a:fillRef idx="1">
+            <a:schemeClr val="accent1"/>
+          </a:fillRef>
+          <a:effectRef idx="0">
+            <a:schemeClr val="accent1"/>
+          </a:effectRef>
+          <a:fontRef idx="minor">
+            <a:schemeClr val="lt1"/>
+          </a:fontRef>
+        </p:style>
+        <p:txBody>
+          <a:bodyPr rtlCol="0" anchor="ctr"/>
+          <a:lstStyle/>
+          <a:p>
+            <a:pPr algn="ctr"/>
+            <a:endParaRPr lang="en-US"/>
+          </a:p>
+        </p:txBody>
+      </p:sp>
+      <p:sp>
+        <p:nvSpPr>
+          <p:cNvPr id="28" name="Oval 27"/>
+          <p:cNvSpPr/>
+          <p:nvPr/>
+        </p:nvSpPr>
+        <p:spPr>
+          <a:xfrm rot="20134836">
+            <a:off x="10152278" y="4120675"/>
+            <a:ext cx="1207842" cy="314583"/>
+          </a:xfrm>
+          <a:prstGeom prst="ellipse">
+            <a:avLst/>
+          </a:prstGeom>
+          <a:noFill/>
+          <a:ln w="25400">
+            <a:solidFill>
+              <a:schemeClr val="accent6">
+                <a:lumMod val="75000"/>
+              </a:schemeClr>
+            </a:solidFill>
+          </a:ln>
+        </p:spPr>
+        <p:style>
+          <a:lnRef idx="2">
+            <a:schemeClr val="accent1">
+              <a:shade val="50000"/>
+            </a:schemeClr>
+          </a:lnRef>
+          <a:fillRef idx="1">
+            <a:schemeClr val="accent1"/>
+          </a:fillRef>
+          <a:effectRef idx="0">
+            <a:schemeClr val="accent1"/>
+          </a:effectRef>
+          <a:fontRef idx="minor">
+            <a:schemeClr val="lt1"/>
+          </a:fontRef>
+        </p:style>
+        <p:txBody>
+          <a:bodyPr rtlCol="0" anchor="ctr"/>
+          <a:lstStyle/>
+          <a:p>
+            <a:pPr algn="ctr"/>
+            <a:endParaRPr lang="en-US"/>
+          </a:p>
+        </p:txBody>
+      </p:sp>
+      <p:sp>
+        <p:nvSpPr>
+          <p:cNvPr id="29" name="Oval 28"/>
+          <p:cNvSpPr/>
+          <p:nvPr/>
+        </p:nvSpPr>
+        <p:spPr>
+          <a:xfrm rot="20134836">
+            <a:off x="9845110" y="2556815"/>
+            <a:ext cx="1533235" cy="389638"/>
+          </a:xfrm>
+          <a:prstGeom prst="ellipse">
+            <a:avLst/>
+          </a:prstGeom>
+          <a:noFill/>
+          <a:ln w="25400">
+            <a:solidFill>
+              <a:schemeClr val="accent6">
+                <a:lumMod val="75000"/>
+              </a:schemeClr>
+            </a:solidFill>
+          </a:ln>
+        </p:spPr>
+        <p:style>
+          <a:lnRef idx="2">
+            <a:schemeClr val="accent1">
+              <a:shade val="50000"/>
+            </a:schemeClr>
+          </a:lnRef>
+          <a:fillRef idx="1">
+            <a:schemeClr val="accent1"/>
+          </a:fillRef>
+          <a:effectRef idx="0">
+            <a:schemeClr val="accent1"/>
+          </a:effectRef>
+          <a:fontRef idx="minor">
+            <a:schemeClr val="lt1"/>
+          </a:fontRef>
+        </p:style>
+        <p:txBody>
+          <a:bodyPr rtlCol="0" anchor="ctr"/>
+          <a:lstStyle/>
+          <a:p>
+            <a:pPr algn="ctr"/>
+            <a:endParaRPr lang="en-US"/>
+          </a:p>
+        </p:txBody>
+      </p:sp>
+      <p:sp>
+        <p:nvSpPr>
+          <p:cNvPr id="30" name="Oval 29"/>
+          <p:cNvSpPr/>
+          <p:nvPr/>
+        </p:nvSpPr>
+        <p:spPr>
+          <a:xfrm rot="20134836">
+            <a:off x="10093076" y="1031551"/>
+            <a:ext cx="1267580" cy="417729"/>
+          </a:xfrm>
+          <a:prstGeom prst="ellipse">
+            <a:avLst/>
+          </a:prstGeom>
+          <a:noFill/>
+          <a:ln w="25400">
+            <a:solidFill>
+              <a:schemeClr val="accent6">
+                <a:lumMod val="75000"/>
+              </a:schemeClr>
+            </a:solidFill>
+          </a:ln>
+        </p:spPr>
+        <p:style>
+          <a:lnRef idx="2">
+            <a:schemeClr val="accent1">
+              <a:shade val="50000"/>
+            </a:schemeClr>
+          </a:lnRef>
+          <a:fillRef idx="1">
+            <a:schemeClr val="accent1"/>
+          </a:fillRef>
+          <a:effectRef idx="0">
+            <a:schemeClr val="accent1"/>
+          </a:effectRef>
+          <a:fontRef idx="minor">
+            <a:schemeClr val="lt1"/>
+          </a:fontRef>
+        </p:style>
+        <p:txBody>
+          <a:bodyPr rtlCol="0" anchor="ctr"/>
+          <a:lstStyle/>
+          <a:p>
+            <a:pPr algn="ctr"/>
+            <a:endParaRPr lang="en-US"/>
+          </a:p>
+        </p:txBody>
+      </p:sp>
     </p:spTree>
     <p:extLst>
       <p:ext uri="{BB962C8B-B14F-4D97-AF65-F5344CB8AC3E}">
@@ -5458,7 +5859,7 @@
 </p:sld>
 </file>
 
-<file path=ppt/slides/slide21.xml><?xml version="1.0" encoding="utf-8"?>
+<file path=ppt/slides/slide22.xml><?xml version="1.0" encoding="utf-8"?>
 <p:sld xmlns:a="http://schemas.openxmlformats.org/drawingml/2006/main" xmlns:r="http://schemas.openxmlformats.org/officeDocument/2006/relationships" xmlns:p="http://schemas.openxmlformats.org/presentationml/2006/main">
   <p:cSld>
     <p:spTree>
@@ -5544,32 +5945,19 @@
               <a:rPr lang="en-US" dirty="0" smtClean="0"/>
               <a:t> rho: </a:t>
             </a:r>
-            <a:endParaRPr lang="en-US" dirty="0" smtClean="0"/>
           </a:p>
           <a:p>
             <a:pPr lvl="1"/>
             <a:r>
               <a:rPr lang="en-US" dirty="0" smtClean="0"/>
-              <a:t>2019.1b </a:t>
-            </a:r>
-            <a:r>
-              <a:rPr lang="en-US" dirty="0" smtClean="0"/>
-              <a:t>= -</a:t>
-            </a:r>
-            <a:r>
-              <a:rPr lang="en-US" dirty="0" smtClean="0"/>
-              <a:t>0.073</a:t>
+              <a:t>2019.1b = -0.073</a:t>
             </a:r>
           </a:p>
           <a:p>
             <a:pPr lvl="1"/>
             <a:r>
               <a:rPr lang="en-US" dirty="0" smtClean="0"/>
-              <a:t>2023.1 </a:t>
-            </a:r>
-            <a:r>
-              <a:rPr lang="en-US" dirty="0" smtClean="0"/>
-              <a:t>= -0.022</a:t>
+              <a:t>2023.1 = -0.022</a:t>
             </a:r>
             <a:endParaRPr lang="en-US" dirty="0"/>
           </a:p>
@@ -5627,150 +6015,6 @@
 </p:sld>
 </file>
 
-<file path=ppt/slides/slide22.xml><?xml version="1.0" encoding="utf-8"?>
-<p:sld xmlns:a="http://schemas.openxmlformats.org/drawingml/2006/main" xmlns:r="http://schemas.openxmlformats.org/officeDocument/2006/relationships" xmlns:p="http://schemas.openxmlformats.org/presentationml/2006/main">
-  <p:cSld>
-    <p:spTree>
-      <p:nvGrpSpPr>
-        <p:cNvPr id="1" name=""/>
-        <p:cNvGrpSpPr/>
-        <p:nvPr/>
-      </p:nvGrpSpPr>
-      <p:grpSpPr>
-        <a:xfrm>
-          <a:off x="0" y="0"/>
-          <a:ext cx="0" cy="0"/>
-          <a:chOff x="0" y="0"/>
-          <a:chExt cx="0" cy="0"/>
-        </a:xfrm>
-      </p:grpSpPr>
-      <p:sp>
-        <p:nvSpPr>
-          <p:cNvPr id="2" name="Title 1"/>
-          <p:cNvSpPr>
-            <a:spLocks noGrp="1"/>
-          </p:cNvSpPr>
-          <p:nvPr>
-            <p:ph type="title"/>
-          </p:nvPr>
-        </p:nvSpPr>
-        <p:spPr/>
-        <p:txBody>
-          <a:bodyPr/>
-          <a:lstStyle/>
-          <a:p>
-            <a:r>
-              <a:rPr lang="en-US" dirty="0" smtClean="0"/>
-              <a:t>Link for growth</a:t>
-            </a:r>
-            <a:endParaRPr lang="en-US" dirty="0"/>
-          </a:p>
-        </p:txBody>
-      </p:sp>
-      <p:sp>
-        <p:nvSpPr>
-          <p:cNvPr id="3" name="Content Placeholder 2"/>
-          <p:cNvSpPr>
-            <a:spLocks noGrp="1"/>
-          </p:cNvSpPr>
-          <p:nvPr>
-            <p:ph idx="1"/>
-          </p:nvPr>
-        </p:nvSpPr>
-        <p:spPr/>
-        <p:txBody>
-          <a:bodyPr>
-            <a:normAutofit/>
-          </a:bodyPr>
-          <a:lstStyle/>
-          <a:p>
-            <a:r>
-              <a:rPr lang="en-US" dirty="0" smtClean="0"/>
-              <a:t>Things to consider:</a:t>
-            </a:r>
-          </a:p>
-          <a:p>
-            <a:pPr lvl="1"/>
-            <a:r>
-              <a:rPr lang="en-US" dirty="0" smtClean="0"/>
-              <a:t>What growth do we use in projections</a:t>
-            </a:r>
-            <a:r>
-              <a:rPr lang="en-US" dirty="0" smtClean="0"/>
-              <a:t>? (Most recent environmental conditions? Some time period of historical?)</a:t>
-            </a:r>
-            <a:endParaRPr lang="en-US" dirty="0" smtClean="0"/>
-          </a:p>
-          <a:p>
-            <a:pPr lvl="1"/>
-            <a:r>
-              <a:rPr lang="en-US" dirty="0" smtClean="0"/>
-              <a:t>Is there another, better, index?</a:t>
-            </a:r>
-          </a:p>
-          <a:p>
-            <a:pPr lvl="1"/>
-            <a:endParaRPr lang="en-US" dirty="0"/>
-          </a:p>
-          <a:p>
-            <a:r>
-              <a:rPr lang="en-US" dirty="0" smtClean="0"/>
-              <a:t>Moving forward:</a:t>
-            </a:r>
-          </a:p>
-          <a:p>
-            <a:pPr lvl="1"/>
-            <a:r>
-              <a:rPr lang="en-US" dirty="0" smtClean="0"/>
-              <a:t>Not going to recommend an environmentally linked model for growth this cycle</a:t>
-            </a:r>
-          </a:p>
-          <a:p>
-            <a:pPr lvl="1"/>
-            <a:r>
-              <a:rPr lang="en-US" dirty="0" smtClean="0"/>
-              <a:t>Have a post doc (Krista </a:t>
-            </a:r>
-            <a:r>
-              <a:rPr lang="en-US" dirty="0" err="1" smtClean="0"/>
-              <a:t>Oke</a:t>
-            </a:r>
-            <a:r>
-              <a:rPr lang="en-US" dirty="0" smtClean="0"/>
-              <a:t>) that will be investigating environmental links over the next 2 years</a:t>
-            </a:r>
-            <a:endParaRPr lang="en-US" dirty="0"/>
-          </a:p>
-          <a:p>
-            <a:endParaRPr lang="en-US" dirty="0" smtClean="0"/>
-          </a:p>
-          <a:p>
-            <a:endParaRPr lang="en-US" dirty="0"/>
-          </a:p>
-          <a:p>
-            <a:endParaRPr lang="en-US" dirty="0" smtClean="0"/>
-          </a:p>
-          <a:p>
-            <a:pPr marL="0" indent="0">
-              <a:buNone/>
-            </a:pPr>
-            <a:endParaRPr lang="en-US" dirty="0"/>
-          </a:p>
-        </p:txBody>
-      </p:sp>
-    </p:spTree>
-    <p:extLst>
-      <p:ext uri="{BB962C8B-B14F-4D97-AF65-F5344CB8AC3E}">
-        <p14:creationId xmlns:p14="http://schemas.microsoft.com/office/powerpoint/2010/main" val="2408764681"/>
-      </p:ext>
-    </p:extLst>
-  </p:cSld>
-  <p:clrMapOvr>
-    <a:masterClrMapping/>
-  </p:clrMapOvr>
-</p:sld>
-</file>
-
 <file path=ppt/slides/slide23.xml><?xml version="1.0" encoding="utf-8"?>
 <p:sld xmlns:a="http://schemas.openxmlformats.org/drawingml/2006/main" xmlns:r="http://schemas.openxmlformats.org/officeDocument/2006/relationships" xmlns:p="http://schemas.openxmlformats.org/presentationml/2006/main">
   <p:cSld>
@@ -5805,6 +6049,145 @@
           <a:p>
             <a:r>
               <a:rPr lang="en-US" dirty="0" smtClean="0"/>
+              <a:t>Link for growth</a:t>
+            </a:r>
+            <a:endParaRPr lang="en-US" dirty="0"/>
+          </a:p>
+        </p:txBody>
+      </p:sp>
+      <p:sp>
+        <p:nvSpPr>
+          <p:cNvPr id="3" name="Content Placeholder 2"/>
+          <p:cNvSpPr>
+            <a:spLocks noGrp="1"/>
+          </p:cNvSpPr>
+          <p:nvPr>
+            <p:ph idx="1"/>
+          </p:nvPr>
+        </p:nvSpPr>
+        <p:spPr/>
+        <p:txBody>
+          <a:bodyPr>
+            <a:normAutofit/>
+          </a:bodyPr>
+          <a:lstStyle/>
+          <a:p>
+            <a:r>
+              <a:rPr lang="en-US" dirty="0" smtClean="0"/>
+              <a:t>Things to consider:</a:t>
+            </a:r>
+          </a:p>
+          <a:p>
+            <a:pPr lvl="1"/>
+            <a:r>
+              <a:rPr lang="en-US" dirty="0" smtClean="0"/>
+              <a:t>What growth do we use in projections? (Most recent environmental conditions? Some time period of historical?)</a:t>
+            </a:r>
+          </a:p>
+          <a:p>
+            <a:pPr lvl="1"/>
+            <a:r>
+              <a:rPr lang="en-US" dirty="0" smtClean="0"/>
+              <a:t>Is there another, better, index?</a:t>
+            </a:r>
+          </a:p>
+          <a:p>
+            <a:pPr lvl="1"/>
+            <a:endParaRPr lang="en-US" dirty="0"/>
+          </a:p>
+          <a:p>
+            <a:r>
+              <a:rPr lang="en-US" dirty="0" smtClean="0"/>
+              <a:t>Moving forward:</a:t>
+            </a:r>
+          </a:p>
+          <a:p>
+            <a:pPr lvl="1"/>
+            <a:r>
+              <a:rPr lang="en-US" dirty="0" smtClean="0"/>
+              <a:t>Not going to recommend an environmentally linked model for growth this cycle</a:t>
+            </a:r>
+          </a:p>
+          <a:p>
+            <a:pPr lvl="1"/>
+            <a:r>
+              <a:rPr lang="en-US" dirty="0" smtClean="0"/>
+              <a:t>Have a post doc (Krista </a:t>
+            </a:r>
+            <a:r>
+              <a:rPr lang="en-US" dirty="0" err="1" smtClean="0"/>
+              <a:t>Oke</a:t>
+            </a:r>
+            <a:r>
+              <a:rPr lang="en-US" dirty="0" smtClean="0"/>
+              <a:t>) that will be investigating environmental links over the next 2 years, will look to her results for guidance in future assessments</a:t>
+            </a:r>
+            <a:endParaRPr lang="en-US" dirty="0"/>
+          </a:p>
+          <a:p>
+            <a:endParaRPr lang="en-US" dirty="0" smtClean="0"/>
+          </a:p>
+          <a:p>
+            <a:endParaRPr lang="en-US" dirty="0"/>
+          </a:p>
+          <a:p>
+            <a:endParaRPr lang="en-US" dirty="0" smtClean="0"/>
+          </a:p>
+          <a:p>
+            <a:pPr marL="0" indent="0">
+              <a:buNone/>
+            </a:pPr>
+            <a:endParaRPr lang="en-US" dirty="0"/>
+          </a:p>
+        </p:txBody>
+      </p:sp>
+    </p:spTree>
+    <p:extLst>
+      <p:ext uri="{BB962C8B-B14F-4D97-AF65-F5344CB8AC3E}">
+        <p14:creationId xmlns:p14="http://schemas.microsoft.com/office/powerpoint/2010/main" val="2408764681"/>
+      </p:ext>
+    </p:extLst>
+  </p:cSld>
+  <p:clrMapOvr>
+    <a:masterClrMapping/>
+  </p:clrMapOvr>
+</p:sld>
+</file>
+
+<file path=ppt/slides/slide24.xml><?xml version="1.0" encoding="utf-8"?>
+<p:sld xmlns:a="http://schemas.openxmlformats.org/drawingml/2006/main" xmlns:r="http://schemas.openxmlformats.org/officeDocument/2006/relationships" xmlns:p="http://schemas.openxmlformats.org/presentationml/2006/main">
+  <p:cSld>
+    <p:spTree>
+      <p:nvGrpSpPr>
+        <p:cNvPr id="1" name=""/>
+        <p:cNvGrpSpPr/>
+        <p:nvPr/>
+      </p:nvGrpSpPr>
+      <p:grpSpPr>
+        <a:xfrm>
+          <a:off x="0" y="0"/>
+          <a:ext cx="0" cy="0"/>
+          <a:chOff x="0" y="0"/>
+          <a:chExt cx="0" cy="0"/>
+        </a:xfrm>
+      </p:grpSpPr>
+      <p:sp>
+        <p:nvSpPr>
+          <p:cNvPr id="2" name="Title 1"/>
+          <p:cNvSpPr>
+            <a:spLocks noGrp="1"/>
+          </p:cNvSpPr>
+          <p:nvPr>
+            <p:ph type="title"/>
+          </p:nvPr>
+        </p:nvSpPr>
+        <p:spPr/>
+        <p:txBody>
+          <a:bodyPr/>
+          <a:lstStyle/>
+          <a:p>
+            <a:r>
+              <a:rPr lang="en-US" dirty="0" smtClean="0"/>
               <a:t>Overall summary</a:t>
             </a:r>
             <a:endParaRPr lang="en-US" dirty="0"/>
@@ -5860,19 +6243,7 @@
             </a:pPr>
             <a:r>
               <a:rPr lang="en-US" dirty="0" smtClean="0"/>
-              <a:t>Use different </a:t>
-            </a:r>
-            <a:r>
-              <a:rPr lang="en-US" dirty="0" smtClean="0"/>
-              <a:t>CFSR index </a:t>
-            </a:r>
-            <a:r>
-              <a:rPr lang="en-US" dirty="0" smtClean="0"/>
-              <a:t>for LL survey q environmental </a:t>
-            </a:r>
-            <a:r>
-              <a:rPr lang="en-US" dirty="0" smtClean="0"/>
-              <a:t>link</a:t>
+              <a:t>Use different CFSR index for LL survey q environmental link</a:t>
             </a:r>
           </a:p>
           <a:p>
@@ -5981,11 +6352,7 @@
           <a:p>
             <a:r>
               <a:rPr lang="en-US" dirty="0" smtClean="0"/>
-              <a:t>Minimum sample size </a:t>
-            </a:r>
-            <a:r>
-              <a:rPr lang="en-US" dirty="0" smtClean="0"/>
-              <a:t>issue</a:t>
+              <a:t>Minimum sample size issue</a:t>
             </a:r>
           </a:p>
           <a:p>
@@ -5994,19 +6361,7 @@
           <a:p>
             <a:r>
               <a:rPr lang="en-US" dirty="0" smtClean="0"/>
-              <a:t>Historical assessments r</a:t>
-            </a:r>
-            <a:r>
-              <a:rPr lang="en-US" dirty="0" smtClean="0"/>
-              <a:t>emoved </a:t>
-            </a:r>
-            <a:r>
-              <a:rPr lang="en-US" dirty="0" smtClean="0"/>
-              <a:t>CAAL data with minimum sample size less than 1 (i.e., weight</a:t>
-            </a:r>
-            <a:r>
-              <a:rPr lang="en-US" dirty="0" smtClean="0"/>
-              <a:t>)</a:t>
+              <a:t>Historical assessments removed CAAL data with minimum sample size less than 1 (i.e., weight)</a:t>
             </a:r>
           </a:p>
           <a:p>
@@ -6015,19 +6370,7 @@
           <a:p>
             <a:r>
               <a:rPr lang="en-US" dirty="0" smtClean="0"/>
-              <a:t>1,812 of </a:t>
-            </a:r>
-            <a:r>
-              <a:rPr lang="en-US" dirty="0" smtClean="0"/>
-              <a:t>2,825 (64%) </a:t>
-            </a:r>
-            <a:r>
-              <a:rPr lang="en-US" dirty="0" smtClean="0"/>
-              <a:t>CAAL </a:t>
-            </a:r>
-            <a:r>
-              <a:rPr lang="en-US" dirty="0" smtClean="0"/>
-              <a:t>length-age data removed</a:t>
+              <a:t>1,812 of 2,825 (64%) CAAL length-age data removed</a:t>
             </a:r>
           </a:p>
           <a:p>
@@ -6038,7 +6381,6 @@
               <a:rPr lang="en-US" dirty="0" smtClean="0"/>
               <a:t>Model 2019.1b corrects minimum sample size so all CAAL data included</a:t>
             </a:r>
-            <a:endParaRPr lang="en-US" dirty="0" smtClean="0"/>
           </a:p>
         </p:txBody>
       </p:sp>
@@ -6119,7 +6461,6 @@
               <a:rPr lang="en-US" dirty="0" smtClean="0"/>
               <a:t>Likelihoods &amp; Fits</a:t>
             </a:r>
-            <a:endParaRPr lang="en-US" dirty="0" smtClean="0"/>
           </a:p>
         </p:txBody>
       </p:sp>
@@ -6343,6 +6684,215 @@
           <a:p>
             <a:r>
               <a:rPr lang="en-US" dirty="0" smtClean="0"/>
+              <a:t>Housecleaning:</a:t>
+            </a:r>
+            <a:endParaRPr lang="en-US" dirty="0"/>
+          </a:p>
+        </p:txBody>
+      </p:sp>
+      <p:sp>
+        <p:nvSpPr>
+          <p:cNvPr id="3" name="Content Placeholder 2"/>
+          <p:cNvSpPr>
+            <a:spLocks noGrp="1"/>
+          </p:cNvSpPr>
+          <p:nvPr>
+            <p:ph idx="1"/>
+          </p:nvPr>
+        </p:nvSpPr>
+        <p:spPr>
+          <a:xfrm>
+            <a:off x="838200" y="1479788"/>
+            <a:ext cx="6589816" cy="4351338"/>
+          </a:xfrm>
+        </p:spPr>
+        <p:txBody>
+          <a:bodyPr/>
+          <a:lstStyle/>
+          <a:p>
+            <a:r>
+              <a:rPr lang="en-US" dirty="0" smtClean="0"/>
+              <a:t>Pearson </a:t>
+            </a:r>
+            <a:r>
+              <a:rPr lang="en-US" dirty="0" err="1" smtClean="0"/>
+              <a:t>resids</a:t>
+            </a:r>
+            <a:r>
+              <a:rPr lang="en-US" dirty="0" smtClean="0"/>
+              <a:t>: trawl survey</a:t>
+            </a:r>
+            <a:endParaRPr lang="en-US" dirty="0" smtClean="0"/>
+          </a:p>
+        </p:txBody>
+      </p:sp>
+      <p:sp>
+        <p:nvSpPr>
+          <p:cNvPr id="6" name="TextBox 5"/>
+          <p:cNvSpPr txBox="1"/>
+          <p:nvPr/>
+        </p:nvSpPr>
+        <p:spPr>
+          <a:xfrm>
+            <a:off x="3301337" y="1854883"/>
+            <a:ext cx="938077" cy="369332"/>
+          </a:xfrm>
+          <a:prstGeom prst="rect">
+            <a:avLst/>
+          </a:prstGeom>
+          <a:noFill/>
+        </p:spPr>
+        <p:txBody>
+          <a:bodyPr wrap="none" rtlCol="0">
+            <a:spAutoFit/>
+          </a:bodyPr>
+          <a:lstStyle/>
+          <a:p>
+            <a:r>
+              <a:rPr lang="en-US" dirty="0" smtClean="0"/>
+              <a:t>2019.1a</a:t>
+            </a:r>
+            <a:endParaRPr lang="en-US" dirty="0"/>
+          </a:p>
+        </p:txBody>
+      </p:sp>
+      <p:sp>
+        <p:nvSpPr>
+          <p:cNvPr id="17" name="TextBox 16"/>
+          <p:cNvSpPr txBox="1"/>
+          <p:nvPr/>
+        </p:nvSpPr>
+        <p:spPr>
+          <a:xfrm>
+            <a:off x="7988751" y="1838408"/>
+            <a:ext cx="949299" cy="369332"/>
+          </a:xfrm>
+          <a:prstGeom prst="rect">
+            <a:avLst/>
+          </a:prstGeom>
+          <a:noFill/>
+        </p:spPr>
+        <p:txBody>
+          <a:bodyPr wrap="none" rtlCol="0">
+            <a:spAutoFit/>
+          </a:bodyPr>
+          <a:lstStyle/>
+          <a:p>
+            <a:r>
+              <a:rPr lang="en-US" dirty="0" smtClean="0"/>
+              <a:t>2019.1b</a:t>
+            </a:r>
+            <a:endParaRPr lang="en-US" dirty="0"/>
+          </a:p>
+        </p:txBody>
+      </p:sp>
+      <p:pic>
+        <p:nvPicPr>
+          <p:cNvPr id="7" name="Picture 6"/>
+          <p:cNvPicPr>
+            <a:picLocks noChangeAspect="1"/>
+          </p:cNvPicPr>
+          <p:nvPr/>
+        </p:nvPicPr>
+        <p:blipFill>
+          <a:blip r:embed="rId2" cstate="print">
+            <a:extLst>
+              <a:ext uri="{28A0092B-C50C-407E-A947-70E740481C1C}">
+                <a14:useLocalDpi xmlns:a14="http://schemas.microsoft.com/office/drawing/2010/main" val="0"/>
+              </a:ext>
+            </a:extLst>
+          </a:blip>
+          <a:stretch>
+            <a:fillRect/>
+          </a:stretch>
+        </p:blipFill>
+        <p:spPr>
+          <a:xfrm>
+            <a:off x="1320118" y="2207740"/>
+            <a:ext cx="4592595" cy="4592595"/>
+          </a:xfrm>
+          <a:prstGeom prst="rect">
+            <a:avLst/>
+          </a:prstGeom>
+        </p:spPr>
+      </p:pic>
+      <p:pic>
+        <p:nvPicPr>
+          <p:cNvPr id="8" name="Picture 7"/>
+          <p:cNvPicPr>
+            <a:picLocks noChangeAspect="1"/>
+          </p:cNvPicPr>
+          <p:nvPr/>
+        </p:nvPicPr>
+        <p:blipFill>
+          <a:blip r:embed="rId3" cstate="print">
+            <a:extLst>
+              <a:ext uri="{28A0092B-C50C-407E-A947-70E740481C1C}">
+                <a14:useLocalDpi xmlns:a14="http://schemas.microsoft.com/office/drawing/2010/main" val="0"/>
+              </a:ext>
+            </a:extLst>
+          </a:blip>
+          <a:stretch>
+            <a:fillRect/>
+          </a:stretch>
+        </p:blipFill>
+        <p:spPr>
+          <a:xfrm>
+            <a:off x="6096000" y="2207740"/>
+            <a:ext cx="4592595" cy="4592595"/>
+          </a:xfrm>
+          <a:prstGeom prst="rect">
+            <a:avLst/>
+          </a:prstGeom>
+        </p:spPr>
+      </p:pic>
+    </p:spTree>
+    <p:extLst>
+      <p:ext uri="{BB962C8B-B14F-4D97-AF65-F5344CB8AC3E}">
+        <p14:creationId xmlns:p14="http://schemas.microsoft.com/office/powerpoint/2010/main" val="2986439471"/>
+      </p:ext>
+    </p:extLst>
+  </p:cSld>
+  <p:clrMapOvr>
+    <a:masterClrMapping/>
+  </p:clrMapOvr>
+</p:sld>
+</file>
+
+<file path=ppt/slides/slide6.xml><?xml version="1.0" encoding="utf-8"?>
+<p:sld xmlns:a="http://schemas.openxmlformats.org/drawingml/2006/main" xmlns:r="http://schemas.openxmlformats.org/officeDocument/2006/relationships" xmlns:p="http://schemas.openxmlformats.org/presentationml/2006/main">
+  <p:cSld>
+    <p:spTree>
+      <p:nvGrpSpPr>
+        <p:cNvPr id="1" name=""/>
+        <p:cNvGrpSpPr/>
+        <p:nvPr/>
+      </p:nvGrpSpPr>
+      <p:grpSpPr>
+        <a:xfrm>
+          <a:off x="0" y="0"/>
+          <a:ext cx="0" cy="0"/>
+          <a:chOff x="0" y="0"/>
+          <a:chExt cx="0" cy="0"/>
+        </a:xfrm>
+      </p:grpSpPr>
+      <p:sp>
+        <p:nvSpPr>
+          <p:cNvPr id="2" name="Title 1"/>
+          <p:cNvSpPr>
+            <a:spLocks noGrp="1"/>
+          </p:cNvSpPr>
+          <p:nvPr>
+            <p:ph type="title"/>
+          </p:nvPr>
+        </p:nvSpPr>
+        <p:spPr/>
+        <p:txBody>
+          <a:bodyPr/>
+          <a:lstStyle/>
+          <a:p>
+            <a:r>
+              <a:rPr lang="en-US" dirty="0" smtClean="0"/>
               <a:t>Housecleaning</a:t>
             </a:r>
             <a:endParaRPr lang="en-US" dirty="0"/>
@@ -6371,15 +6921,7 @@
           <a:p>
             <a:r>
               <a:rPr lang="en-US" dirty="0" smtClean="0"/>
-              <a:t>Recommendation: Correct minimum sample size and use this as new </a:t>
-            </a:r>
-            <a:r>
-              <a:rPr lang="en-US" dirty="0" smtClean="0"/>
-              <a:t>base </a:t>
-            </a:r>
-            <a:r>
-              <a:rPr lang="en-US" dirty="0" smtClean="0"/>
-              <a:t>model (2019.1b)</a:t>
+              <a:t>Recommendation: Correct minimum sample size and use this as new base model (2019.1b)</a:t>
             </a:r>
           </a:p>
           <a:p>
@@ -6495,97 +7037,6 @@
 </p:sld>
 </file>
 
-<file path=ppt/slides/slide6.xml><?xml version="1.0" encoding="utf-8"?>
-<p:sld xmlns:a="http://schemas.openxmlformats.org/drawingml/2006/main" xmlns:r="http://schemas.openxmlformats.org/officeDocument/2006/relationships" xmlns:p="http://schemas.openxmlformats.org/presentationml/2006/main">
-  <p:cSld>
-    <p:spTree>
-      <p:nvGrpSpPr>
-        <p:cNvPr id="1" name=""/>
-        <p:cNvGrpSpPr/>
-        <p:nvPr/>
-      </p:nvGrpSpPr>
-      <p:grpSpPr>
-        <a:xfrm>
-          <a:off x="0" y="0"/>
-          <a:ext cx="0" cy="0"/>
-          <a:chOff x="0" y="0"/>
-          <a:chExt cx="0" cy="0"/>
-        </a:xfrm>
-      </p:grpSpPr>
-      <p:sp>
-        <p:nvSpPr>
-          <p:cNvPr id="2" name="Title 1"/>
-          <p:cNvSpPr>
-            <a:spLocks noGrp="1"/>
-          </p:cNvSpPr>
-          <p:nvPr>
-            <p:ph type="title"/>
-          </p:nvPr>
-        </p:nvSpPr>
-        <p:spPr/>
-        <p:txBody>
-          <a:bodyPr/>
-          <a:lstStyle/>
-          <a:p>
-            <a:r>
-              <a:rPr lang="en-US" dirty="0" smtClean="0"/>
-              <a:t>Environmental </a:t>
-            </a:r>
-            <a:r>
-              <a:rPr lang="en-US" dirty="0" smtClean="0"/>
-              <a:t>index</a:t>
-            </a:r>
-            <a:endParaRPr lang="en-US" dirty="0"/>
-          </a:p>
-        </p:txBody>
-      </p:sp>
-      <p:sp>
-        <p:nvSpPr>
-          <p:cNvPr id="3" name="Content Placeholder 2"/>
-          <p:cNvSpPr>
-            <a:spLocks noGrp="1"/>
-          </p:cNvSpPr>
-          <p:nvPr>
-            <p:ph idx="1"/>
-          </p:nvPr>
-        </p:nvSpPr>
-        <p:spPr/>
-        <p:txBody>
-          <a:bodyPr/>
-          <a:lstStyle/>
-          <a:p>
-            <a:r>
-              <a:rPr lang="en-US" dirty="0" smtClean="0"/>
-              <a:t>Description of </a:t>
-            </a:r>
-            <a:r>
-              <a:rPr lang="en-US" dirty="0" smtClean="0"/>
-              <a:t>CFSR</a:t>
-            </a:r>
-            <a:endParaRPr lang="en-US" dirty="0" smtClean="0"/>
-          </a:p>
-          <a:p>
-            <a:r>
-              <a:rPr lang="en-US" dirty="0" smtClean="0"/>
-              <a:t>Available by length bin and month</a:t>
-            </a:r>
-            <a:endParaRPr lang="en-US" dirty="0"/>
-          </a:p>
-        </p:txBody>
-      </p:sp>
-    </p:spTree>
-    <p:extLst>
-      <p:ext uri="{BB962C8B-B14F-4D97-AF65-F5344CB8AC3E}">
-        <p14:creationId xmlns:p14="http://schemas.microsoft.com/office/powerpoint/2010/main" val="89867169"/>
-      </p:ext>
-    </p:extLst>
-  </p:cSld>
-  <p:clrMapOvr>
-    <a:masterClrMapping/>
-  </p:clrMapOvr>
-</p:sld>
-</file>
-
 <file path=ppt/slides/slide7.xml><?xml version="1.0" encoding="utf-8"?>
 <p:sld xmlns:a="http://schemas.openxmlformats.org/drawingml/2006/main" xmlns:r="http://schemas.openxmlformats.org/officeDocument/2006/relationships" xmlns:p="http://schemas.openxmlformats.org/presentationml/2006/main">
   <p:cSld>
@@ -6620,19 +7071,7 @@
           <a:p>
             <a:r>
               <a:rPr lang="en-US" dirty="0" smtClean="0"/>
-              <a:t>Environmental L</a:t>
-            </a:r>
-            <a:r>
-              <a:rPr lang="en-US" dirty="0" smtClean="0"/>
-              <a:t>ink </a:t>
-            </a:r>
-            <a:r>
-              <a:rPr lang="en-US" dirty="0" smtClean="0"/>
-              <a:t>for LL </a:t>
-            </a:r>
-            <a:r>
-              <a:rPr lang="en-US" dirty="0" smtClean="0"/>
-              <a:t>survey catchability</a:t>
+              <a:t>Environmental index</a:t>
             </a:r>
             <a:endParaRPr lang="en-US" dirty="0"/>
           </a:p>
@@ -6650,124 +7089,27 @@
         </p:nvSpPr>
         <p:spPr/>
         <p:txBody>
-          <a:bodyPr>
-            <a:normAutofit/>
-          </a:bodyPr>
-          <a:lstStyle/>
-          <a:p>
-            <a:r>
-              <a:rPr lang="en-US" dirty="0" smtClean="0"/>
-              <a:t>SSC request to evaluate whether link still appropriate</a:t>
-            </a:r>
-          </a:p>
-          <a:p>
-            <a:r>
-              <a:rPr lang="en-US" dirty="0" smtClean="0"/>
-              <a:t>Construct model with no </a:t>
-            </a:r>
-            <a:r>
-              <a:rPr lang="en-US" dirty="0" smtClean="0"/>
-              <a:t>environmental </a:t>
-            </a:r>
-            <a:r>
-              <a:rPr lang="en-US" dirty="0" smtClean="0"/>
-              <a:t>link to LL survey q (2019.1c)</a:t>
-            </a:r>
-          </a:p>
-          <a:p>
-            <a:r>
-              <a:rPr lang="en-US" dirty="0" smtClean="0"/>
-              <a:t>Added... re-evaluate </a:t>
-            </a:r>
-            <a:r>
-              <a:rPr lang="en-US" dirty="0" smtClean="0"/>
-              <a:t>CFSR</a:t>
-            </a:r>
-            <a:r>
-              <a:rPr lang="en-US" dirty="0" smtClean="0"/>
-              <a:t> </a:t>
-            </a:r>
-            <a:r>
-              <a:rPr lang="en-US" dirty="0" smtClean="0"/>
-              <a:t>index </a:t>
-            </a:r>
-            <a:r>
-              <a:rPr lang="en-US" dirty="0" smtClean="0"/>
-              <a:t>used (2019.1d)</a:t>
-            </a:r>
-            <a:endParaRPr lang="en-US" dirty="0"/>
-          </a:p>
-          <a:p>
-            <a:pPr lvl="1"/>
-            <a:r>
-              <a:rPr lang="en-US" dirty="0" smtClean="0"/>
-              <a:t>Step 1: Evaluated </a:t>
-            </a:r>
-            <a:r>
-              <a:rPr lang="en-US" dirty="0" smtClean="0"/>
-              <a:t>q </a:t>
-            </a:r>
-            <a:r>
-              <a:rPr lang="en-US" dirty="0" err="1" smtClean="0"/>
-              <a:t>env</a:t>
-            </a:r>
-            <a:r>
-              <a:rPr lang="en-US" dirty="0" smtClean="0"/>
-              <a:t> link </a:t>
-            </a:r>
-            <a:r>
-              <a:rPr lang="en-US" dirty="0" smtClean="0"/>
-              <a:t>across length bin and month</a:t>
-            </a:r>
-          </a:p>
-          <a:p>
-            <a:pPr lvl="1"/>
-            <a:r>
-              <a:rPr lang="en-US" dirty="0" smtClean="0"/>
-              <a:t>Step 2: </a:t>
-            </a:r>
-            <a:r>
-              <a:rPr lang="en-US" dirty="0" smtClean="0"/>
-              <a:t>Select best </a:t>
-            </a:r>
-            <a:r>
-              <a:rPr lang="en-US" dirty="0" smtClean="0"/>
-              <a:t>from Step 1 as new </a:t>
-            </a:r>
-            <a:r>
-              <a:rPr lang="en-US" dirty="0" err="1" smtClean="0"/>
-              <a:t>env</a:t>
-            </a:r>
-            <a:r>
-              <a:rPr lang="en-US" dirty="0" smtClean="0"/>
-              <a:t> link </a:t>
-            </a:r>
-            <a:r>
-              <a:rPr lang="en-US" dirty="0" smtClean="0"/>
-              <a:t>model</a:t>
-            </a:r>
-            <a:endParaRPr lang="en-US" dirty="0" smtClean="0"/>
-          </a:p>
-          <a:p>
-            <a:r>
-              <a:rPr lang="en-US" dirty="0" smtClean="0"/>
-              <a:t>Performance metrics: </a:t>
-            </a:r>
-            <a:r>
-              <a:rPr lang="en-US" dirty="0" smtClean="0"/>
-              <a:t>current year AIC and model fits, retrospective AIC and </a:t>
-            </a:r>
-            <a:r>
-              <a:rPr lang="en-US" dirty="0" smtClean="0"/>
-              <a:t>performance</a:t>
-            </a:r>
+          <a:bodyPr/>
+          <a:lstStyle/>
+          <a:p>
+            <a:r>
+              <a:rPr lang="en-US" dirty="0" smtClean="0"/>
+              <a:t>Description of CFSR</a:t>
+            </a:r>
+          </a:p>
+          <a:p>
+            <a:r>
+              <a:rPr lang="en-US" dirty="0" smtClean="0"/>
+              <a:t>Available by length bin and month</a:t>
+            </a:r>
+            <a:endParaRPr lang="en-US" dirty="0"/>
           </a:p>
         </p:txBody>
       </p:sp>
     </p:spTree>
     <p:extLst>
       <p:ext uri="{BB962C8B-B14F-4D97-AF65-F5344CB8AC3E}">
-        <p14:creationId xmlns:p14="http://schemas.microsoft.com/office/powerpoint/2010/main" val="1471501903"/>
+        <p14:creationId xmlns:p14="http://schemas.microsoft.com/office/powerpoint/2010/main" val="89867169"/>
       </p:ext>
     </p:extLst>
   </p:cSld>
@@ -6811,11 +7153,141 @@
           <a:p>
             <a:r>
               <a:rPr lang="en-US" dirty="0" smtClean="0"/>
-              <a:t>Link for LL </a:t>
-            </a:r>
-            <a:r>
-              <a:rPr lang="en-US" dirty="0" smtClean="0"/>
-              <a:t>survey q: no link comparison</a:t>
+              <a:t>Environmental Link for LL survey catchability</a:t>
+            </a:r>
+            <a:endParaRPr lang="en-US" dirty="0"/>
+          </a:p>
+        </p:txBody>
+      </p:sp>
+      <p:sp>
+        <p:nvSpPr>
+          <p:cNvPr id="3" name="Content Placeholder 2"/>
+          <p:cNvSpPr>
+            <a:spLocks noGrp="1"/>
+          </p:cNvSpPr>
+          <p:nvPr>
+            <p:ph idx="1"/>
+          </p:nvPr>
+        </p:nvSpPr>
+        <p:spPr/>
+        <p:txBody>
+          <a:bodyPr>
+            <a:normAutofit/>
+          </a:bodyPr>
+          <a:lstStyle/>
+          <a:p>
+            <a:r>
+              <a:rPr lang="en-US" dirty="0" smtClean="0"/>
+              <a:t>PT</a:t>
+            </a:r>
+            <a:r>
+              <a:rPr lang="en-US" dirty="0" smtClean="0"/>
+              <a:t> </a:t>
+            </a:r>
+            <a:r>
+              <a:rPr lang="en-US" dirty="0" smtClean="0"/>
+              <a:t>request to evaluate whether link still appropriate</a:t>
+            </a:r>
+          </a:p>
+          <a:p>
+            <a:r>
+              <a:rPr lang="en-US" dirty="0" smtClean="0"/>
+              <a:t>Construct model with no environmental link to LL survey q (2019.1c)</a:t>
+            </a:r>
+          </a:p>
+          <a:p>
+            <a:r>
+              <a:rPr lang="en-US" dirty="0" smtClean="0"/>
+              <a:t>Added... re-evaluate CFSR index used (2019.1d)</a:t>
+            </a:r>
+            <a:endParaRPr lang="en-US" dirty="0"/>
+          </a:p>
+          <a:p>
+            <a:pPr lvl="1"/>
+            <a:r>
+              <a:rPr lang="en-US" dirty="0" smtClean="0"/>
+              <a:t>Step 1: Evaluated q </a:t>
+            </a:r>
+            <a:r>
+              <a:rPr lang="en-US" dirty="0" err="1" smtClean="0"/>
+              <a:t>env</a:t>
+            </a:r>
+            <a:r>
+              <a:rPr lang="en-US" dirty="0" smtClean="0"/>
+              <a:t> link across length bin and month</a:t>
+            </a:r>
+          </a:p>
+          <a:p>
+            <a:pPr lvl="1"/>
+            <a:r>
+              <a:rPr lang="en-US" dirty="0" smtClean="0"/>
+              <a:t>Step 2: Select best from Step 1 as new </a:t>
+            </a:r>
+            <a:r>
+              <a:rPr lang="en-US" dirty="0" err="1" smtClean="0"/>
+              <a:t>env</a:t>
+            </a:r>
+            <a:r>
+              <a:rPr lang="en-US" dirty="0" smtClean="0"/>
+              <a:t> link model</a:t>
+            </a:r>
+          </a:p>
+          <a:p>
+            <a:r>
+              <a:rPr lang="en-US" dirty="0" smtClean="0"/>
+              <a:t>Performance metrics: current year AIC and model fits, retrospective AIC and performance</a:t>
+            </a:r>
+          </a:p>
+        </p:txBody>
+      </p:sp>
+    </p:spTree>
+    <p:extLst>
+      <p:ext uri="{BB962C8B-B14F-4D97-AF65-F5344CB8AC3E}">
+        <p14:creationId xmlns:p14="http://schemas.microsoft.com/office/powerpoint/2010/main" val="1471501903"/>
+      </p:ext>
+    </p:extLst>
+  </p:cSld>
+  <p:clrMapOvr>
+    <a:masterClrMapping/>
+  </p:clrMapOvr>
+</p:sld>
+</file>
+
+<file path=ppt/slides/slide9.xml><?xml version="1.0" encoding="utf-8"?>
+<p:sld xmlns:a="http://schemas.openxmlformats.org/drawingml/2006/main" xmlns:r="http://schemas.openxmlformats.org/officeDocument/2006/relationships" xmlns:p="http://schemas.openxmlformats.org/presentationml/2006/main">
+  <p:cSld>
+    <p:spTree>
+      <p:nvGrpSpPr>
+        <p:cNvPr id="1" name=""/>
+        <p:cNvGrpSpPr/>
+        <p:nvPr/>
+      </p:nvGrpSpPr>
+      <p:grpSpPr>
+        <a:xfrm>
+          <a:off x="0" y="0"/>
+          <a:ext cx="0" cy="0"/>
+          <a:chOff x="0" y="0"/>
+          <a:chExt cx="0" cy="0"/>
+        </a:xfrm>
+      </p:grpSpPr>
+      <p:sp>
+        <p:nvSpPr>
+          <p:cNvPr id="2" name="Title 1"/>
+          <p:cNvSpPr>
+            <a:spLocks noGrp="1"/>
+          </p:cNvSpPr>
+          <p:nvPr>
+            <p:ph type="title"/>
+          </p:nvPr>
+        </p:nvSpPr>
+        <p:spPr/>
+        <p:txBody>
+          <a:bodyPr/>
+          <a:lstStyle/>
+          <a:p>
+            <a:r>
+              <a:rPr lang="en-US" dirty="0" smtClean="0"/>
+              <a:t>Link for LL survey q: no link comparison</a:t>
             </a:r>
             <a:endParaRPr lang="en-US" dirty="0"/>
           </a:p>
@@ -7094,148 +7566,6 @@
     <p:extLst>
       <p:ext uri="{BB962C8B-B14F-4D97-AF65-F5344CB8AC3E}">
         <p14:creationId xmlns:p14="http://schemas.microsoft.com/office/powerpoint/2010/main" val="3483996684"/>
-      </p:ext>
-    </p:extLst>
-  </p:cSld>
-  <p:clrMapOvr>
-    <a:masterClrMapping/>
-  </p:clrMapOvr>
-</p:sld>
-</file>
-
-<file path=ppt/slides/slide9.xml><?xml version="1.0" encoding="utf-8"?>
-<p:sld xmlns:a="http://schemas.openxmlformats.org/drawingml/2006/main" xmlns:r="http://schemas.openxmlformats.org/officeDocument/2006/relationships" xmlns:p="http://schemas.openxmlformats.org/presentationml/2006/main">
-  <p:cSld>
-    <p:spTree>
-      <p:nvGrpSpPr>
-        <p:cNvPr id="1" name=""/>
-        <p:cNvGrpSpPr/>
-        <p:nvPr/>
-      </p:nvGrpSpPr>
-      <p:grpSpPr>
-        <a:xfrm>
-          <a:off x="0" y="0"/>
-          <a:ext cx="0" cy="0"/>
-          <a:chOff x="0" y="0"/>
-          <a:chExt cx="0" cy="0"/>
-        </a:xfrm>
-      </p:grpSpPr>
-      <p:sp>
-        <p:nvSpPr>
-          <p:cNvPr id="2" name="Title 1"/>
-          <p:cNvSpPr>
-            <a:spLocks noGrp="1"/>
-          </p:cNvSpPr>
-          <p:nvPr>
-            <p:ph type="title"/>
-          </p:nvPr>
-        </p:nvSpPr>
-        <p:spPr/>
-        <p:txBody>
-          <a:bodyPr/>
-          <a:lstStyle/>
-          <a:p>
-            <a:r>
-              <a:rPr lang="en-US" dirty="0" smtClean="0"/>
-              <a:t>Link for LL </a:t>
-            </a:r>
-            <a:r>
-              <a:rPr lang="en-US" dirty="0" smtClean="0"/>
-              <a:t>survey q: no link comparison</a:t>
-            </a:r>
-            <a:endParaRPr lang="en-US" dirty="0"/>
-          </a:p>
-        </p:txBody>
-      </p:sp>
-      <p:sp>
-        <p:nvSpPr>
-          <p:cNvPr id="3" name="Content Placeholder 2"/>
-          <p:cNvSpPr>
-            <a:spLocks noGrp="1"/>
-          </p:cNvSpPr>
-          <p:nvPr>
-            <p:ph idx="1"/>
-          </p:nvPr>
-        </p:nvSpPr>
-        <p:spPr>
-          <a:xfrm>
-            <a:off x="838199" y="1825625"/>
-            <a:ext cx="10791825" cy="4351338"/>
-          </a:xfrm>
-        </p:spPr>
-        <p:txBody>
-          <a:bodyPr>
-            <a:normAutofit/>
-          </a:bodyPr>
-          <a:lstStyle/>
-          <a:p>
-            <a:r>
-              <a:rPr lang="en-US" dirty="0" smtClean="0"/>
-              <a:t>In every retrospective year, model with link preferred over model without link</a:t>
-            </a:r>
-          </a:p>
-          <a:p>
-            <a:r>
-              <a:rPr lang="en-US" dirty="0" err="1" smtClean="0"/>
-              <a:t>Mohn’s</a:t>
-            </a:r>
-            <a:r>
-              <a:rPr lang="en-US" dirty="0" smtClean="0"/>
-              <a:t> rho 2019.1b = -0.0727</a:t>
-            </a:r>
-          </a:p>
-          <a:p>
-            <a:r>
-              <a:rPr lang="en-US" dirty="0" err="1" smtClean="0"/>
-              <a:t>Mohn’s</a:t>
-            </a:r>
-            <a:r>
-              <a:rPr lang="en-US" dirty="0" smtClean="0"/>
-              <a:t> rho 2019.1c = -0.0722</a:t>
-            </a:r>
-          </a:p>
-          <a:p>
-            <a:endParaRPr lang="en-US" dirty="0"/>
-          </a:p>
-          <a:p>
-            <a:endParaRPr lang="en-US" dirty="0" smtClean="0"/>
-          </a:p>
-          <a:p>
-            <a:endParaRPr lang="en-US" dirty="0"/>
-          </a:p>
-          <a:p>
-            <a:endParaRPr lang="en-US" dirty="0" smtClean="0"/>
-          </a:p>
-        </p:txBody>
-      </p:sp>
-      <p:pic>
-        <p:nvPicPr>
-          <p:cNvPr id="12" name="Picture 11"/>
-          <p:cNvPicPr>
-            <a:picLocks noChangeAspect="1"/>
-          </p:cNvPicPr>
-          <p:nvPr/>
-        </p:nvPicPr>
-        <p:blipFill>
-          <a:blip r:embed="rId2"/>
-          <a:stretch>
-            <a:fillRect/>
-          </a:stretch>
-        </p:blipFill>
-        <p:spPr>
-          <a:xfrm>
-            <a:off x="6124574" y="2405161"/>
-            <a:ext cx="4819651" cy="4037594"/>
-          </a:xfrm>
-          <a:prstGeom prst="rect">
-            <a:avLst/>
-          </a:prstGeom>
-        </p:spPr>
-      </p:pic>
-    </p:spTree>
-    <p:extLst>
-      <p:ext uri="{BB962C8B-B14F-4D97-AF65-F5344CB8AC3E}">
-        <p14:creationId xmlns:p14="http://schemas.microsoft.com/office/powerpoint/2010/main" val="4285928814"/>
       </p:ext>
     </p:extLst>
   </p:cSld>

</xml_diff>

<commit_message>
add final sept pt doc and presentations
</commit_message>
<xml_diff>
--- a/2023/presentation/goa_pcod_sept23.pptx
+++ b/2023/presentation/goa_pcod_sept23.pptx
@@ -266,7 +266,7 @@
           <a:p>
             <a:fld id="{A36D2051-A124-4F95-BC42-35393635D3A2}" type="datetimeFigureOut">
               <a:rPr lang="en-US" smtClean="0"/>
-              <a:t>9/12/2023</a:t>
+              <a:t>9/20/2023</a:t>
             </a:fld>
             <a:endParaRPr lang="en-US"/>
           </a:p>
@@ -436,7 +436,7 @@
           <a:p>
             <a:fld id="{A36D2051-A124-4F95-BC42-35393635D3A2}" type="datetimeFigureOut">
               <a:rPr lang="en-US" smtClean="0"/>
-              <a:t>9/12/2023</a:t>
+              <a:t>9/20/2023</a:t>
             </a:fld>
             <a:endParaRPr lang="en-US"/>
           </a:p>
@@ -616,7 +616,7 @@
           <a:p>
             <a:fld id="{A36D2051-A124-4F95-BC42-35393635D3A2}" type="datetimeFigureOut">
               <a:rPr lang="en-US" smtClean="0"/>
-              <a:t>9/12/2023</a:t>
+              <a:t>9/20/2023</a:t>
             </a:fld>
             <a:endParaRPr lang="en-US"/>
           </a:p>
@@ -786,7 +786,7 @@
           <a:p>
             <a:fld id="{A36D2051-A124-4F95-BC42-35393635D3A2}" type="datetimeFigureOut">
               <a:rPr lang="en-US" smtClean="0"/>
-              <a:t>9/12/2023</a:t>
+              <a:t>9/20/2023</a:t>
             </a:fld>
             <a:endParaRPr lang="en-US"/>
           </a:p>
@@ -1032,7 +1032,7 @@
           <a:p>
             <a:fld id="{A36D2051-A124-4F95-BC42-35393635D3A2}" type="datetimeFigureOut">
               <a:rPr lang="en-US" smtClean="0"/>
-              <a:t>9/12/2023</a:t>
+              <a:t>9/20/2023</a:t>
             </a:fld>
             <a:endParaRPr lang="en-US"/>
           </a:p>
@@ -1264,7 +1264,7 @@
           <a:p>
             <a:fld id="{A36D2051-A124-4F95-BC42-35393635D3A2}" type="datetimeFigureOut">
               <a:rPr lang="en-US" smtClean="0"/>
-              <a:t>9/12/2023</a:t>
+              <a:t>9/20/2023</a:t>
             </a:fld>
             <a:endParaRPr lang="en-US"/>
           </a:p>
@@ -1631,7 +1631,7 @@
           <a:p>
             <a:fld id="{A36D2051-A124-4F95-BC42-35393635D3A2}" type="datetimeFigureOut">
               <a:rPr lang="en-US" smtClean="0"/>
-              <a:t>9/12/2023</a:t>
+              <a:t>9/20/2023</a:t>
             </a:fld>
             <a:endParaRPr lang="en-US"/>
           </a:p>
@@ -1749,7 +1749,7 @@
           <a:p>
             <a:fld id="{A36D2051-A124-4F95-BC42-35393635D3A2}" type="datetimeFigureOut">
               <a:rPr lang="en-US" smtClean="0"/>
-              <a:t>9/12/2023</a:t>
+              <a:t>9/20/2023</a:t>
             </a:fld>
             <a:endParaRPr lang="en-US"/>
           </a:p>
@@ -1844,7 +1844,7 @@
           <a:p>
             <a:fld id="{A36D2051-A124-4F95-BC42-35393635D3A2}" type="datetimeFigureOut">
               <a:rPr lang="en-US" smtClean="0"/>
-              <a:t>9/12/2023</a:t>
+              <a:t>9/20/2023</a:t>
             </a:fld>
             <a:endParaRPr lang="en-US"/>
           </a:p>
@@ -2121,7 +2121,7 @@
           <a:p>
             <a:fld id="{A36D2051-A124-4F95-BC42-35393635D3A2}" type="datetimeFigureOut">
               <a:rPr lang="en-US" smtClean="0"/>
-              <a:t>9/12/2023</a:t>
+              <a:t>9/20/2023</a:t>
             </a:fld>
             <a:endParaRPr lang="en-US"/>
           </a:p>
@@ -2374,7 +2374,7 @@
           <a:p>
             <a:fld id="{A36D2051-A124-4F95-BC42-35393635D3A2}" type="datetimeFigureOut">
               <a:rPr lang="en-US" smtClean="0"/>
-              <a:t>9/12/2023</a:t>
+              <a:t>9/20/2023</a:t>
             </a:fld>
             <a:endParaRPr lang="en-US"/>
           </a:p>
@@ -2587,7 +2587,7 @@
           <a:p>
             <a:fld id="{A36D2051-A124-4F95-BC42-35393635D3A2}" type="datetimeFigureOut">
               <a:rPr lang="en-US" smtClean="0"/>
-              <a:t>9/12/2023</a:t>
+              <a:t>9/20/2023</a:t>
             </a:fld>
             <a:endParaRPr lang="en-US"/>
           </a:p>
@@ -4155,7 +4155,18 @@
             <a:pPr lvl="1"/>
             <a:r>
               <a:rPr lang="en-US" dirty="0" smtClean="0"/>
-              <a:t>Will be evaluating new indices, will be evaluating links, will continually be evaluating model to find improvements</a:t>
+              <a:t>Will be evaluating new indices, will be evaluating links, will continually be evaluating model to find </a:t>
+            </a:r>
+            <a:r>
+              <a:rPr lang="en-US" dirty="0" smtClean="0"/>
+              <a:t>improvements</a:t>
+            </a:r>
+          </a:p>
+          <a:p>
+            <a:pPr lvl="1"/>
+            <a:r>
+              <a:rPr lang="en-US" dirty="0" smtClean="0"/>
+              <a:t>What is our ‘burden of proof’ when it comes to mechanistic processes as it pertains to a specific index (i.e., one month’s temperature as compared to another)</a:t>
             </a:r>
             <a:endParaRPr lang="en-US" dirty="0"/>
           </a:p>
@@ -4660,23 +4671,7 @@
             </a:r>
             <a:r>
               <a:rPr lang="en-US" dirty="0" smtClean="0"/>
-              <a:t>environmental link </a:t>
-            </a:r>
-            <a:r>
-              <a:rPr lang="en-US" dirty="0" smtClean="0"/>
-              <a:t>(</a:t>
-            </a:r>
-            <a:r>
-              <a:rPr lang="en-US" dirty="0" smtClean="0"/>
-              <a:t>PT</a:t>
-            </a:r>
-            <a:r>
-              <a:rPr lang="en-US" dirty="0" smtClean="0"/>
-              <a:t> </a:t>
-            </a:r>
-            <a:r>
-              <a:rPr lang="en-US" dirty="0" smtClean="0"/>
-              <a:t>request)</a:t>
+              <a:t>environmental link (PT request)</a:t>
             </a:r>
             <a:endParaRPr lang="en-US" dirty="0"/>
           </a:p>
@@ -6722,7 +6717,6 @@
               <a:rPr lang="en-US" dirty="0" smtClean="0"/>
               <a:t>: trawl survey</a:t>
             </a:r>
-            <a:endParaRPr lang="en-US" dirty="0" smtClean="0"/>
           </a:p>
         </p:txBody>
       </p:sp>
@@ -7094,13 +7088,50 @@
           <a:p>
             <a:r>
               <a:rPr lang="en-US" dirty="0" smtClean="0"/>
-              <a:t>Description of CFSR</a:t>
-            </a:r>
-          </a:p>
-          <a:p>
-            <a:r>
-              <a:rPr lang="en-US" dirty="0" smtClean="0"/>
-              <a:t>Available by length bin and month</a:t>
+              <a:t>Refresher of Climate Forecast System Reanalysis (CFSR)</a:t>
+            </a:r>
+          </a:p>
+          <a:p>
+            <a:pPr lvl="1"/>
+            <a:r>
+              <a:rPr lang="en-US" dirty="0" smtClean="0"/>
+              <a:t>Provides temperature-at-depth</a:t>
+            </a:r>
+          </a:p>
+          <a:p>
+            <a:pPr lvl="1"/>
+            <a:r>
+              <a:rPr lang="en-US" dirty="0" smtClean="0"/>
+              <a:t>Depths determined from Bottom trawl survey for 0-20 cm, 20-40 cm, 40-60 cm, 60-80 cm, and 80+cm</a:t>
+            </a:r>
+          </a:p>
+          <a:p>
+            <a:pPr lvl="1"/>
+            <a:endParaRPr lang="en-US" dirty="0" smtClean="0"/>
+          </a:p>
+          <a:p>
+            <a:r>
+              <a:rPr lang="en-US" dirty="0" smtClean="0"/>
+              <a:t>Temperature-at-depth a</a:t>
+            </a:r>
+            <a:r>
+              <a:rPr lang="en-US" dirty="0" smtClean="0"/>
+              <a:t>vailable </a:t>
+            </a:r>
+            <a:r>
+              <a:rPr lang="en-US" dirty="0" smtClean="0"/>
+              <a:t>by length bin and </a:t>
+            </a:r>
+            <a:r>
+              <a:rPr lang="en-US" dirty="0" smtClean="0"/>
+              <a:t>month</a:t>
+            </a:r>
+          </a:p>
+          <a:p>
+            <a:pPr lvl="1"/>
+            <a:r>
+              <a:rPr lang="en-US" dirty="0" smtClean="0"/>
+              <a:t>Index computed as difference from mean value from 1982-2012 (has been considered as ‘baseline’ for ‘normal’ conditions)</a:t>
             </a:r>
             <a:endParaRPr lang="en-US" dirty="0"/>
           </a:p>
@@ -7178,16 +7209,13 @@
           <a:p>
             <a:r>
               <a:rPr lang="en-US" dirty="0" smtClean="0"/>
-              <a:t>PT</a:t>
-            </a:r>
-            <a:r>
-              <a:rPr lang="en-US" dirty="0" smtClean="0"/>
-              <a:t> </a:t>
-            </a:r>
-            <a:r>
-              <a:rPr lang="en-US" dirty="0" smtClean="0"/>
-              <a:t>request to evaluate whether link still appropriate</a:t>
-            </a:r>
+              <a:t>PT request to evaluate whether link still </a:t>
+            </a:r>
+            <a:r>
+              <a:rPr lang="en-US" dirty="0" smtClean="0"/>
+              <a:t>appropriate (first added to model in 2017)</a:t>
+            </a:r>
+            <a:endParaRPr lang="en-US" dirty="0" smtClean="0"/>
           </a:p>
           <a:p>
             <a:r>

</xml_diff>